<commit_message>
more presentation and improved kafka
</commit_message>
<xml_diff>
--- a/presentation.pptx
+++ b/presentation.pptx
@@ -5,7 +5,7 @@
     <p:sldMasterId id="2147483768" r:id="rId1"/>
   </p:sldMasterIdLst>
   <p:notesMasterIdLst>
-    <p:notesMasterId r:id="rId37"/>
+    <p:notesMasterId r:id="rId39"/>
   </p:notesMasterIdLst>
   <p:sldIdLst>
     <p:sldId id="256" r:id="rId2"/>
@@ -32,17 +32,19 @@
     <p:sldId id="293" r:id="rId23"/>
     <p:sldId id="294" r:id="rId24"/>
     <p:sldId id="295" r:id="rId25"/>
-    <p:sldId id="282" r:id="rId26"/>
-    <p:sldId id="277" r:id="rId27"/>
-    <p:sldId id="262" r:id="rId28"/>
-    <p:sldId id="268" r:id="rId29"/>
-    <p:sldId id="292" r:id="rId30"/>
-    <p:sldId id="270" r:id="rId31"/>
-    <p:sldId id="267" r:id="rId32"/>
-    <p:sldId id="269" r:id="rId33"/>
-    <p:sldId id="271" r:id="rId34"/>
-    <p:sldId id="272" r:id="rId35"/>
-    <p:sldId id="281" r:id="rId36"/>
+    <p:sldId id="297" r:id="rId26"/>
+    <p:sldId id="282" r:id="rId27"/>
+    <p:sldId id="277" r:id="rId28"/>
+    <p:sldId id="262" r:id="rId29"/>
+    <p:sldId id="268" r:id="rId30"/>
+    <p:sldId id="292" r:id="rId31"/>
+    <p:sldId id="270" r:id="rId32"/>
+    <p:sldId id="267" r:id="rId33"/>
+    <p:sldId id="269" r:id="rId34"/>
+    <p:sldId id="271" r:id="rId35"/>
+    <p:sldId id="272" r:id="rId36"/>
+    <p:sldId id="281" r:id="rId37"/>
+    <p:sldId id="298" r:id="rId38"/>
   </p:sldIdLst>
   <p:sldSz cx="12192000" cy="6858000"/>
   <p:notesSz cx="6858000" cy="9144000"/>
@@ -231,7 +233,7 @@
           <a:p>
             <a:fld id="{8F5AC0EE-C0EF-4DBE-8184-146DED29BF67}" type="datetimeFigureOut">
               <a:rPr lang="da-DK" smtClean="0"/>
-              <a:t>08-05-2024</a:t>
+              <a:t>09-05-2024</a:t>
             </a:fld>
             <a:endParaRPr lang="da-DK"/>
           </a:p>
@@ -649,6 +651,20 @@
           <a:bodyPr/>
           <a:lstStyle/>
           <a:p>
+            <a:r>
+              <a:rPr lang="da-DK" dirty="0"/>
+              <a:t>Håndtering af referencer</a:t>
+            </a:r>
+          </a:p>
+          <a:p>
+            <a:r>
+              <a:rPr lang="da-DK" dirty="0"/>
+              <a:t>Produktet fremviser ikke helt det brugbare for DDD pga. </a:t>
+            </a:r>
+            <a:r>
+              <a:rPr lang="da-DK" dirty="0" err="1"/>
+              <a:t>simplehed</a:t>
+            </a:r>
             <a:endParaRPr lang="da-DK" dirty="0"/>
           </a:p>
         </p:txBody>
@@ -670,7 +686,7 @@
           <a:p>
             <a:fld id="{252E21F2-0B82-4ACE-A045-2AAC56859006}" type="slidenum">
               <a:rPr lang="da-DK" smtClean="0"/>
-              <a:t>20</a:t>
+              <a:t>16</a:t>
             </a:fld>
             <a:endParaRPr lang="da-DK"/>
           </a:p>
@@ -679,7 +695,7 @@
     </p:spTree>
     <p:extLst>
       <p:ext uri="{BB962C8B-B14F-4D97-AF65-F5344CB8AC3E}">
-        <p14:creationId xmlns:p14="http://schemas.microsoft.com/office/powerpoint/2010/main" val="2289638430"/>
+        <p14:creationId xmlns:p14="http://schemas.microsoft.com/office/powerpoint/2010/main" val="2516361822"/>
       </p:ext>
     </p:extLst>
   </p:cSld>
@@ -734,29 +750,70 @@
           <a:lstStyle/>
           <a:p>
             <a:r>
-              <a:rPr lang="da-DK" dirty="0" err="1"/>
-              <a:t>Seq</a:t>
-            </a:r>
-            <a:r>
-              <a:rPr lang="da-DK" dirty="0"/>
-              <a:t> og </a:t>
-            </a:r>
-            <a:r>
-              <a:rPr lang="da-DK" dirty="0" err="1"/>
-              <a:t>Serilog</a:t>
-            </a:r>
-            <a:r>
-              <a:rPr lang="da-DK" dirty="0"/>
-              <a:t> er begge lette og små? </a:t>
-            </a:r>
-            <a:r>
-              <a:rPr lang="da-DK" dirty="0" err="1"/>
-              <a:t>Koncenteret</a:t>
-            </a:r>
-            <a:r>
-              <a:rPr lang="da-DK" dirty="0"/>
-              <a:t>? </a:t>
-            </a:r>
+              <a:rPr lang="da-DK" dirty="0"/>
+              <a:t>Channels tillader at benytte en enkel TCP forbindelse. Intet kommunikation mellem </a:t>
+            </a:r>
+            <a:r>
+              <a:rPr lang="da-DK" dirty="0" err="1"/>
+              <a:t>channels</a:t>
+            </a:r>
+            <a:r>
+              <a:rPr lang="da-DK" dirty="0"/>
+              <a:t>. Normalt en </a:t>
+            </a:r>
+            <a:r>
+              <a:rPr lang="da-DK" dirty="0" err="1"/>
+              <a:t>kannal</a:t>
+            </a:r>
+            <a:r>
+              <a:rPr lang="da-DK" dirty="0"/>
+              <a:t> per tråd </a:t>
+            </a:r>
+          </a:p>
+          <a:p>
+            <a:r>
+              <a:rPr lang="da-DK" dirty="0" err="1"/>
+              <a:t>Streams</a:t>
+            </a:r>
+            <a:r>
+              <a:rPr lang="da-DK" dirty="0"/>
+              <a:t> fjerner ikke beskeder. Kan bruges til at sende besked til flere </a:t>
+            </a:r>
+            <a:r>
+              <a:rPr lang="da-DK" dirty="0" err="1"/>
+              <a:t>consumers</a:t>
+            </a:r>
+            <a:endParaRPr lang="da-DK" dirty="0"/>
+          </a:p>
+          <a:p>
+            <a:r>
+              <a:rPr lang="da-DK" dirty="0"/>
+              <a:t>Queue </a:t>
+            </a:r>
+            <a:r>
+              <a:rPr lang="da-DK" dirty="0" err="1"/>
+              <a:t>ordered</a:t>
+            </a:r>
+            <a:r>
+              <a:rPr lang="da-DK" dirty="0"/>
+              <a:t> samling af beskeder, FIFO. </a:t>
+            </a:r>
+            <a:r>
+              <a:rPr lang="da-DK" dirty="0" err="1"/>
+              <a:t>Enqueued</a:t>
+            </a:r>
+            <a:r>
+              <a:rPr lang="da-DK" dirty="0"/>
+              <a:t>, </a:t>
+            </a:r>
+            <a:r>
+              <a:rPr lang="da-DK" dirty="0" err="1"/>
+              <a:t>dequeued</a:t>
+            </a:r>
+            <a:endParaRPr lang="da-DK" dirty="0"/>
+          </a:p>
+          <a:p>
+            <a:endParaRPr lang="da-DK" dirty="0"/>
           </a:p>
         </p:txBody>
       </p:sp>
@@ -777,7 +834,7 @@
           <a:p>
             <a:fld id="{252E21F2-0B82-4ACE-A045-2AAC56859006}" type="slidenum">
               <a:rPr lang="da-DK" smtClean="0"/>
-              <a:t>21</a:t>
+              <a:t>18</a:t>
             </a:fld>
             <a:endParaRPr lang="da-DK"/>
           </a:p>
@@ -786,7 +843,7 @@
     </p:spTree>
     <p:extLst>
       <p:ext uri="{BB962C8B-B14F-4D97-AF65-F5344CB8AC3E}">
-        <p14:creationId xmlns:p14="http://schemas.microsoft.com/office/powerpoint/2010/main" val="2294237520"/>
+        <p14:creationId xmlns:p14="http://schemas.microsoft.com/office/powerpoint/2010/main" val="1091159589"/>
       </p:ext>
     </p:extLst>
   </p:cSld>
@@ -840,18 +897,7 @@
           <a:bodyPr/>
           <a:lstStyle/>
           <a:p>
-            <a:r>
-              <a:rPr lang="da-DK" dirty="0"/>
-              <a:t>Kunne nævne ting som </a:t>
-            </a:r>
-            <a:r>
-              <a:rPr lang="da-DK" dirty="0" err="1"/>
-              <a:t>interceptor</a:t>
-            </a:r>
-            <a:r>
-              <a:rPr lang="da-DK" dirty="0"/>
-              <a:t> </a:t>
-            </a:r>
+            <a:endParaRPr lang="da-DK" dirty="0"/>
           </a:p>
         </p:txBody>
       </p:sp>
@@ -872,7 +918,7 @@
           <a:p>
             <a:fld id="{252E21F2-0B82-4ACE-A045-2AAC56859006}" type="slidenum">
               <a:rPr lang="da-DK" smtClean="0"/>
-              <a:t>22</a:t>
+              <a:t>20</a:t>
             </a:fld>
             <a:endParaRPr lang="da-DK"/>
           </a:p>
@@ -881,7 +927,7 @@
     </p:spTree>
     <p:extLst>
       <p:ext uri="{BB962C8B-B14F-4D97-AF65-F5344CB8AC3E}">
-        <p14:creationId xmlns:p14="http://schemas.microsoft.com/office/powerpoint/2010/main" val="4069340254"/>
+        <p14:creationId xmlns:p14="http://schemas.microsoft.com/office/powerpoint/2010/main" val="2289638430"/>
       </p:ext>
     </p:extLst>
   </p:cSld>
@@ -936,51 +982,29 @@
           <a:lstStyle/>
           <a:p>
             <a:r>
-              <a:rPr lang="da-DK" dirty="0"/>
-              <a:t>20x hurtigere end JavaScript, </a:t>
-            </a:r>
-            <a:r>
-              <a:rPr lang="da-DK" dirty="0" err="1"/>
-              <a:t>stack-based</a:t>
-            </a:r>
-            <a:r>
-              <a:rPr lang="da-DK" dirty="0"/>
-              <a:t> JavaScript VM, </a:t>
-            </a:r>
-            <a:r>
-              <a:rPr lang="da-DK" dirty="0" err="1"/>
-              <a:t>sandboxed</a:t>
-            </a:r>
-            <a:r>
-              <a:rPr lang="da-DK" dirty="0"/>
-              <a:t>, binær format, C/C++ compiler</a:t>
-            </a:r>
-          </a:p>
-          <a:p>
-            <a:pPr marL="0" marR="0" lvl="0" indent="0" algn="l" defTabSz="914400" rtl="0" eaLnBrk="1" fontAlgn="auto" latinLnBrk="0" hangingPunct="1">
-              <a:lnSpc>
-                <a:spcPct val="100000"/>
-              </a:lnSpc>
-              <a:spcBef>
-                <a:spcPts val="0"/>
-              </a:spcBef>
-              <a:spcAft>
-                <a:spcPts val="0"/>
-              </a:spcAft>
-              <a:buClrTx/>
-              <a:buSzTx/>
-              <a:buFontTx/>
-              <a:buNone/>
-              <a:tabLst/>
-              <a:defRPr/>
-            </a:pPr>
-            <a:r>
-              <a:rPr lang="da-DK" dirty="0"/>
-              <a:t>https://webassembly.org/docs/faq/</a:t>
-            </a:r>
-          </a:p>
-          <a:p>
-            <a:endParaRPr lang="da-DK" dirty="0"/>
+              <a:rPr lang="da-DK" dirty="0" err="1"/>
+              <a:t>Seq</a:t>
+            </a:r>
+            <a:r>
+              <a:rPr lang="da-DK" dirty="0"/>
+              <a:t> og </a:t>
+            </a:r>
+            <a:r>
+              <a:rPr lang="da-DK" dirty="0" err="1"/>
+              <a:t>Serilog</a:t>
+            </a:r>
+            <a:r>
+              <a:rPr lang="da-DK" dirty="0"/>
+              <a:t> er begge lette og små? </a:t>
+            </a:r>
+            <a:r>
+              <a:rPr lang="da-DK" dirty="0" err="1"/>
+              <a:t>Koncenteret</a:t>
+            </a:r>
+            <a:r>
+              <a:rPr lang="da-DK" dirty="0"/>
+              <a:t>? </a:t>
+            </a:r>
           </a:p>
         </p:txBody>
       </p:sp>
@@ -1001,7 +1025,7 @@
           <a:p>
             <a:fld id="{252E21F2-0B82-4ACE-A045-2AAC56859006}" type="slidenum">
               <a:rPr lang="da-DK" smtClean="0"/>
-              <a:t>23</a:t>
+              <a:t>21</a:t>
             </a:fld>
             <a:endParaRPr lang="da-DK"/>
           </a:p>
@@ -1010,7 +1034,7 @@
     </p:spTree>
     <p:extLst>
       <p:ext uri="{BB962C8B-B14F-4D97-AF65-F5344CB8AC3E}">
-        <p14:creationId xmlns:p14="http://schemas.microsoft.com/office/powerpoint/2010/main" val="3114175968"/>
+        <p14:creationId xmlns:p14="http://schemas.microsoft.com/office/powerpoint/2010/main" val="2294237520"/>
       </p:ext>
     </p:extLst>
   </p:cSld>
@@ -1066,13 +1090,15 @@
           <a:p>
             <a:r>
               <a:rPr lang="da-DK" dirty="0"/>
-              <a:t>https://kafka.apache.org/documentation/#intro_nutshell</a:t>
-            </a:r>
-          </a:p>
-          <a:p>
-            <a:r>
-              <a:rPr lang="da-DK" dirty="0"/>
-              <a:t>https://kafka.apache.org/documentation/#kraft_role</a:t>
+              <a:t>Kunne nævne ting som </a:t>
+            </a:r>
+            <a:r>
+              <a:rPr lang="da-DK" dirty="0" err="1"/>
+              <a:t>interceptor</a:t>
+            </a:r>
+            <a:r>
+              <a:rPr lang="da-DK" dirty="0"/>
+              <a:t> </a:t>
             </a:r>
           </a:p>
         </p:txBody>
@@ -1094,7 +1120,7 @@
           <a:p>
             <a:fld id="{252E21F2-0B82-4ACE-A045-2AAC56859006}" type="slidenum">
               <a:rPr lang="da-DK" smtClean="0"/>
-              <a:t>27</a:t>
+              <a:t>22</a:t>
             </a:fld>
             <a:endParaRPr lang="da-DK"/>
           </a:p>
@@ -1103,7 +1129,7 @@
     </p:spTree>
     <p:extLst>
       <p:ext uri="{BB962C8B-B14F-4D97-AF65-F5344CB8AC3E}">
-        <p14:creationId xmlns:p14="http://schemas.microsoft.com/office/powerpoint/2010/main" val="8081506"/>
+        <p14:creationId xmlns:p14="http://schemas.microsoft.com/office/powerpoint/2010/main" val="4069340254"/>
       </p:ext>
     </p:extLst>
   </p:cSld>
@@ -1157,6 +1183,28 @@
           <a:bodyPr/>
           <a:lstStyle/>
           <a:p>
+            <a:r>
+              <a:rPr lang="da-DK" dirty="0"/>
+              <a:t>20x hurtigere end JavaScript, </a:t>
+            </a:r>
+            <a:r>
+              <a:rPr lang="da-DK" dirty="0" err="1"/>
+              <a:t>stack-based</a:t>
+            </a:r>
+            <a:r>
+              <a:rPr lang="da-DK" dirty="0"/>
+              <a:t> JavaScript VM, </a:t>
+            </a:r>
+            <a:r>
+              <a:rPr lang="da-DK" dirty="0" err="1"/>
+              <a:t>sandboxed</a:t>
+            </a:r>
+            <a:r>
+              <a:rPr lang="da-DK" dirty="0"/>
+              <a:t>, binær format, C/C++ compiler</a:t>
+            </a:r>
+          </a:p>
+          <a:p>
             <a:pPr marL="0" marR="0" lvl="0" indent="0" algn="l" defTabSz="914400" rtl="0" eaLnBrk="1" fontAlgn="auto" latinLnBrk="0" hangingPunct="1">
               <a:lnSpc>
                 <a:spcPct val="100000"/>
@@ -1176,62 +1224,11 @@
             </a:pPr>
             <a:r>
               <a:rPr lang="da-DK" dirty="0"/>
-              <a:t>Event </a:t>
-            </a:r>
-            <a:r>
-              <a:rPr lang="da-DK" dirty="0" err="1"/>
-              <a:t>schema</a:t>
-            </a:r>
-            <a:r>
-              <a:rPr lang="da-DK" dirty="0"/>
-              <a:t> //ikke nødvendigt</a:t>
-            </a:r>
-          </a:p>
-          <a:p>
-            <a:r>
-              <a:rPr lang="da-DK" dirty="0"/>
-              <a:t>Event, noget der er sket</a:t>
-            </a:r>
-          </a:p>
-          <a:p>
-            <a:r>
-              <a:rPr lang="da-DK" dirty="0" err="1"/>
-              <a:t>Topic</a:t>
-            </a:r>
-            <a:r>
-              <a:rPr lang="da-DK" dirty="0"/>
-              <a:t> </a:t>
-            </a:r>
-            <a:r>
-              <a:rPr lang="da-DK" dirty="0" err="1"/>
-              <a:t>partitioneret</a:t>
-            </a:r>
-            <a:r>
-              <a:rPr lang="da-DK" dirty="0"/>
-              <a:t> over flere brokers</a:t>
-            </a:r>
-          </a:p>
-          <a:p>
-            <a:r>
-              <a:rPr lang="da-DK" dirty="0"/>
-              <a:t>Event </a:t>
-            </a:r>
-            <a:r>
-              <a:rPr lang="da-DK" dirty="0" err="1"/>
-              <a:t>Replikering</a:t>
-            </a:r>
-            <a:r>
-              <a:rPr lang="da-DK" dirty="0"/>
-              <a:t>, event er </a:t>
-            </a:r>
-            <a:r>
-              <a:rPr lang="da-DK" dirty="0" err="1"/>
-              <a:t>replikeret</a:t>
-            </a:r>
-            <a:r>
-              <a:rPr lang="da-DK" dirty="0"/>
-              <a:t> over flere brokers</a:t>
-            </a:r>
+              <a:t>https://webassembly.org/docs/faq/</a:t>
+            </a:r>
+          </a:p>
+          <a:p>
+            <a:endParaRPr lang="da-DK" dirty="0"/>
           </a:p>
         </p:txBody>
       </p:sp>
@@ -1252,7 +1249,7 @@
           <a:p>
             <a:fld id="{252E21F2-0B82-4ACE-A045-2AAC56859006}" type="slidenum">
               <a:rPr lang="da-DK" smtClean="0"/>
-              <a:t>28</a:t>
+              <a:t>23</a:t>
             </a:fld>
             <a:endParaRPr lang="da-DK"/>
           </a:p>
@@ -1261,7 +1258,7 @@
     </p:spTree>
     <p:extLst>
       <p:ext uri="{BB962C8B-B14F-4D97-AF65-F5344CB8AC3E}">
-        <p14:creationId xmlns:p14="http://schemas.microsoft.com/office/powerpoint/2010/main" val="2764263524"/>
+        <p14:creationId xmlns:p14="http://schemas.microsoft.com/office/powerpoint/2010/main" val="3114175968"/>
       </p:ext>
     </p:extLst>
   </p:cSld>
@@ -1315,7 +1312,18 @@
           <a:bodyPr/>
           <a:lstStyle/>
           <a:p>
-            <a:endParaRPr lang="da-DK" dirty="0"/>
+            <a:r>
+              <a:rPr lang="da-DK" dirty="0"/>
+              <a:t>Kunne nævne ting som </a:t>
+            </a:r>
+            <a:r>
+              <a:rPr lang="da-DK" dirty="0" err="1"/>
+              <a:t>interceptor</a:t>
+            </a:r>
+            <a:r>
+              <a:rPr lang="da-DK" dirty="0"/>
+              <a:t> </a:t>
+            </a:r>
           </a:p>
         </p:txBody>
       </p:sp>
@@ -1336,7 +1344,7 @@
           <a:p>
             <a:fld id="{252E21F2-0B82-4ACE-A045-2AAC56859006}" type="slidenum">
               <a:rPr lang="da-DK" smtClean="0"/>
-              <a:t>29</a:t>
+              <a:t>25</a:t>
             </a:fld>
             <a:endParaRPr lang="da-DK"/>
           </a:p>
@@ -1345,7 +1353,7 @@
     </p:spTree>
     <p:extLst>
       <p:ext uri="{BB962C8B-B14F-4D97-AF65-F5344CB8AC3E}">
-        <p14:creationId xmlns:p14="http://schemas.microsoft.com/office/powerpoint/2010/main" val="2125408469"/>
+        <p14:creationId xmlns:p14="http://schemas.microsoft.com/office/powerpoint/2010/main" val="2371307318"/>
       </p:ext>
     </p:extLst>
   </p:cSld>
@@ -1400,35 +1408,26 @@
           <a:lstStyle/>
           <a:p>
             <a:r>
-              <a:rPr lang="da-DK" dirty="0"/>
-              <a:t>Nævn at broker nu kan være controllers, men før var det zookeeper</a:t>
-            </a:r>
-          </a:p>
-          <a:p>
-            <a:r>
-              <a:rPr lang="da-DK" dirty="0" err="1"/>
-              <a:t>ZooKeeper</a:t>
-            </a:r>
-            <a:r>
-              <a:rPr lang="da-DK" dirty="0"/>
-              <a:t> udskiftet med </a:t>
-            </a:r>
-            <a:r>
-              <a:rPr lang="da-DK"/>
-              <a:t>KRaft</a:t>
-            </a:r>
-            <a:r>
-              <a:rPr lang="da-DK" dirty="0"/>
-              <a:t>, en </a:t>
-            </a:r>
-            <a:r>
-              <a:rPr lang="da-DK" dirty="0" err="1"/>
-              <a:t>kafka</a:t>
-            </a:r>
-            <a:r>
-              <a:rPr lang="da-DK" dirty="0"/>
-              <a:t> server som enten er en controller, broker eller begge</a:t>
-            </a:r>
+              <a:rPr lang="da-DK" dirty="0" err="1"/>
+              <a:t>Refresh</a:t>
+            </a:r>
+            <a:r>
+              <a:rPr lang="da-DK" dirty="0"/>
+              <a:t> </a:t>
+            </a:r>
+            <a:r>
+              <a:rPr lang="da-DK" dirty="0" err="1"/>
+              <a:t>token</a:t>
+            </a:r>
+            <a:r>
+              <a:rPr lang="da-DK" dirty="0"/>
+              <a:t> bliver ikke sat til invalid når den bruges til skabe nye </a:t>
+            </a:r>
+            <a:r>
+              <a:rPr lang="da-DK" dirty="0" err="1"/>
+              <a:t>tokens</a:t>
+            </a:r>
+            <a:endParaRPr lang="da-DK" dirty="0"/>
           </a:p>
         </p:txBody>
       </p:sp>
@@ -1449,7 +1448,7 @@
           <a:p>
             <a:fld id="{252E21F2-0B82-4ACE-A045-2AAC56859006}" type="slidenum">
               <a:rPr lang="da-DK" smtClean="0"/>
-              <a:t>30</a:t>
+              <a:t>26</a:t>
             </a:fld>
             <a:endParaRPr lang="da-DK"/>
           </a:p>
@@ -1458,7 +1457,7 @@
     </p:spTree>
     <p:extLst>
       <p:ext uri="{BB962C8B-B14F-4D97-AF65-F5344CB8AC3E}">
-        <p14:creationId xmlns:p14="http://schemas.microsoft.com/office/powerpoint/2010/main" val="3998614641"/>
+        <p14:creationId xmlns:p14="http://schemas.microsoft.com/office/powerpoint/2010/main" val="671521866"/>
       </p:ext>
     </p:extLst>
   </p:cSld>
@@ -1513,75 +1512,14 @@
           <a:lstStyle/>
           <a:p>
             <a:r>
-              <a:rPr lang="da-DK" dirty="0" err="1"/>
-              <a:t>Confluent</a:t>
-            </a:r>
-            <a:r>
-              <a:rPr lang="da-DK" dirty="0"/>
-              <a:t> Kafka</a:t>
-            </a:r>
-          </a:p>
-          <a:p>
-            <a:r>
-              <a:rPr lang="da-DK" dirty="0"/>
-              <a:t>Kunne havde brugt </a:t>
-            </a:r>
-            <a:r>
-              <a:rPr lang="da-DK" dirty="0" err="1"/>
-              <a:t>Knet</a:t>
-            </a:r>
-            <a:endParaRPr lang="da-DK" dirty="0"/>
-          </a:p>
-          <a:p>
-            <a:r>
-              <a:rPr lang="da-DK" dirty="0"/>
-              <a:t>JSON, </a:t>
-            </a:r>
-            <a:r>
-              <a:rPr lang="da-DK" dirty="0" err="1"/>
-              <a:t>Arvo</a:t>
-            </a:r>
-            <a:r>
-              <a:rPr lang="da-DK" dirty="0"/>
-              <a:t>, </a:t>
-            </a:r>
-            <a:r>
-              <a:rPr lang="da-DK" dirty="0" err="1"/>
-              <a:t>Protobuf</a:t>
-            </a:r>
-            <a:r>
-              <a:rPr lang="da-DK" dirty="0"/>
-              <a:t>. </a:t>
-            </a:r>
-            <a:r>
-              <a:rPr lang="da-DK" dirty="0" err="1"/>
-              <a:t>Arvo</a:t>
-            </a:r>
-            <a:r>
-              <a:rPr lang="da-DK" dirty="0"/>
-              <a:t> brugt, da den virker til at være det mest </a:t>
-            </a:r>
-            <a:r>
-              <a:rPr lang="da-DK" dirty="0" err="1"/>
-              <a:t>almendlige</a:t>
-            </a:r>
-            <a:r>
-              <a:rPr lang="da-DK" dirty="0"/>
-              <a:t>. </a:t>
-            </a:r>
-            <a:r>
-              <a:rPr lang="da-DK" dirty="0" err="1"/>
-              <a:t>Arvo</a:t>
-            </a:r>
-            <a:r>
-              <a:rPr lang="da-DK" dirty="0"/>
-              <a:t> er Apache</a:t>
-            </a:r>
-          </a:p>
-          <a:p>
-            <a:r>
-              <a:rPr lang="da-DK" dirty="0"/>
-              <a:t>https://github.com/confluentinc/cp-all-in-one/blob/7.6.1-post/cp-all-in-one-kraft/docker-compose.yml</a:t>
+              <a:rPr lang="da-DK" dirty="0"/>
+              <a:t>https://kafka.apache.org/documentation/#intro_nutshell</a:t>
+            </a:r>
+          </a:p>
+          <a:p>
+            <a:r>
+              <a:rPr lang="da-DK" dirty="0"/>
+              <a:t>https://kafka.apache.org/documentation/#kraft_role</a:t>
             </a:r>
           </a:p>
         </p:txBody>
@@ -1603,7 +1541,7 @@
           <a:p>
             <a:fld id="{252E21F2-0B82-4ACE-A045-2AAC56859006}" type="slidenum">
               <a:rPr lang="da-DK" smtClean="0"/>
-              <a:t>31</a:t>
+              <a:t>28</a:t>
             </a:fld>
             <a:endParaRPr lang="da-DK"/>
           </a:p>
@@ -1612,7 +1550,7 @@
     </p:spTree>
     <p:extLst>
       <p:ext uri="{BB962C8B-B14F-4D97-AF65-F5344CB8AC3E}">
-        <p14:creationId xmlns:p14="http://schemas.microsoft.com/office/powerpoint/2010/main" val="3004894068"/>
+        <p14:creationId xmlns:p14="http://schemas.microsoft.com/office/powerpoint/2010/main" val="8081506"/>
       </p:ext>
     </p:extLst>
   </p:cSld>
@@ -1666,69 +1604,124 @@
           <a:bodyPr/>
           <a:lstStyle/>
           <a:p>
-            <a:r>
-              <a:rPr lang="da-DK" dirty="0"/>
-              <a:t>Remote Procedure </a:t>
-            </a:r>
-            <a:r>
-              <a:rPr lang="da-DK" dirty="0" err="1"/>
-              <a:t>Cal</a:t>
-            </a:r>
-            <a:endParaRPr lang="da-DK" dirty="0"/>
-          </a:p>
-          <a:p>
-            <a:r>
-              <a:rPr lang="da-DK" dirty="0"/>
-              <a:t>Nævn at </a:t>
-            </a:r>
-            <a:r>
-              <a:rPr lang="da-DK" dirty="0" err="1"/>
-              <a:t>kafka</a:t>
-            </a:r>
-            <a:r>
-              <a:rPr lang="da-DK" dirty="0"/>
-              <a:t> ikke understøtter </a:t>
-            </a:r>
-            <a:r>
-              <a:rPr lang="da-DK" dirty="0" err="1"/>
-              <a:t>request-response</a:t>
-            </a:r>
-            <a:endParaRPr lang="da-DK" dirty="0"/>
-          </a:p>
-          <a:p>
-            <a:r>
-              <a:rPr lang="da-DK" dirty="0"/>
-              <a:t>Nævn at </a:t>
-            </a:r>
-            <a:r>
-              <a:rPr lang="da-DK" dirty="0" err="1"/>
-              <a:t>Rabbit</a:t>
-            </a:r>
-            <a:r>
-              <a:rPr lang="da-DK" dirty="0"/>
-              <a:t> Stream tillader en </a:t>
-            </a:r>
-            <a:r>
-              <a:rPr lang="da-DK" dirty="0" err="1"/>
-              <a:t>ligende</a:t>
-            </a:r>
-            <a:r>
-              <a:rPr lang="da-DK" dirty="0"/>
-              <a:t> opførelse som Kafka</a:t>
-            </a:r>
-          </a:p>
-          <a:p>
-            <a:r>
-              <a:rPr lang="da-DK" dirty="0"/>
-              <a:t>https://kafka.apache.org/documentation/#intro_nutshell nævner Kafka som en alternativ til </a:t>
-            </a:r>
-            <a:r>
-              <a:rPr lang="da-DK" dirty="0" err="1"/>
-              <a:t>RabbitMQ</a:t>
+            <a:pPr marL="0" marR="0" lvl="0" indent="0" algn="l" defTabSz="914400" rtl="0" eaLnBrk="1" fontAlgn="auto" latinLnBrk="0" hangingPunct="1">
+              <a:lnSpc>
+                <a:spcPct val="100000"/>
+              </a:lnSpc>
+              <a:spcBef>
+                <a:spcPts val="0"/>
+              </a:spcBef>
+              <a:spcAft>
+                <a:spcPts val="0"/>
+              </a:spcAft>
+              <a:buClrTx/>
+              <a:buSzTx/>
+              <a:buFontTx/>
+              <a:buNone/>
+              <a:tabLst/>
+              <a:defRPr/>
+            </a:pPr>
+            <a:r>
+              <a:rPr lang="da-DK" dirty="0"/>
+              <a:t>Event </a:t>
+            </a:r>
+            <a:r>
+              <a:rPr lang="da-DK" dirty="0" err="1"/>
+              <a:t>schema</a:t>
+            </a:r>
+            <a:r>
+              <a:rPr lang="da-DK" dirty="0"/>
+              <a:t> //ikke nødvendigt</a:t>
+            </a:r>
+          </a:p>
+          <a:p>
+            <a:r>
+              <a:rPr lang="da-DK" dirty="0"/>
+              <a:t>Event, noget der er sket</a:t>
+            </a:r>
+          </a:p>
+          <a:p>
+            <a:r>
+              <a:rPr lang="da-DK" dirty="0" err="1"/>
+              <a:t>Topic</a:t>
             </a:r>
             <a:r>
               <a:rPr lang="da-DK" dirty="0"/>
               <a:t> </a:t>
+            </a:r>
+            <a:r>
+              <a:rPr lang="da-DK" dirty="0" err="1"/>
+              <a:t>partitioneret</a:t>
+            </a:r>
+            <a:r>
+              <a:rPr lang="da-DK" dirty="0"/>
+              <a:t> – en </a:t>
+            </a:r>
+            <a:r>
+              <a:rPr lang="da-DK" dirty="0" err="1"/>
+              <a:t>consumer</a:t>
+            </a:r>
+            <a:r>
+              <a:rPr lang="da-DK" dirty="0"/>
+              <a:t> kan få data fra en eller flere partitioner </a:t>
+            </a:r>
+          </a:p>
+          <a:p>
+            <a:r>
+              <a:rPr lang="da-DK" dirty="0"/>
+              <a:t>Event </a:t>
+            </a:r>
+            <a:r>
+              <a:rPr lang="da-DK" dirty="0" err="1"/>
+              <a:t>Replikering</a:t>
+            </a:r>
+            <a:r>
+              <a:rPr lang="da-DK" dirty="0"/>
+              <a:t>, event er </a:t>
+            </a:r>
+            <a:r>
+              <a:rPr lang="da-DK" dirty="0" err="1"/>
+              <a:t>replikeret</a:t>
+            </a:r>
+            <a:r>
+              <a:rPr lang="da-DK" dirty="0"/>
+              <a:t> over flere brokers</a:t>
+            </a:r>
+          </a:p>
+          <a:p>
+            <a:r>
+              <a:rPr lang="da-DK" dirty="0"/>
+              <a:t>Consumer </a:t>
+            </a:r>
+            <a:r>
+              <a:rPr lang="da-DK" dirty="0" err="1"/>
+              <a:t>groupId</a:t>
+            </a:r>
+            <a:r>
+              <a:rPr lang="da-DK" dirty="0"/>
+              <a:t>, hvis samme id, </a:t>
+            </a:r>
+            <a:r>
+              <a:rPr lang="da-DK" dirty="0" err="1"/>
+              <a:t>round-robin</a:t>
+            </a:r>
+            <a:r>
+              <a:rPr lang="da-DK" dirty="0"/>
+              <a:t> fra </a:t>
+            </a:r>
+            <a:r>
+              <a:rPr lang="da-DK" dirty="0" err="1"/>
+              <a:t>partioner</a:t>
+            </a:r>
+            <a:r>
+              <a:rPr lang="da-DK" dirty="0"/>
+              <a:t> og der er mere end en partitioner</a:t>
+            </a:r>
+          </a:p>
+          <a:p>
+            <a:r>
+              <a:rPr lang="da-DK" dirty="0"/>
+              <a:t>https://stackoverflow.com/questions/38024514/understanding-kafka-topics-and-partitions</a:t>
             </a:r>
           </a:p>
         </p:txBody>
@@ -1750,7 +1743,7 @@
           <a:p>
             <a:fld id="{252E21F2-0B82-4ACE-A045-2AAC56859006}" type="slidenum">
               <a:rPr lang="da-DK" smtClean="0"/>
-              <a:t>32</a:t>
+              <a:t>29</a:t>
             </a:fld>
             <a:endParaRPr lang="da-DK"/>
           </a:p>
@@ -1759,7 +1752,7 @@
     </p:spTree>
     <p:extLst>
       <p:ext uri="{BB962C8B-B14F-4D97-AF65-F5344CB8AC3E}">
-        <p14:creationId xmlns:p14="http://schemas.microsoft.com/office/powerpoint/2010/main" val="1108710331"/>
+        <p14:creationId xmlns:p14="http://schemas.microsoft.com/office/powerpoint/2010/main" val="2764263524"/>
       </p:ext>
     </p:extLst>
   </p:cSld>
@@ -1914,43 +1907,7 @@
           <a:bodyPr/>
           <a:lstStyle/>
           <a:p>
-            <a:r>
-              <a:rPr lang="da-DK" dirty="0"/>
-              <a:t>Nævn at for </a:t>
-            </a:r>
-            <a:r>
-              <a:rPr lang="da-DK" dirty="0" err="1"/>
-              <a:t>RabbitMQ</a:t>
-            </a:r>
-            <a:r>
-              <a:rPr lang="da-DK" dirty="0"/>
-              <a:t> er der intet der tvinger en </a:t>
-            </a:r>
-            <a:r>
-              <a:rPr lang="da-DK" dirty="0" err="1"/>
-              <a:t>consumer</a:t>
-            </a:r>
-            <a:r>
-              <a:rPr lang="da-DK" dirty="0"/>
-              <a:t> at svare på en RPC</a:t>
-            </a:r>
-          </a:p>
-          <a:p>
-            <a:r>
-              <a:rPr lang="da-DK" dirty="0"/>
-              <a:t>Kafka er nok bedre for Event Collaboration/</a:t>
-            </a:r>
-            <a:r>
-              <a:rPr lang="da-DK" dirty="0" err="1"/>
-              <a:t>Sourcing</a:t>
-            </a:r>
             <a:endParaRPr lang="da-DK" dirty="0"/>
-          </a:p>
-          <a:p>
-            <a:r>
-              <a:rPr lang="da-DK" dirty="0"/>
-              <a:t>https://martinfowler.com/eaaDev/EventCollaboration.html</a:t>
-            </a:r>
           </a:p>
         </p:txBody>
       </p:sp>
@@ -1971,7 +1928,7 @@
           <a:p>
             <a:fld id="{252E21F2-0B82-4ACE-A045-2AAC56859006}" type="slidenum">
               <a:rPr lang="da-DK" smtClean="0"/>
-              <a:t>33</a:t>
+              <a:t>30</a:t>
             </a:fld>
             <a:endParaRPr lang="da-DK"/>
           </a:p>
@@ -1980,7 +1937,7 @@
     </p:spTree>
     <p:extLst>
       <p:ext uri="{BB962C8B-B14F-4D97-AF65-F5344CB8AC3E}">
-        <p14:creationId xmlns:p14="http://schemas.microsoft.com/office/powerpoint/2010/main" val="282527506"/>
+        <p14:creationId xmlns:p14="http://schemas.microsoft.com/office/powerpoint/2010/main" val="2125408469"/>
       </p:ext>
     </p:extLst>
   </p:cSld>
@@ -2036,27 +1993,332 @@
           <a:p>
             <a:r>
               <a:rPr lang="da-DK" dirty="0"/>
-              <a:t>Begge kræver at de kender hinanden.</a:t>
-            </a:r>
-          </a:p>
-          <a:p>
-            <a:r>
-              <a:rPr lang="da-DK" dirty="0"/>
-              <a:t>A kunne sende en url’en til en REST API med over</a:t>
-            </a:r>
-          </a:p>
-          <a:p>
-            <a:r>
-              <a:rPr lang="da-DK" dirty="0"/>
-              <a:t>Kafka er nok bedre hvis </a:t>
-            </a:r>
-            <a:r>
-              <a:rPr lang="da-DK" dirty="0" err="1"/>
-              <a:t>producer’en</a:t>
-            </a:r>
-            <a:r>
-              <a:rPr lang="da-DK" dirty="0"/>
-              <a:t> ikke skal reagere på </a:t>
+              <a:t>Nævn at broker nu kan være controllers, men før var det zookeeper</a:t>
+            </a:r>
+          </a:p>
+          <a:p>
+            <a:r>
+              <a:rPr lang="da-DK" dirty="0" err="1"/>
+              <a:t>ZooKeeper</a:t>
+            </a:r>
+            <a:r>
+              <a:rPr lang="da-DK" dirty="0"/>
+              <a:t> udskiftet med </a:t>
+            </a:r>
+            <a:r>
+              <a:rPr lang="da-DK" dirty="0" err="1"/>
+              <a:t>KRaft</a:t>
+            </a:r>
+            <a:r>
+              <a:rPr lang="da-DK" dirty="0"/>
+              <a:t>, en </a:t>
+            </a:r>
+            <a:r>
+              <a:rPr lang="da-DK" dirty="0" err="1"/>
+              <a:t>kafka</a:t>
+            </a:r>
+            <a:r>
+              <a:rPr lang="da-DK" dirty="0"/>
+              <a:t> server som enten er en controller, broker eller begge</a:t>
+            </a:r>
+          </a:p>
+        </p:txBody>
+      </p:sp>
+      <p:sp>
+        <p:nvSpPr>
+          <p:cNvPr id="4" name="Pladsholder til slidenummer 3"/>
+          <p:cNvSpPr>
+            <a:spLocks noGrp="1"/>
+          </p:cNvSpPr>
+          <p:nvPr>
+            <p:ph type="sldNum" sz="quarter" idx="5"/>
+          </p:nvPr>
+        </p:nvSpPr>
+        <p:spPr/>
+        <p:txBody>
+          <a:bodyPr/>
+          <a:lstStyle/>
+          <a:p>
+            <a:fld id="{252E21F2-0B82-4ACE-A045-2AAC56859006}" type="slidenum">
+              <a:rPr lang="da-DK" smtClean="0"/>
+              <a:t>31</a:t>
+            </a:fld>
+            <a:endParaRPr lang="da-DK"/>
+          </a:p>
+        </p:txBody>
+      </p:sp>
+    </p:spTree>
+    <p:extLst>
+      <p:ext uri="{BB962C8B-B14F-4D97-AF65-F5344CB8AC3E}">
+        <p14:creationId xmlns:p14="http://schemas.microsoft.com/office/powerpoint/2010/main" val="3998614641"/>
+      </p:ext>
+    </p:extLst>
+  </p:cSld>
+  <p:clrMapOvr>
+    <a:masterClrMapping/>
+  </p:clrMapOvr>
+</p:notes>
+</file>
+
+<file path=ppt/notesSlides/notesSlide22.xml><?xml version="1.0" encoding="utf-8"?>
+<p:notes xmlns:a="http://schemas.openxmlformats.org/drawingml/2006/main" xmlns:r="http://schemas.openxmlformats.org/officeDocument/2006/relationships" xmlns:p="http://schemas.openxmlformats.org/presentationml/2006/main">
+  <p:cSld>
+    <p:spTree>
+      <p:nvGrpSpPr>
+        <p:cNvPr id="1" name=""/>
+        <p:cNvGrpSpPr/>
+        <p:nvPr/>
+      </p:nvGrpSpPr>
+      <p:grpSpPr>
+        <a:xfrm>
+          <a:off x="0" y="0"/>
+          <a:ext cx="0" cy="0"/>
+          <a:chOff x="0" y="0"/>
+          <a:chExt cx="0" cy="0"/>
+        </a:xfrm>
+      </p:grpSpPr>
+      <p:sp>
+        <p:nvSpPr>
+          <p:cNvPr id="2" name="Pladsholder til slidebillede 1"/>
+          <p:cNvSpPr>
+            <a:spLocks noGrp="1" noRot="1" noChangeAspect="1"/>
+          </p:cNvSpPr>
+          <p:nvPr>
+            <p:ph type="sldImg"/>
+          </p:nvPr>
+        </p:nvSpPr>
+        <p:spPr/>
+      </p:sp>
+      <p:sp>
+        <p:nvSpPr>
+          <p:cNvPr id="3" name="Pladsholder til noter 2"/>
+          <p:cNvSpPr>
+            <a:spLocks noGrp="1"/>
+          </p:cNvSpPr>
+          <p:nvPr>
+            <p:ph type="body" idx="1"/>
+          </p:nvPr>
+        </p:nvSpPr>
+        <p:spPr/>
+        <p:txBody>
+          <a:bodyPr/>
+          <a:lstStyle/>
+          <a:p>
+            <a:r>
+              <a:rPr lang="da-DK" dirty="0" err="1"/>
+              <a:t>Confluent</a:t>
+            </a:r>
+            <a:r>
+              <a:rPr lang="da-DK" dirty="0"/>
+              <a:t> Kafka</a:t>
+            </a:r>
+          </a:p>
+          <a:p>
+            <a:r>
+              <a:rPr lang="da-DK" dirty="0"/>
+              <a:t>Kunne havde brugt </a:t>
+            </a:r>
+            <a:r>
+              <a:rPr lang="da-DK" dirty="0" err="1"/>
+              <a:t>Knet</a:t>
+            </a:r>
+            <a:endParaRPr lang="da-DK" dirty="0"/>
+          </a:p>
+          <a:p>
+            <a:r>
+              <a:rPr lang="da-DK" dirty="0"/>
+              <a:t>JSON, </a:t>
+            </a:r>
+            <a:r>
+              <a:rPr lang="da-DK" dirty="0" err="1"/>
+              <a:t>Arvo</a:t>
+            </a:r>
+            <a:r>
+              <a:rPr lang="da-DK" dirty="0"/>
+              <a:t>, </a:t>
+            </a:r>
+            <a:r>
+              <a:rPr lang="da-DK" dirty="0" err="1"/>
+              <a:t>Protobuf</a:t>
+            </a:r>
+            <a:r>
+              <a:rPr lang="da-DK" dirty="0"/>
+              <a:t>. </a:t>
+            </a:r>
+            <a:r>
+              <a:rPr lang="da-DK" dirty="0" err="1"/>
+              <a:t>Arvo</a:t>
+            </a:r>
+            <a:r>
+              <a:rPr lang="da-DK" dirty="0"/>
+              <a:t> brugt, da den virker til at være det mest </a:t>
+            </a:r>
+            <a:r>
+              <a:rPr lang="da-DK" dirty="0" err="1"/>
+              <a:t>almendlige</a:t>
+            </a:r>
+            <a:r>
+              <a:rPr lang="da-DK" dirty="0"/>
+              <a:t>. </a:t>
+            </a:r>
+            <a:r>
+              <a:rPr lang="da-DK" dirty="0" err="1"/>
+              <a:t>Arvo</a:t>
+            </a:r>
+            <a:r>
+              <a:rPr lang="da-DK" dirty="0"/>
+              <a:t> er Apache</a:t>
+            </a:r>
+          </a:p>
+          <a:p>
+            <a:r>
+              <a:rPr lang="da-DK" dirty="0"/>
+              <a:t>Key/Value, Key bruges til at sikre sig at beskeder sendes til den samme partition</a:t>
+            </a:r>
+          </a:p>
+          <a:p>
+            <a:r>
+              <a:rPr lang="da-DK" dirty="0"/>
+              <a:t>https://github.com/confluentinc/cp-all-in-one/blob/7.6.1-post/cp-all-in-one-kraft/docker-compose.yml</a:t>
+            </a:r>
+          </a:p>
+        </p:txBody>
+      </p:sp>
+      <p:sp>
+        <p:nvSpPr>
+          <p:cNvPr id="4" name="Pladsholder til slidenummer 3"/>
+          <p:cNvSpPr>
+            <a:spLocks noGrp="1"/>
+          </p:cNvSpPr>
+          <p:nvPr>
+            <p:ph type="sldNum" sz="quarter" idx="5"/>
+          </p:nvPr>
+        </p:nvSpPr>
+        <p:spPr/>
+        <p:txBody>
+          <a:bodyPr/>
+          <a:lstStyle/>
+          <a:p>
+            <a:fld id="{252E21F2-0B82-4ACE-A045-2AAC56859006}" type="slidenum">
+              <a:rPr lang="da-DK" smtClean="0"/>
+              <a:t>32</a:t>
+            </a:fld>
+            <a:endParaRPr lang="da-DK"/>
+          </a:p>
+        </p:txBody>
+      </p:sp>
+    </p:spTree>
+    <p:extLst>
+      <p:ext uri="{BB962C8B-B14F-4D97-AF65-F5344CB8AC3E}">
+        <p14:creationId xmlns:p14="http://schemas.microsoft.com/office/powerpoint/2010/main" val="3004894068"/>
+      </p:ext>
+    </p:extLst>
+  </p:cSld>
+  <p:clrMapOvr>
+    <a:masterClrMapping/>
+  </p:clrMapOvr>
+</p:notes>
+</file>
+
+<file path=ppt/notesSlides/notesSlide23.xml><?xml version="1.0" encoding="utf-8"?>
+<p:notes xmlns:a="http://schemas.openxmlformats.org/drawingml/2006/main" xmlns:r="http://schemas.openxmlformats.org/officeDocument/2006/relationships" xmlns:p="http://schemas.openxmlformats.org/presentationml/2006/main">
+  <p:cSld>
+    <p:spTree>
+      <p:nvGrpSpPr>
+        <p:cNvPr id="1" name=""/>
+        <p:cNvGrpSpPr/>
+        <p:nvPr/>
+      </p:nvGrpSpPr>
+      <p:grpSpPr>
+        <a:xfrm>
+          <a:off x="0" y="0"/>
+          <a:ext cx="0" cy="0"/>
+          <a:chOff x="0" y="0"/>
+          <a:chExt cx="0" cy="0"/>
+        </a:xfrm>
+      </p:grpSpPr>
+      <p:sp>
+        <p:nvSpPr>
+          <p:cNvPr id="2" name="Pladsholder til slidebillede 1"/>
+          <p:cNvSpPr>
+            <a:spLocks noGrp="1" noRot="1" noChangeAspect="1"/>
+          </p:cNvSpPr>
+          <p:nvPr>
+            <p:ph type="sldImg"/>
+          </p:nvPr>
+        </p:nvSpPr>
+        <p:spPr/>
+      </p:sp>
+      <p:sp>
+        <p:nvSpPr>
+          <p:cNvPr id="3" name="Pladsholder til noter 2"/>
+          <p:cNvSpPr>
+            <a:spLocks noGrp="1"/>
+          </p:cNvSpPr>
+          <p:nvPr>
+            <p:ph type="body" idx="1"/>
+          </p:nvPr>
+        </p:nvSpPr>
+        <p:spPr/>
+        <p:txBody>
+          <a:bodyPr/>
+          <a:lstStyle/>
+          <a:p>
+            <a:r>
+              <a:rPr lang="da-DK" dirty="0"/>
+              <a:t>Remote Procedure </a:t>
+            </a:r>
+            <a:r>
+              <a:rPr lang="da-DK" dirty="0" err="1"/>
+              <a:t>Cal</a:t>
+            </a:r>
+            <a:endParaRPr lang="da-DK" dirty="0"/>
+          </a:p>
+          <a:p>
+            <a:r>
+              <a:rPr lang="da-DK" dirty="0"/>
+              <a:t>Nævn at </a:t>
+            </a:r>
+            <a:r>
+              <a:rPr lang="da-DK" dirty="0" err="1"/>
+              <a:t>kafka</a:t>
+            </a:r>
+            <a:r>
+              <a:rPr lang="da-DK" dirty="0"/>
+              <a:t> ikke understøtter </a:t>
+            </a:r>
+            <a:r>
+              <a:rPr lang="da-DK" dirty="0" err="1"/>
+              <a:t>request-response</a:t>
+            </a:r>
+            <a:endParaRPr lang="da-DK" dirty="0"/>
+          </a:p>
+          <a:p>
+            <a:r>
+              <a:rPr lang="da-DK" dirty="0"/>
+              <a:t>Nævn at </a:t>
+            </a:r>
+            <a:r>
+              <a:rPr lang="da-DK" dirty="0" err="1"/>
+              <a:t>Rabbit</a:t>
+            </a:r>
+            <a:r>
+              <a:rPr lang="da-DK" dirty="0"/>
+              <a:t> Stream tillader en </a:t>
+            </a:r>
+            <a:r>
+              <a:rPr lang="da-DK" dirty="0" err="1"/>
+              <a:t>ligende</a:t>
+            </a:r>
+            <a:r>
+              <a:rPr lang="da-DK" dirty="0"/>
+              <a:t> opførelse som Kafka</a:t>
+            </a:r>
+          </a:p>
+          <a:p>
+            <a:r>
+              <a:rPr lang="da-DK" dirty="0"/>
+              <a:t>Korrekt opsætning af producer, </a:t>
             </a:r>
             <a:r>
               <a:rPr lang="da-DK" dirty="0" err="1"/>
@@ -2064,7 +2326,203 @@
             </a:r>
             <a:r>
               <a:rPr lang="da-DK" dirty="0"/>
+              <a:t> og partitioner tillader </a:t>
+            </a:r>
+            <a:r>
+              <a:rPr lang="da-DK" dirty="0" err="1"/>
+              <a:t>round-robin</a:t>
+            </a:r>
+            <a:r>
+              <a:rPr lang="da-DK" dirty="0"/>
+              <a:t> i Kafka. Flere </a:t>
+            </a:r>
+            <a:r>
+              <a:rPr lang="da-DK" dirty="0" err="1"/>
+              <a:t>consumer</a:t>
+            </a:r>
+            <a:r>
+              <a:rPr lang="da-DK" dirty="0"/>
+              <a:t> end partitioner, nogle </a:t>
+            </a:r>
+            <a:r>
+              <a:rPr lang="da-DK" dirty="0" err="1"/>
+              <a:t>consumer</a:t>
+            </a:r>
+            <a:r>
+              <a:rPr lang="da-DK" dirty="0"/>
+              <a:t> får intet data</a:t>
+            </a:r>
+          </a:p>
+          <a:p>
+            <a:r>
+              <a:rPr lang="da-DK" dirty="0"/>
+              <a:t>Kafka </a:t>
+            </a:r>
+            <a:r>
+              <a:rPr lang="da-DK" dirty="0" err="1"/>
+              <a:t>consumer</a:t>
+            </a:r>
+            <a:r>
+              <a:rPr lang="da-DK" dirty="0"/>
+              <a:t> kan læse enten læse events efter opstart eller også dem før. </a:t>
+            </a:r>
+            <a:r>
+              <a:rPr lang="da-DK" dirty="0" err="1"/>
+              <a:t>RabbitMQ</a:t>
+            </a:r>
+            <a:r>
+              <a:rPr lang="da-DK" dirty="0"/>
               <a:t> </a:t>
+            </a:r>
+            <a:r>
+              <a:rPr lang="da-DK" dirty="0" err="1"/>
+              <a:t>consumer</a:t>
+            </a:r>
+            <a:r>
+              <a:rPr lang="da-DK" dirty="0"/>
+              <a:t> læser beskeder i </a:t>
+            </a:r>
+            <a:r>
+              <a:rPr lang="da-DK" dirty="0" err="1"/>
+              <a:t>quenen</a:t>
+            </a:r>
+            <a:r>
+              <a:rPr lang="da-DK" dirty="0"/>
+              <a:t>. </a:t>
+            </a:r>
+          </a:p>
+          <a:p>
+            <a:r>
+              <a:rPr lang="da-DK" dirty="0"/>
+              <a:t>https://kafka.apache.org/documentation/#intro_nutshell nævner Kafka som en alternativ til </a:t>
+            </a:r>
+            <a:r>
+              <a:rPr lang="da-DK" dirty="0" err="1"/>
+              <a:t>RabbitMQ</a:t>
+            </a:r>
+            <a:r>
+              <a:rPr lang="da-DK" dirty="0"/>
+              <a:t> </a:t>
+            </a:r>
+          </a:p>
+        </p:txBody>
+      </p:sp>
+      <p:sp>
+        <p:nvSpPr>
+          <p:cNvPr id="4" name="Pladsholder til slidenummer 3"/>
+          <p:cNvSpPr>
+            <a:spLocks noGrp="1"/>
+          </p:cNvSpPr>
+          <p:nvPr>
+            <p:ph type="sldNum" sz="quarter" idx="5"/>
+          </p:nvPr>
+        </p:nvSpPr>
+        <p:spPr/>
+        <p:txBody>
+          <a:bodyPr/>
+          <a:lstStyle/>
+          <a:p>
+            <a:fld id="{252E21F2-0B82-4ACE-A045-2AAC56859006}" type="slidenum">
+              <a:rPr lang="da-DK" smtClean="0"/>
+              <a:t>33</a:t>
+            </a:fld>
+            <a:endParaRPr lang="da-DK"/>
+          </a:p>
+        </p:txBody>
+      </p:sp>
+    </p:spTree>
+    <p:extLst>
+      <p:ext uri="{BB962C8B-B14F-4D97-AF65-F5344CB8AC3E}">
+        <p14:creationId xmlns:p14="http://schemas.microsoft.com/office/powerpoint/2010/main" val="1108710331"/>
+      </p:ext>
+    </p:extLst>
+  </p:cSld>
+  <p:clrMapOvr>
+    <a:masterClrMapping/>
+  </p:clrMapOvr>
+</p:notes>
+</file>
+
+<file path=ppt/notesSlides/notesSlide24.xml><?xml version="1.0" encoding="utf-8"?>
+<p:notes xmlns:a="http://schemas.openxmlformats.org/drawingml/2006/main" xmlns:r="http://schemas.openxmlformats.org/officeDocument/2006/relationships" xmlns:p="http://schemas.openxmlformats.org/presentationml/2006/main">
+  <p:cSld>
+    <p:spTree>
+      <p:nvGrpSpPr>
+        <p:cNvPr id="1" name=""/>
+        <p:cNvGrpSpPr/>
+        <p:nvPr/>
+      </p:nvGrpSpPr>
+      <p:grpSpPr>
+        <a:xfrm>
+          <a:off x="0" y="0"/>
+          <a:ext cx="0" cy="0"/>
+          <a:chOff x="0" y="0"/>
+          <a:chExt cx="0" cy="0"/>
+        </a:xfrm>
+      </p:grpSpPr>
+      <p:sp>
+        <p:nvSpPr>
+          <p:cNvPr id="2" name="Pladsholder til slidebillede 1"/>
+          <p:cNvSpPr>
+            <a:spLocks noGrp="1" noRot="1" noChangeAspect="1"/>
+          </p:cNvSpPr>
+          <p:nvPr>
+            <p:ph type="sldImg"/>
+          </p:nvPr>
+        </p:nvSpPr>
+        <p:spPr/>
+      </p:sp>
+      <p:sp>
+        <p:nvSpPr>
+          <p:cNvPr id="3" name="Pladsholder til noter 2"/>
+          <p:cNvSpPr>
+            <a:spLocks noGrp="1"/>
+          </p:cNvSpPr>
+          <p:nvPr>
+            <p:ph type="body" idx="1"/>
+          </p:nvPr>
+        </p:nvSpPr>
+        <p:spPr/>
+        <p:txBody>
+          <a:bodyPr/>
+          <a:lstStyle/>
+          <a:p>
+            <a:r>
+              <a:rPr lang="da-DK" dirty="0"/>
+              <a:t>Nævn at for </a:t>
+            </a:r>
+            <a:r>
+              <a:rPr lang="da-DK" dirty="0" err="1"/>
+              <a:t>RabbitMQ</a:t>
+            </a:r>
+            <a:r>
+              <a:rPr lang="da-DK" dirty="0"/>
+              <a:t> er der intet der tvinger en </a:t>
+            </a:r>
+            <a:r>
+              <a:rPr lang="da-DK" dirty="0" err="1"/>
+              <a:t>consumer</a:t>
+            </a:r>
+            <a:r>
+              <a:rPr lang="da-DK" dirty="0"/>
+              <a:t> at svare på en RPC</a:t>
+            </a:r>
+          </a:p>
+          <a:p>
+            <a:r>
+              <a:rPr lang="da-DK" dirty="0"/>
+              <a:t>Kafka er nok bedre for Event Collaboration/</a:t>
+            </a:r>
+            <a:r>
+              <a:rPr lang="da-DK" dirty="0" err="1"/>
+              <a:t>Sourcing</a:t>
+            </a:r>
+            <a:endParaRPr lang="da-DK" dirty="0"/>
+          </a:p>
+          <a:p>
+            <a:r>
+              <a:rPr lang="da-DK" dirty="0"/>
+              <a:t>https://martinfowler.com/eaaDev/EventCollaboration.html</a:t>
             </a:r>
           </a:p>
         </p:txBody>
@@ -2087,6 +2545,121 @@
             <a:fld id="{252E21F2-0B82-4ACE-A045-2AAC56859006}" type="slidenum">
               <a:rPr lang="da-DK" smtClean="0"/>
               <a:t>34</a:t>
+            </a:fld>
+            <a:endParaRPr lang="da-DK"/>
+          </a:p>
+        </p:txBody>
+      </p:sp>
+    </p:spTree>
+    <p:extLst>
+      <p:ext uri="{BB962C8B-B14F-4D97-AF65-F5344CB8AC3E}">
+        <p14:creationId xmlns:p14="http://schemas.microsoft.com/office/powerpoint/2010/main" val="282527506"/>
+      </p:ext>
+    </p:extLst>
+  </p:cSld>
+  <p:clrMapOvr>
+    <a:masterClrMapping/>
+  </p:clrMapOvr>
+</p:notes>
+</file>
+
+<file path=ppt/notesSlides/notesSlide25.xml><?xml version="1.0" encoding="utf-8"?>
+<p:notes xmlns:a="http://schemas.openxmlformats.org/drawingml/2006/main" xmlns:r="http://schemas.openxmlformats.org/officeDocument/2006/relationships" xmlns:p="http://schemas.openxmlformats.org/presentationml/2006/main">
+  <p:cSld>
+    <p:spTree>
+      <p:nvGrpSpPr>
+        <p:cNvPr id="1" name=""/>
+        <p:cNvGrpSpPr/>
+        <p:nvPr/>
+      </p:nvGrpSpPr>
+      <p:grpSpPr>
+        <a:xfrm>
+          <a:off x="0" y="0"/>
+          <a:ext cx="0" cy="0"/>
+          <a:chOff x="0" y="0"/>
+          <a:chExt cx="0" cy="0"/>
+        </a:xfrm>
+      </p:grpSpPr>
+      <p:sp>
+        <p:nvSpPr>
+          <p:cNvPr id="2" name="Pladsholder til slidebillede 1"/>
+          <p:cNvSpPr>
+            <a:spLocks noGrp="1" noRot="1" noChangeAspect="1"/>
+          </p:cNvSpPr>
+          <p:nvPr>
+            <p:ph type="sldImg"/>
+          </p:nvPr>
+        </p:nvSpPr>
+        <p:spPr/>
+      </p:sp>
+      <p:sp>
+        <p:nvSpPr>
+          <p:cNvPr id="3" name="Pladsholder til noter 2"/>
+          <p:cNvSpPr>
+            <a:spLocks noGrp="1"/>
+          </p:cNvSpPr>
+          <p:nvPr>
+            <p:ph type="body" idx="1"/>
+          </p:nvPr>
+        </p:nvSpPr>
+        <p:spPr/>
+        <p:txBody>
+          <a:bodyPr/>
+          <a:lstStyle/>
+          <a:p>
+            <a:r>
+              <a:rPr lang="da-DK" dirty="0"/>
+              <a:t>Begge kræver at de kender hinanden.</a:t>
+            </a:r>
+          </a:p>
+          <a:p>
+            <a:r>
+              <a:rPr lang="da-DK" dirty="0"/>
+              <a:t>A kunne sende en url’en til en REST API med over</a:t>
+            </a:r>
+          </a:p>
+          <a:p>
+            <a:r>
+              <a:rPr lang="da-DK" dirty="0"/>
+              <a:t>Kafka er nok bedre hvis </a:t>
+            </a:r>
+            <a:r>
+              <a:rPr lang="da-DK" dirty="0" err="1"/>
+              <a:t>producer’en</a:t>
+            </a:r>
+            <a:r>
+              <a:rPr lang="da-DK" dirty="0"/>
+              <a:t> ikke skal reagere på </a:t>
+            </a:r>
+            <a:r>
+              <a:rPr lang="da-DK" dirty="0" err="1"/>
+              <a:t>consumer</a:t>
+            </a:r>
+            <a:r>
+              <a:rPr lang="da-DK" dirty="0"/>
+              <a:t> </a:t>
+            </a:r>
+          </a:p>
+        </p:txBody>
+      </p:sp>
+      <p:sp>
+        <p:nvSpPr>
+          <p:cNvPr id="4" name="Pladsholder til slidenummer 3"/>
+          <p:cNvSpPr>
+            <a:spLocks noGrp="1"/>
+          </p:cNvSpPr>
+          <p:nvPr>
+            <p:ph type="sldNum" sz="quarter" idx="5"/>
+          </p:nvPr>
+        </p:nvSpPr>
+        <p:spPr/>
+        <p:txBody>
+          <a:bodyPr/>
+          <a:lstStyle/>
+          <a:p>
+            <a:fld id="{252E21F2-0B82-4ACE-A045-2AAC56859006}" type="slidenum">
+              <a:rPr lang="da-DK" smtClean="0"/>
+              <a:t>35</a:t>
             </a:fld>
             <a:endParaRPr lang="da-DK"/>
           </a:p>
@@ -2150,6 +2723,30 @@
           <a:lstStyle/>
           <a:p>
             <a:r>
+              <a:rPr lang="da-DK" dirty="0"/>
+              <a:t>Nedarvning ude -&gt; ind</a:t>
+            </a:r>
+          </a:p>
+          <a:p>
+            <a:r>
+              <a:rPr lang="da-DK" dirty="0" err="1"/>
+              <a:t>Infrastucture</a:t>
+            </a:r>
+            <a:r>
+              <a:rPr lang="da-DK" dirty="0"/>
+              <a:t> -&gt; </a:t>
+            </a:r>
+            <a:r>
+              <a:rPr lang="da-DK" dirty="0" err="1"/>
+              <a:t>entityframework</a:t>
+            </a:r>
+            <a:endParaRPr lang="da-DK" dirty="0"/>
+          </a:p>
+          <a:p>
+            <a:endParaRPr lang="da-DK" dirty="0"/>
+          </a:p>
+          <a:p>
+            <a:r>
               <a:rPr lang="da-DK" dirty="0" err="1"/>
               <a:t>Onion</a:t>
             </a:r>
@@ -2779,6 +3376,53 @@
             </a:r>
             <a:endParaRPr lang="da-DK" dirty="0"/>
           </a:p>
+          <a:p>
+            <a:r>
+              <a:rPr lang="da-DK" dirty="0" err="1"/>
+              <a:t>IAggregateRoot</a:t>
+            </a:r>
+            <a:r>
+              <a:rPr lang="da-DK" dirty="0"/>
+              <a:t> og </a:t>
+            </a:r>
+            <a:r>
+              <a:rPr lang="da-DK" dirty="0" err="1"/>
+              <a:t>ReferenceId</a:t>
+            </a:r>
+            <a:r>
+              <a:rPr lang="da-DK" dirty="0"/>
+              <a:t>, hjælpe med at styre hvad er en rod (for </a:t>
+            </a:r>
+            <a:r>
+              <a:rPr lang="da-DK" dirty="0" err="1"/>
+              <a:t>entiyframework</a:t>
+            </a:r>
+            <a:r>
+              <a:rPr lang="da-DK" dirty="0"/>
+              <a:t>) og </a:t>
+            </a:r>
+            <a:r>
+              <a:rPr lang="da-DK" dirty="0" err="1"/>
+              <a:t>referenceId</a:t>
+            </a:r>
+            <a:r>
+              <a:rPr lang="da-DK" dirty="0"/>
+              <a:t> kan være </a:t>
+            </a:r>
+            <a:r>
+              <a:rPr lang="da-DK" dirty="0" err="1"/>
+              <a:t>burgbart</a:t>
+            </a:r>
+            <a:r>
+              <a:rPr lang="da-DK" dirty="0"/>
+              <a:t> for komplekse </a:t>
+            </a:r>
+            <a:r>
+              <a:rPr lang="da-DK" dirty="0" err="1"/>
+              <a:t>id’er</a:t>
+            </a:r>
+            <a:endParaRPr lang="da-DK" dirty="0"/>
+          </a:p>
         </p:txBody>
       </p:sp>
       <p:sp>
@@ -2861,16 +3505,7 @@
           <a:bodyPr/>
           <a:lstStyle/>
           <a:p>
-            <a:r>
-              <a:rPr lang="da-DK" dirty="0"/>
-              <a:t>https://martinfowler.com/bliki/UbiquitousLanguage.html</a:t>
-            </a:r>
-          </a:p>
-          <a:p>
-            <a:r>
-              <a:rPr lang="da-DK" dirty="0"/>
-              <a:t>https://martinfowler.com/bliki/BoundedContext.html</a:t>
-            </a:r>
+            <a:endParaRPr lang="da-DK" dirty="0"/>
           </a:p>
         </p:txBody>
       </p:sp>
@@ -2891,7 +3526,7 @@
           <a:p>
             <a:fld id="{252E21F2-0B82-4ACE-A045-2AAC56859006}" type="slidenum">
               <a:rPr lang="da-DK" smtClean="0"/>
-              <a:t>15</a:t>
+              <a:t>14</a:t>
             </a:fld>
             <a:endParaRPr lang="da-DK"/>
           </a:p>
@@ -2900,7 +3535,7 @@
     </p:spTree>
     <p:extLst>
       <p:ext uri="{BB962C8B-B14F-4D97-AF65-F5344CB8AC3E}">
-        <p14:creationId xmlns:p14="http://schemas.microsoft.com/office/powerpoint/2010/main" val="2568857346"/>
+        <p14:creationId xmlns:p14="http://schemas.microsoft.com/office/powerpoint/2010/main" val="2313198539"/>
       </p:ext>
     </p:extLst>
   </p:cSld>
@@ -2956,69 +3591,41 @@
           <a:p>
             <a:r>
               <a:rPr lang="da-DK" dirty="0"/>
-              <a:t>Channels tillader at benytte en enkel TCP forbindelse. Intet kommunikation mellem </a:t>
-            </a:r>
-            <a:r>
-              <a:rPr lang="da-DK" dirty="0" err="1"/>
-              <a:t>channels</a:t>
-            </a:r>
-            <a:r>
-              <a:rPr lang="da-DK" dirty="0"/>
-              <a:t>. Normalt en </a:t>
-            </a:r>
-            <a:r>
-              <a:rPr lang="da-DK" dirty="0" err="1"/>
-              <a:t>kannal</a:t>
-            </a:r>
-            <a:r>
-              <a:rPr lang="da-DK" dirty="0"/>
-              <a:t> per tråd </a:t>
-            </a:r>
-          </a:p>
-          <a:p>
-            <a:r>
-              <a:rPr lang="da-DK" dirty="0" err="1"/>
-              <a:t>Streams</a:t>
-            </a:r>
-            <a:r>
-              <a:rPr lang="da-DK" dirty="0"/>
-              <a:t> fjerner ikke beskeder. Kan bruges til at sende besked til flere </a:t>
-            </a:r>
-            <a:r>
-              <a:rPr lang="da-DK" dirty="0" err="1"/>
-              <a:t>consumers</a:t>
-            </a:r>
+              <a:t>User og Customer deler Id, navn og lokation. Id skal altid være det samme</a:t>
+            </a:r>
+          </a:p>
+          <a:p>
+            <a:r>
+              <a:rPr lang="da-DK" dirty="0" err="1"/>
+              <a:t>CompanyName</a:t>
+            </a:r>
+            <a:r>
+              <a:rPr lang="da-DK" dirty="0"/>
+              <a:t> og </a:t>
+            </a:r>
+            <a:r>
+              <a:rPr lang="da-DK" dirty="0" err="1"/>
+              <a:t>CustomerName</a:t>
+            </a:r>
+            <a:r>
+              <a:rPr lang="da-DK" dirty="0"/>
+              <a:t> er for at undgå at skulle slå op i begge databaser </a:t>
+            </a:r>
+          </a:p>
+          <a:p>
             <a:endParaRPr lang="da-DK" dirty="0"/>
           </a:p>
           <a:p>
             <a:r>
               <a:rPr lang="da-DK" dirty="0"/>
-              <a:t>Queue </a:t>
-            </a:r>
-            <a:r>
-              <a:rPr lang="da-DK" dirty="0" err="1"/>
-              <a:t>ordered</a:t>
-            </a:r>
-            <a:r>
-              <a:rPr lang="da-DK" dirty="0"/>
-              <a:t> samling af beskeder, FIFO. </a:t>
-            </a:r>
-            <a:r>
-              <a:rPr lang="da-DK" dirty="0" err="1"/>
-              <a:t>Enqueued</a:t>
-            </a:r>
-            <a:r>
-              <a:rPr lang="da-DK" dirty="0"/>
-              <a:t>, </a:t>
-            </a:r>
-            <a:r>
-              <a:rPr lang="da-DK" dirty="0" err="1"/>
-              <a:t>dequeued</a:t>
-            </a:r>
-            <a:endParaRPr lang="da-DK" dirty="0"/>
-          </a:p>
-          <a:p>
-            <a:endParaRPr lang="da-DK" dirty="0"/>
+              <a:t>https://martinfowler.com/bliki/UbiquitousLanguage.html</a:t>
+            </a:r>
+          </a:p>
+          <a:p>
+            <a:r>
+              <a:rPr lang="da-DK" dirty="0"/>
+              <a:t>https://martinfowler.com/bliki/BoundedContext.html</a:t>
+            </a:r>
           </a:p>
         </p:txBody>
       </p:sp>
@@ -3039,7 +3646,7 @@
           <a:p>
             <a:fld id="{252E21F2-0B82-4ACE-A045-2AAC56859006}" type="slidenum">
               <a:rPr lang="da-DK" smtClean="0"/>
-              <a:t>18</a:t>
+              <a:t>15</a:t>
             </a:fld>
             <a:endParaRPr lang="da-DK"/>
           </a:p>
@@ -3048,7 +3655,7 @@
     </p:spTree>
     <p:extLst>
       <p:ext uri="{BB962C8B-B14F-4D97-AF65-F5344CB8AC3E}">
-        <p14:creationId xmlns:p14="http://schemas.microsoft.com/office/powerpoint/2010/main" val="1091159589"/>
+        <p14:creationId xmlns:p14="http://schemas.microsoft.com/office/powerpoint/2010/main" val="2568857346"/>
       </p:ext>
     </p:extLst>
   </p:cSld>
@@ -3228,7 +3835,7 @@
           <a:p>
             <a:fld id="{904F8374-DDA3-4289-A3C4-A561B6E67BA2}" type="datetimeFigureOut">
               <a:rPr lang="da-DK" smtClean="0"/>
-              <a:t>08-05-2024</a:t>
+              <a:t>09-05-2024</a:t>
             </a:fld>
             <a:endParaRPr lang="da-DK"/>
           </a:p>
@@ -3495,7 +4102,7 @@
           <a:p>
             <a:fld id="{904F8374-DDA3-4289-A3C4-A561B6E67BA2}" type="datetimeFigureOut">
               <a:rPr lang="da-DK" smtClean="0"/>
-              <a:t>08-05-2024</a:t>
+              <a:t>09-05-2024</a:t>
             </a:fld>
             <a:endParaRPr lang="da-DK"/>
           </a:p>
@@ -3726,7 +4333,7 @@
           <a:p>
             <a:fld id="{904F8374-DDA3-4289-A3C4-A561B6E67BA2}" type="datetimeFigureOut">
               <a:rPr lang="da-DK" smtClean="0"/>
-              <a:t>08-05-2024</a:t>
+              <a:t>09-05-2024</a:t>
             </a:fld>
             <a:endParaRPr lang="da-DK"/>
           </a:p>
@@ -4036,7 +4643,7 @@
           <a:p>
             <a:fld id="{904F8374-DDA3-4289-A3C4-A561B6E67BA2}" type="datetimeFigureOut">
               <a:rPr lang="da-DK" smtClean="0"/>
-              <a:t>08-05-2024</a:t>
+              <a:t>09-05-2024</a:t>
             </a:fld>
             <a:endParaRPr lang="da-DK"/>
           </a:p>
@@ -4509,7 +5116,7 @@
           <a:p>
             <a:fld id="{904F8374-DDA3-4289-A3C4-A561B6E67BA2}" type="datetimeFigureOut">
               <a:rPr lang="da-DK" smtClean="0"/>
-              <a:t>08-05-2024</a:t>
+              <a:t>09-05-2024</a:t>
             </a:fld>
             <a:endParaRPr lang="da-DK"/>
           </a:p>
@@ -5056,7 +5663,7 @@
           <a:p>
             <a:fld id="{904F8374-DDA3-4289-A3C4-A561B6E67BA2}" type="datetimeFigureOut">
               <a:rPr lang="da-DK" smtClean="0"/>
-              <a:t>08-05-2024</a:t>
+              <a:t>09-05-2024</a:t>
             </a:fld>
             <a:endParaRPr lang="da-DK"/>
           </a:p>
@@ -5830,7 +6437,7 @@
           <a:p>
             <a:fld id="{904F8374-DDA3-4289-A3C4-A561B6E67BA2}" type="datetimeFigureOut">
               <a:rPr lang="da-DK" smtClean="0"/>
-              <a:t>08-05-2024</a:t>
+              <a:t>09-05-2024</a:t>
             </a:fld>
             <a:endParaRPr lang="da-DK"/>
           </a:p>
@@ -6005,7 +6612,7 @@
           <a:p>
             <a:fld id="{904F8374-DDA3-4289-A3C4-A561B6E67BA2}" type="datetimeFigureOut">
               <a:rPr lang="da-DK" smtClean="0"/>
-              <a:t>08-05-2024</a:t>
+              <a:t>09-05-2024</a:t>
             </a:fld>
             <a:endParaRPr lang="da-DK"/>
           </a:p>
@@ -6228,7 +6835,7 @@
           <a:p>
             <a:fld id="{904F8374-DDA3-4289-A3C4-A561B6E67BA2}" type="datetimeFigureOut">
               <a:rPr lang="da-DK" smtClean="0"/>
-              <a:t>08-05-2024</a:t>
+              <a:t>09-05-2024</a:t>
             </a:fld>
             <a:endParaRPr lang="da-DK"/>
           </a:p>
@@ -6408,7 +7015,7 @@
           <a:p>
             <a:fld id="{904F8374-DDA3-4289-A3C4-A561B6E67BA2}" type="datetimeFigureOut">
               <a:rPr lang="da-DK" smtClean="0"/>
-              <a:t>08-05-2024</a:t>
+              <a:t>09-05-2024</a:t>
             </a:fld>
             <a:endParaRPr lang="da-DK"/>
           </a:p>
@@ -6697,7 +7304,7 @@
           <a:p>
             <a:fld id="{904F8374-DDA3-4289-A3C4-A561B6E67BA2}" type="datetimeFigureOut">
               <a:rPr lang="da-DK" smtClean="0"/>
-              <a:t>08-05-2024</a:t>
+              <a:t>09-05-2024</a:t>
             </a:fld>
             <a:endParaRPr lang="da-DK"/>
           </a:p>
@@ -6939,7 +7546,7 @@
           <a:p>
             <a:fld id="{904F8374-DDA3-4289-A3C4-A561B6E67BA2}" type="datetimeFigureOut">
               <a:rPr lang="da-DK" smtClean="0"/>
-              <a:t>08-05-2024</a:t>
+              <a:t>09-05-2024</a:t>
             </a:fld>
             <a:endParaRPr lang="da-DK"/>
           </a:p>
@@ -7318,7 +7925,7 @@
           <a:p>
             <a:fld id="{904F8374-DDA3-4289-A3C4-A561B6E67BA2}" type="datetimeFigureOut">
               <a:rPr lang="da-DK" smtClean="0"/>
-              <a:t>08-05-2024</a:t>
+              <a:t>09-05-2024</a:t>
             </a:fld>
             <a:endParaRPr lang="da-DK"/>
           </a:p>
@@ -7436,7 +8043,7 @@
           <a:p>
             <a:fld id="{904F8374-DDA3-4289-A3C4-A561B6E67BA2}" type="datetimeFigureOut">
               <a:rPr lang="da-DK" smtClean="0"/>
-              <a:t>08-05-2024</a:t>
+              <a:t>09-05-2024</a:t>
             </a:fld>
             <a:endParaRPr lang="da-DK"/>
           </a:p>
@@ -7531,7 +8138,7 @@
           <a:p>
             <a:fld id="{904F8374-DDA3-4289-A3C4-A561B6E67BA2}" type="datetimeFigureOut">
               <a:rPr lang="da-DK" smtClean="0"/>
-              <a:t>08-05-2024</a:t>
+              <a:t>09-05-2024</a:t>
             </a:fld>
             <a:endParaRPr lang="da-DK"/>
           </a:p>
@@ -7780,7 +8387,7 @@
           <a:p>
             <a:fld id="{904F8374-DDA3-4289-A3C4-A561B6E67BA2}" type="datetimeFigureOut">
               <a:rPr lang="da-DK" smtClean="0"/>
-              <a:t>08-05-2024</a:t>
+              <a:t>09-05-2024</a:t>
             </a:fld>
             <a:endParaRPr lang="da-DK"/>
           </a:p>
@@ -8037,7 +8644,7 @@
           <a:p>
             <a:fld id="{904F8374-DDA3-4289-A3C4-A561B6E67BA2}" type="datetimeFigureOut">
               <a:rPr lang="da-DK" smtClean="0"/>
-              <a:t>08-05-2024</a:t>
+              <a:t>09-05-2024</a:t>
             </a:fld>
             <a:endParaRPr lang="da-DK"/>
           </a:p>
@@ -8280,7 +8887,7 @@
           <a:p>
             <a:fld id="{904F8374-DDA3-4289-A3C4-A561B6E67BA2}" type="datetimeFigureOut">
               <a:rPr lang="da-DK" smtClean="0"/>
-              <a:t>08-05-2024</a:t>
+              <a:t>09-05-2024</a:t>
             </a:fld>
             <a:endParaRPr lang="da-DK"/>
           </a:p>
@@ -9278,6 +9885,12 @@
               <a:t>Uforanderlig</a:t>
             </a:r>
           </a:p>
+          <a:p>
+            <a:r>
+              <a:rPr lang="da-DK" dirty="0"/>
+              <a:t>Kan have forretningslogik</a:t>
+            </a:r>
+          </a:p>
         </p:txBody>
       </p:sp>
       <p:sp>
@@ -9658,6 +10271,12 @@
               <a:t>Ikke så godt for mindre projekter</a:t>
             </a:r>
           </a:p>
+          <a:p>
+            <a:r>
+              <a:rPr lang="da-DK" dirty="0"/>
+              <a:t>Håndtering af datakonsistens, eventuelt</a:t>
+            </a:r>
+          </a:p>
         </p:txBody>
       </p:sp>
     </p:spTree>
@@ -10797,7 +11416,7 @@
           <p:cNvPr id="2" name="Titel 1">
             <a:extLst>
               <a:ext uri="{FF2B5EF4-FFF2-40B4-BE49-F238E27FC236}">
-                <a16:creationId xmlns:a16="http://schemas.microsoft.com/office/drawing/2014/main" id="{9AD4A813-A89A-825A-72FF-FA237F2E8B70}"/>
+                <a16:creationId xmlns:a16="http://schemas.microsoft.com/office/drawing/2014/main" id="{FFEC5993-EFA9-A519-83CC-AF07225CE353}"/>
               </a:ext>
             </a:extLst>
           </p:cNvPr>
@@ -10808,54 +11427,20 @@
             <p:ph type="title"/>
           </p:nvPr>
         </p:nvSpPr>
-        <p:spPr/>
-        <p:txBody>
-          <a:bodyPr/>
-          <a:lstStyle/>
-          <a:p>
-            <a:r>
-              <a:rPr lang="da-DK"/>
-              <a:t>Konklusion?</a:t>
-            </a:r>
-          </a:p>
-        </p:txBody>
-      </p:sp>
-      <p:sp>
-        <p:nvSpPr>
-          <p:cNvPr id="3" name="Pladsholder til indhold 2">
-            <a:extLst>
-              <a:ext uri="{FF2B5EF4-FFF2-40B4-BE49-F238E27FC236}">
-                <a16:creationId xmlns:a16="http://schemas.microsoft.com/office/drawing/2014/main" id="{4273B0C1-65DB-7237-D931-F20125F6C970}"/>
-              </a:ext>
-            </a:extLst>
-          </p:cNvPr>
-          <p:cNvSpPr>
-            <a:spLocks noGrp="1"/>
-          </p:cNvSpPr>
-          <p:nvPr>
-            <p:ph idx="1"/>
-          </p:nvPr>
-        </p:nvSpPr>
-        <p:spPr/>
-        <p:txBody>
-          <a:bodyPr/>
-          <a:lstStyle/>
-          <a:p>
-            <a:r>
-              <a:rPr lang="da-DK" dirty="0"/>
-              <a:t>Produktet læste problemformulering</a:t>
-            </a:r>
-          </a:p>
-          <a:p>
-            <a:r>
-              <a:rPr lang="da-DK" dirty="0"/>
-              <a:t>Har mangler før det ville kunne bruges i virkeligheden</a:t>
-            </a:r>
-          </a:p>
-          <a:p>
-            <a:r>
-              <a:rPr lang="da-DK" dirty="0"/>
-              <a:t>Er mere hen af en prototype</a:t>
+        <p:spPr>
+          <a:xfrm>
+            <a:off x="0" y="0"/>
+            <a:ext cx="12192000" cy="6857999"/>
+          </a:xfrm>
+        </p:spPr>
+        <p:txBody>
+          <a:bodyPr/>
+          <a:lstStyle/>
+          <a:p>
+            <a:pPr algn="ctr"/>
+            <a:r>
+              <a:rPr lang="da-DK" dirty="0"/>
+              <a:t>Konklusion</a:t>
             </a:r>
           </a:p>
         </p:txBody>
@@ -10863,7 +11448,7 @@
     </p:spTree>
     <p:extLst>
       <p:ext uri="{BB962C8B-B14F-4D97-AF65-F5344CB8AC3E}">
-        <p14:creationId xmlns:p14="http://schemas.microsoft.com/office/powerpoint/2010/main" val="2542655594"/>
+        <p14:creationId xmlns:p14="http://schemas.microsoft.com/office/powerpoint/2010/main" val="1632765315"/>
       </p:ext>
     </p:extLst>
   </p:cSld>
@@ -10895,6 +11480,154 @@
           <p:cNvPr id="2" name="Titel 1">
             <a:extLst>
               <a:ext uri="{FF2B5EF4-FFF2-40B4-BE49-F238E27FC236}">
+                <a16:creationId xmlns:a16="http://schemas.microsoft.com/office/drawing/2014/main" id="{9AD4A813-A89A-825A-72FF-FA237F2E8B70}"/>
+              </a:ext>
+            </a:extLst>
+          </p:cNvPr>
+          <p:cNvSpPr>
+            <a:spLocks noGrp="1"/>
+          </p:cNvSpPr>
+          <p:nvPr>
+            <p:ph type="title"/>
+          </p:nvPr>
+        </p:nvSpPr>
+        <p:spPr/>
+        <p:txBody>
+          <a:bodyPr/>
+          <a:lstStyle/>
+          <a:p>
+            <a:r>
+              <a:rPr lang="da-DK" dirty="0"/>
+              <a:t>Konklusion</a:t>
+            </a:r>
+          </a:p>
+        </p:txBody>
+      </p:sp>
+      <p:sp>
+        <p:nvSpPr>
+          <p:cNvPr id="3" name="Pladsholder til indhold 2">
+            <a:extLst>
+              <a:ext uri="{FF2B5EF4-FFF2-40B4-BE49-F238E27FC236}">
+                <a16:creationId xmlns:a16="http://schemas.microsoft.com/office/drawing/2014/main" id="{4273B0C1-65DB-7237-D931-F20125F6C970}"/>
+              </a:ext>
+            </a:extLst>
+          </p:cNvPr>
+          <p:cNvSpPr>
+            <a:spLocks noGrp="1"/>
+          </p:cNvSpPr>
+          <p:nvPr>
+            <p:ph idx="1"/>
+          </p:nvPr>
+        </p:nvSpPr>
+        <p:spPr/>
+        <p:txBody>
+          <a:bodyPr/>
+          <a:lstStyle/>
+          <a:p>
+            <a:r>
+              <a:rPr lang="da-DK" dirty="0"/>
+              <a:t>Produktet læste problemformulering</a:t>
+            </a:r>
+          </a:p>
+          <a:p>
+            <a:pPr lvl="1"/>
+            <a:r>
+              <a:rPr lang="da-DK" dirty="0"/>
+              <a:t>Kundeoprettelse</a:t>
+            </a:r>
+          </a:p>
+          <a:p>
+            <a:pPr lvl="1"/>
+            <a:r>
+              <a:rPr lang="da-DK" dirty="0"/>
+              <a:t>Menu-bestilling</a:t>
+            </a:r>
+          </a:p>
+          <a:p>
+            <a:pPr lvl="1"/>
+            <a:r>
+              <a:rPr lang="da-DK" dirty="0"/>
+              <a:t>Menu og ret oprettelse</a:t>
+            </a:r>
+          </a:p>
+          <a:p>
+            <a:pPr lvl="1"/>
+            <a:r>
+              <a:rPr lang="da-DK" dirty="0"/>
+              <a:t>Se ordrer </a:t>
+            </a:r>
+          </a:p>
+          <a:p>
+            <a:r>
+              <a:rPr lang="da-DK" dirty="0"/>
+              <a:t>Har mangler før det ville kunne bruges i virkeligheden</a:t>
+            </a:r>
+          </a:p>
+          <a:p>
+            <a:pPr lvl="1"/>
+            <a:r>
+              <a:rPr lang="da-DK" dirty="0"/>
+              <a:t>Sikkerhed</a:t>
+            </a:r>
+          </a:p>
+          <a:p>
+            <a:pPr lvl="1"/>
+            <a:r>
+              <a:rPr lang="da-DK" dirty="0" err="1"/>
+              <a:t>Frontend</a:t>
+            </a:r>
+            <a:endParaRPr lang="da-DK" dirty="0"/>
+          </a:p>
+          <a:p>
+            <a:pPr lvl="1"/>
+            <a:r>
+              <a:rPr lang="da-DK" dirty="0"/>
+              <a:t>Betaling </a:t>
+            </a:r>
+          </a:p>
+          <a:p>
+            <a:r>
+              <a:rPr lang="da-DK" dirty="0"/>
+              <a:t>Er mere hen af en prototype</a:t>
+            </a:r>
+          </a:p>
+        </p:txBody>
+      </p:sp>
+    </p:spTree>
+    <p:extLst>
+      <p:ext uri="{BB962C8B-B14F-4D97-AF65-F5344CB8AC3E}">
+        <p14:creationId xmlns:p14="http://schemas.microsoft.com/office/powerpoint/2010/main" val="2542655594"/>
+      </p:ext>
+    </p:extLst>
+  </p:cSld>
+  <p:clrMapOvr>
+    <a:masterClrMapping/>
+  </p:clrMapOvr>
+</p:sld>
+</file>
+
+<file path=ppt/slides/slide27.xml><?xml version="1.0" encoding="utf-8"?>
+<p:sld xmlns:a="http://schemas.openxmlformats.org/drawingml/2006/main" xmlns:r="http://schemas.openxmlformats.org/officeDocument/2006/relationships" xmlns:p="http://schemas.openxmlformats.org/presentationml/2006/main">
+  <p:cSld>
+    <p:spTree>
+      <p:nvGrpSpPr>
+        <p:cNvPr id="1" name=""/>
+        <p:cNvGrpSpPr/>
+        <p:nvPr/>
+      </p:nvGrpSpPr>
+      <p:grpSpPr>
+        <a:xfrm>
+          <a:off x="0" y="0"/>
+          <a:ext cx="0" cy="0"/>
+          <a:chOff x="0" y="0"/>
+          <a:chExt cx="0" cy="0"/>
+        </a:xfrm>
+      </p:grpSpPr>
+      <p:sp>
+        <p:nvSpPr>
+          <p:cNvPr id="2" name="Titel 1">
+            <a:extLst>
+              <a:ext uri="{FF2B5EF4-FFF2-40B4-BE49-F238E27FC236}">
                 <a16:creationId xmlns:a16="http://schemas.microsoft.com/office/drawing/2014/main" id="{FFEC5993-EFA9-A519-83CC-AF07225CE353}"/>
               </a:ext>
             </a:extLst>
@@ -10944,7 +11677,7 @@
 </p:sld>
 </file>
 
-<file path=ppt/slides/slide27.xml><?xml version="1.0" encoding="utf-8"?>
+<file path=ppt/slides/slide28.xml><?xml version="1.0" encoding="utf-8"?>
 <p:sld xmlns:a="http://schemas.openxmlformats.org/drawingml/2006/main" xmlns:r="http://schemas.openxmlformats.org/officeDocument/2006/relationships" xmlns:p="http://schemas.openxmlformats.org/presentationml/2006/main" show="0">
   <p:cSld>
     <p:spTree>
@@ -11072,142 +11805,6 @@
     <p:extLst>
       <p:ext uri="{BB962C8B-B14F-4D97-AF65-F5344CB8AC3E}">
         <p14:creationId xmlns:p14="http://schemas.microsoft.com/office/powerpoint/2010/main" val="4027690829"/>
-      </p:ext>
-    </p:extLst>
-  </p:cSld>
-  <p:clrMapOvr>
-    <a:masterClrMapping/>
-  </p:clrMapOvr>
-</p:sld>
-</file>
-
-<file path=ppt/slides/slide28.xml><?xml version="1.0" encoding="utf-8"?>
-<p:sld xmlns:a="http://schemas.openxmlformats.org/drawingml/2006/main" xmlns:r="http://schemas.openxmlformats.org/officeDocument/2006/relationships" xmlns:p="http://schemas.openxmlformats.org/presentationml/2006/main">
-  <p:cSld>
-    <p:spTree>
-      <p:nvGrpSpPr>
-        <p:cNvPr id="1" name=""/>
-        <p:cNvGrpSpPr/>
-        <p:nvPr/>
-      </p:nvGrpSpPr>
-      <p:grpSpPr>
-        <a:xfrm>
-          <a:off x="0" y="0"/>
-          <a:ext cx="0" cy="0"/>
-          <a:chOff x="0" y="0"/>
-          <a:chExt cx="0" cy="0"/>
-        </a:xfrm>
-      </p:grpSpPr>
-      <p:sp>
-        <p:nvSpPr>
-          <p:cNvPr id="8" name="Titel 7">
-            <a:extLst>
-              <a:ext uri="{FF2B5EF4-FFF2-40B4-BE49-F238E27FC236}">
-                <a16:creationId xmlns:a16="http://schemas.microsoft.com/office/drawing/2014/main" id="{964C56D4-D3DF-1B49-7986-BDEB15B6AF6E}"/>
-              </a:ext>
-            </a:extLst>
-          </p:cNvPr>
-          <p:cNvSpPr>
-            <a:spLocks noGrp="1"/>
-          </p:cNvSpPr>
-          <p:nvPr>
-            <p:ph type="title"/>
-          </p:nvPr>
-        </p:nvSpPr>
-        <p:spPr/>
-        <p:txBody>
-          <a:bodyPr/>
-          <a:lstStyle/>
-          <a:p>
-            <a:r>
-              <a:rPr lang="da-DK" dirty="0"/>
-              <a:t>Apache Kafka - Hvad Er</a:t>
-            </a:r>
-          </a:p>
-        </p:txBody>
-      </p:sp>
-      <p:sp>
-        <p:nvSpPr>
-          <p:cNvPr id="9" name="Pladsholder til indhold 8">
-            <a:extLst>
-              <a:ext uri="{FF2B5EF4-FFF2-40B4-BE49-F238E27FC236}">
-                <a16:creationId xmlns:a16="http://schemas.microsoft.com/office/drawing/2014/main" id="{084956D3-F9BC-364C-BE60-DE221C9ECB77}"/>
-              </a:ext>
-            </a:extLst>
-          </p:cNvPr>
-          <p:cNvSpPr>
-            <a:spLocks noGrp="1"/>
-          </p:cNvSpPr>
-          <p:nvPr>
-            <p:ph idx="1"/>
-          </p:nvPr>
-        </p:nvSpPr>
-        <p:spPr/>
-        <p:txBody>
-          <a:bodyPr/>
-          <a:lstStyle/>
-          <a:p>
-            <a:r>
-              <a:rPr lang="da-DK" dirty="0"/>
-              <a:t>Åben-kilde event streaming platform</a:t>
-            </a:r>
-          </a:p>
-          <a:p>
-            <a:r>
-              <a:rPr lang="da-DK" dirty="0"/>
-              <a:t>Event</a:t>
-            </a:r>
-          </a:p>
-          <a:p>
-            <a:r>
-              <a:rPr lang="da-DK" dirty="0" err="1"/>
-              <a:t>Topic</a:t>
-            </a:r>
-            <a:endParaRPr lang="da-DK" dirty="0"/>
-          </a:p>
-          <a:p>
-            <a:pPr lvl="1"/>
-            <a:r>
-              <a:rPr lang="da-DK" dirty="0" err="1"/>
-              <a:t>Partitioneret</a:t>
-            </a:r>
-            <a:endParaRPr lang="da-DK" dirty="0"/>
-          </a:p>
-          <a:p>
-            <a:r>
-              <a:rPr lang="da-DK" dirty="0"/>
-              <a:t>Kommunikation via TCP</a:t>
-            </a:r>
-          </a:p>
-          <a:p>
-            <a:r>
-              <a:rPr lang="da-DK" dirty="0"/>
-              <a:t>Server/Klient kommunikation</a:t>
-            </a:r>
-          </a:p>
-          <a:p>
-            <a:r>
-              <a:rPr lang="da-DK" dirty="0"/>
-              <a:t>Event </a:t>
-            </a:r>
-            <a:r>
-              <a:rPr lang="da-DK" dirty="0" err="1"/>
-              <a:t>replikering</a:t>
-            </a:r>
-            <a:r>
-              <a:rPr lang="da-DK" dirty="0"/>
-              <a:t> </a:t>
-            </a:r>
-          </a:p>
-          <a:p>
-            <a:endParaRPr lang="da-DK" dirty="0"/>
-          </a:p>
-        </p:txBody>
-      </p:sp>
-    </p:spTree>
-    <p:extLst>
-      <p:ext uri="{BB962C8B-B14F-4D97-AF65-F5344CB8AC3E}">
-        <p14:creationId xmlns:p14="http://schemas.microsoft.com/office/powerpoint/2010/main" val="2863351694"/>
       </p:ext>
     </p:extLst>
   </p:cSld>
@@ -11257,7 +11854,7 @@
           <a:p>
             <a:r>
               <a:rPr lang="da-DK" dirty="0"/>
-              <a:t>Apache Kafka - API</a:t>
+              <a:t>Apache Kafka - Hvad Er</a:t>
             </a:r>
           </a:p>
         </p:txBody>
@@ -11275,37 +11872,60 @@
             <a:spLocks noGrp="1"/>
           </p:cNvSpPr>
           <p:nvPr>
-            <p:ph sz="half" idx="1"/>
-          </p:nvPr>
-        </p:nvSpPr>
-        <p:spPr/>
-        <p:txBody>
-          <a:bodyPr>
-            <a:normAutofit/>
-          </a:bodyPr>
-          <a:lstStyle/>
-          <a:p>
-            <a:r>
-              <a:rPr lang="da-DK" dirty="0" err="1"/>
-              <a:t>Admin</a:t>
-            </a:r>
-            <a:r>
-              <a:rPr lang="da-DK" dirty="0"/>
-              <a:t> API </a:t>
-            </a:r>
+            <p:ph idx="1"/>
+          </p:nvPr>
+        </p:nvSpPr>
+        <p:spPr/>
+        <p:txBody>
+          <a:bodyPr/>
+          <a:lstStyle/>
+          <a:p>
+            <a:r>
+              <a:rPr lang="da-DK" dirty="0"/>
+              <a:t>Åben-kilde event streaming platform</a:t>
+            </a:r>
+          </a:p>
+          <a:p>
+            <a:r>
+              <a:rPr lang="da-DK" dirty="0"/>
+              <a:t>Event</a:t>
+            </a:r>
+          </a:p>
+          <a:p>
+            <a:r>
+              <a:rPr lang="da-DK" dirty="0" err="1"/>
+              <a:t>Topic</a:t>
+            </a:r>
+            <a:endParaRPr lang="da-DK" dirty="0"/>
           </a:p>
           <a:p>
             <a:pPr lvl="1"/>
             <a:r>
-              <a:rPr lang="da-DK" dirty="0"/>
-              <a:t>Styring og inspicere af </a:t>
-            </a:r>
-          </a:p>
-          <a:p>
-            <a:pPr lvl="2"/>
-            <a:r>
-              <a:rPr lang="da-DK" dirty="0" err="1"/>
-              <a:t>Topics</a:t>
+              <a:rPr lang="da-DK" dirty="0" err="1"/>
+              <a:t>Partitioneret</a:t>
+            </a:r>
+            <a:endParaRPr lang="da-DK" dirty="0"/>
+          </a:p>
+          <a:p>
+            <a:r>
+              <a:rPr lang="da-DK" dirty="0"/>
+              <a:t>Kommunikation via TCP</a:t>
+            </a:r>
+          </a:p>
+          <a:p>
+            <a:r>
+              <a:rPr lang="da-DK" dirty="0"/>
+              <a:t>Server/Klient kommunikation</a:t>
+            </a:r>
+          </a:p>
+          <a:p>
+            <a:r>
+              <a:rPr lang="da-DK" dirty="0"/>
+              <a:t>Event </a:t>
+            </a:r>
+            <a:r>
+              <a:rPr lang="da-DK" dirty="0" err="1"/>
+              <a:t>replikering</a:t>
             </a:r>
             <a:r>
               <a:rPr lang="da-DK" dirty="0"/>
@@ -11313,111 +11933,23 @@
             </a:r>
           </a:p>
           <a:p>
-            <a:pPr lvl="2"/>
-            <a:r>
-              <a:rPr lang="da-DK" dirty="0"/>
-              <a:t>Brokers </a:t>
-            </a:r>
-          </a:p>
-          <a:p>
-            <a:pPr lvl="2"/>
-            <a:r>
-              <a:rPr lang="da-DK" dirty="0"/>
-              <a:t>Andre Kafka objekter</a:t>
-            </a:r>
-          </a:p>
-          <a:p>
-            <a:r>
-              <a:rPr lang="da-DK" dirty="0"/>
-              <a:t>Producer API</a:t>
-            </a:r>
-          </a:p>
-          <a:p>
-            <a:pPr lvl="1"/>
-            <a:r>
-              <a:rPr lang="da-DK" dirty="0"/>
-              <a:t>Skrivning af events</a:t>
-            </a:r>
-          </a:p>
-        </p:txBody>
-      </p:sp>
-      <p:sp>
-        <p:nvSpPr>
-          <p:cNvPr id="2" name="Pladsholder til indhold 1">
-            <a:extLst>
-              <a:ext uri="{FF2B5EF4-FFF2-40B4-BE49-F238E27FC236}">
-                <a16:creationId xmlns:a16="http://schemas.microsoft.com/office/drawing/2014/main" id="{B3D68E9F-7A13-0520-7007-D08D335AD623}"/>
-              </a:ext>
-            </a:extLst>
-          </p:cNvPr>
-          <p:cNvSpPr>
-            <a:spLocks noGrp="1"/>
-          </p:cNvSpPr>
-          <p:nvPr>
-            <p:ph sz="half" idx="2"/>
-          </p:nvPr>
-        </p:nvSpPr>
-        <p:spPr/>
-        <p:txBody>
-          <a:bodyPr>
-            <a:normAutofit/>
-          </a:bodyPr>
-          <a:lstStyle/>
-          <a:p>
-            <a:r>
-              <a:rPr lang="da-DK" dirty="0"/>
-              <a:t>Consumer API</a:t>
-            </a:r>
-          </a:p>
-          <a:p>
-            <a:pPr lvl="1"/>
-            <a:r>
-              <a:rPr lang="da-DK" dirty="0"/>
-              <a:t>Læsning af event</a:t>
-            </a:r>
-          </a:p>
-          <a:p>
-            <a:r>
-              <a:rPr lang="da-DK" dirty="0" err="1"/>
-              <a:t>Streams</a:t>
-            </a:r>
-            <a:r>
-              <a:rPr lang="da-DK" dirty="0"/>
-              <a:t> API</a:t>
-            </a:r>
-          </a:p>
-          <a:p>
-            <a:pPr lvl="1"/>
-            <a:r>
-              <a:rPr lang="da-DK" dirty="0"/>
-              <a:t>Processering af event </a:t>
-            </a:r>
-            <a:r>
-              <a:rPr lang="da-DK" dirty="0" err="1"/>
-              <a:t>streams</a:t>
-            </a:r>
-            <a:r>
-              <a:rPr lang="da-DK" dirty="0"/>
-              <a:t> applikationer og </a:t>
-            </a:r>
-            <a:r>
-              <a:rPr lang="da-DK" dirty="0" err="1"/>
-              <a:t>microseriver</a:t>
-            </a:r>
-            <a:endParaRPr lang="da-DK" dirty="0"/>
-          </a:p>
-          <a:p>
-            <a:pPr marL="0" indent="0">
-              <a:buNone/>
-            </a:pPr>
-            <a:endParaRPr lang="da-DK" dirty="0"/>
+            <a:r>
+              <a:rPr lang="da-DK" dirty="0"/>
+              <a:t>Consumer</a:t>
+            </a:r>
+          </a:p>
+          <a:p>
+            <a:r>
+              <a:rPr lang="da-DK" dirty="0"/>
+              <a:t>Producer</a:t>
+            </a:r>
           </a:p>
         </p:txBody>
       </p:sp>
     </p:spTree>
     <p:extLst>
       <p:ext uri="{BB962C8B-B14F-4D97-AF65-F5344CB8AC3E}">
-        <p14:creationId xmlns:p14="http://schemas.microsoft.com/office/powerpoint/2010/main" val="122632923"/>
+        <p14:creationId xmlns:p14="http://schemas.microsoft.com/office/powerpoint/2010/main" val="2863351694"/>
       </p:ext>
     </p:extLst>
   </p:cSld>
@@ -11527,7 +12059,7 @@
 </file>
 
 <file path=ppt/slides/slide30.xml><?xml version="1.0" encoding="utf-8"?>
-<p:sld xmlns:a="http://schemas.openxmlformats.org/drawingml/2006/main" xmlns:r="http://schemas.openxmlformats.org/officeDocument/2006/relationships" xmlns:p="http://schemas.openxmlformats.org/presentationml/2006/main">
+<p:sld xmlns:a="http://schemas.openxmlformats.org/drawingml/2006/main" xmlns:r="http://schemas.openxmlformats.org/officeDocument/2006/relationships" xmlns:p="http://schemas.openxmlformats.org/presentationml/2006/main" show="0">
   <p:cSld>
     <p:spTree>
       <p:nvGrpSpPr>
@@ -11566,7 +12098,7 @@
           <a:p>
             <a:r>
               <a:rPr lang="da-DK" dirty="0"/>
-              <a:t>Apache Kafka - Dele</a:t>
+              <a:t>Apache Kafka - API</a:t>
             </a:r>
           </a:p>
         </p:txBody>
@@ -11584,7 +12116,7 @@
             <a:spLocks noGrp="1"/>
           </p:cNvSpPr>
           <p:nvPr>
-            <p:ph idx="1"/>
+            <p:ph sz="half" idx="1"/>
           </p:nvPr>
         </p:nvSpPr>
         <p:spPr/>
@@ -11595,101 +12127,125 @@
           <a:lstStyle/>
           <a:p>
             <a:r>
-              <a:rPr lang="da-DK" dirty="0"/>
-              <a:t>Broker</a:t>
+              <a:rPr lang="da-DK" dirty="0" err="1"/>
+              <a:t>Admin</a:t>
+            </a:r>
+            <a:r>
+              <a:rPr lang="da-DK" dirty="0"/>
+              <a:t> API </a:t>
             </a:r>
           </a:p>
           <a:p>
             <a:pPr lvl="1"/>
             <a:r>
               <a:rPr lang="da-DK" dirty="0"/>
-              <a:t>Lager servicer</a:t>
-            </a:r>
-          </a:p>
-          <a:p>
-            <a:r>
-              <a:rPr lang="da-DK" dirty="0"/>
-              <a:t>Controller </a:t>
+              <a:t>Styring og inspicere af </a:t>
+            </a:r>
+          </a:p>
+          <a:p>
+            <a:pPr lvl="2"/>
+            <a:r>
+              <a:rPr lang="da-DK" dirty="0" err="1"/>
+              <a:t>Topics</a:t>
+            </a:r>
+            <a:r>
+              <a:rPr lang="da-DK" dirty="0"/>
+              <a:t> </a:t>
+            </a:r>
+          </a:p>
+          <a:p>
+            <a:pPr lvl="2"/>
+            <a:r>
+              <a:rPr lang="da-DK" dirty="0"/>
+              <a:t>Brokers </a:t>
+            </a:r>
+          </a:p>
+          <a:p>
+            <a:pPr lvl="2"/>
+            <a:r>
+              <a:rPr lang="da-DK" dirty="0"/>
+              <a:t>Andre Kafka objekter</a:t>
+            </a:r>
+          </a:p>
+          <a:p>
+            <a:r>
+              <a:rPr lang="da-DK" dirty="0"/>
+              <a:t>Producer API</a:t>
             </a:r>
           </a:p>
           <a:p>
             <a:pPr lvl="1"/>
             <a:r>
               <a:rPr lang="da-DK" dirty="0"/>
-              <a:t>Styre at events bliver </a:t>
-            </a:r>
-            <a:r>
-              <a:rPr lang="da-DK" dirty="0" err="1"/>
-              <a:t>replikeret</a:t>
-            </a:r>
-            <a:r>
-              <a:rPr lang="da-DK" dirty="0"/>
-              <a:t> og administrative opgaver</a:t>
-            </a:r>
-          </a:p>
-          <a:p>
-            <a:r>
-              <a:rPr lang="da-DK" dirty="0"/>
-              <a:t>Stream</a:t>
+              <a:t>Skrivning af events</a:t>
+            </a:r>
+          </a:p>
+        </p:txBody>
+      </p:sp>
+      <p:sp>
+        <p:nvSpPr>
+          <p:cNvPr id="2" name="Pladsholder til indhold 1">
+            <a:extLst>
+              <a:ext uri="{FF2B5EF4-FFF2-40B4-BE49-F238E27FC236}">
+                <a16:creationId xmlns:a16="http://schemas.microsoft.com/office/drawing/2014/main" id="{B3D68E9F-7A13-0520-7007-D08D335AD623}"/>
+              </a:ext>
+            </a:extLst>
+          </p:cNvPr>
+          <p:cNvSpPr>
+            <a:spLocks noGrp="1"/>
+          </p:cNvSpPr>
+          <p:nvPr>
+            <p:ph sz="half" idx="2"/>
+          </p:nvPr>
+        </p:nvSpPr>
+        <p:spPr/>
+        <p:txBody>
+          <a:bodyPr>
+            <a:normAutofit/>
+          </a:bodyPr>
+          <a:lstStyle/>
+          <a:p>
+            <a:r>
+              <a:rPr lang="da-DK" dirty="0"/>
+              <a:t>Consumer API</a:t>
             </a:r>
           </a:p>
           <a:p>
             <a:pPr lvl="1"/>
             <a:r>
               <a:rPr lang="da-DK" dirty="0"/>
-              <a:t>Real-Time transformering og berigelse af events</a:t>
-            </a:r>
-          </a:p>
-          <a:p>
-            <a:r>
-              <a:rPr lang="da-DK" dirty="0" err="1"/>
-              <a:t>Schema</a:t>
-            </a:r>
-            <a:r>
-              <a:rPr lang="da-DK" dirty="0"/>
-              <a:t> Registry</a:t>
+              <a:t>Læsning af event</a:t>
+            </a:r>
+          </a:p>
+          <a:p>
+            <a:r>
+              <a:rPr lang="da-DK" dirty="0" err="1"/>
+              <a:t>Streams</a:t>
+            </a:r>
+            <a:r>
+              <a:rPr lang="da-DK" dirty="0"/>
+              <a:t> API</a:t>
             </a:r>
           </a:p>
           <a:p>
             <a:pPr lvl="1"/>
             <a:r>
               <a:rPr lang="da-DK" dirty="0"/>
-              <a:t>Dataskema for </a:t>
-            </a:r>
-            <a:r>
-              <a:rPr lang="da-DK" dirty="0" err="1"/>
-              <a:t>topics</a:t>
+              <a:t>Processering af event </a:t>
+            </a:r>
+            <a:r>
+              <a:rPr lang="da-DK" dirty="0" err="1"/>
+              <a:t>streams</a:t>
+            </a:r>
+            <a:r>
+              <a:rPr lang="da-DK" dirty="0"/>
+              <a:t> applikationer og </a:t>
+            </a:r>
+            <a:r>
+              <a:rPr lang="da-DK" dirty="0" err="1"/>
+              <a:t>microseriver</a:t>
             </a:r>
             <a:endParaRPr lang="da-DK" dirty="0"/>
-          </a:p>
-          <a:p>
-            <a:r>
-              <a:rPr lang="da-DK" dirty="0"/>
-              <a:t>Connect</a:t>
-            </a:r>
-          </a:p>
-          <a:p>
-            <a:pPr lvl="1"/>
-            <a:r>
-              <a:rPr lang="da-DK" dirty="0"/>
-              <a:t>Data import/</a:t>
-            </a:r>
-            <a:r>
-              <a:rPr lang="da-DK" dirty="0" err="1"/>
-              <a:t>export</a:t>
-            </a:r>
-            <a:r>
-              <a:rPr lang="da-DK" dirty="0"/>
-              <a:t> for event stream til og fra </a:t>
-            </a:r>
-            <a:r>
-              <a:rPr lang="da-DK" dirty="0" err="1"/>
-              <a:t>externe</a:t>
-            </a:r>
-            <a:r>
-              <a:rPr lang="da-DK" dirty="0"/>
-              <a:t> systemer</a:t>
-            </a:r>
           </a:p>
           <a:p>
             <a:pPr marL="0" indent="0">
@@ -11702,7 +12258,7 @@
     </p:spTree>
     <p:extLst>
       <p:ext uri="{BB962C8B-B14F-4D97-AF65-F5344CB8AC3E}">
-        <p14:creationId xmlns:p14="http://schemas.microsoft.com/office/powerpoint/2010/main" val="3462775647"/>
+        <p14:creationId xmlns:p14="http://schemas.microsoft.com/office/powerpoint/2010/main" val="122632923"/>
       </p:ext>
     </p:extLst>
   </p:cSld>
@@ -11731,10 +12287,10 @@
       </p:grpSpPr>
       <p:sp>
         <p:nvSpPr>
-          <p:cNvPr id="2" name="Titel 1">
+          <p:cNvPr id="8" name="Titel 7">
             <a:extLst>
               <a:ext uri="{FF2B5EF4-FFF2-40B4-BE49-F238E27FC236}">
-                <a16:creationId xmlns:a16="http://schemas.microsoft.com/office/drawing/2014/main" id="{FFEC5993-EFA9-A519-83CC-AF07225CE353}"/>
+                <a16:creationId xmlns:a16="http://schemas.microsoft.com/office/drawing/2014/main" id="{964C56D4-D3DF-1B49-7986-BDEB15B6AF6E}"/>
               </a:ext>
             </a:extLst>
           </p:cNvPr>
@@ -11745,35 +12301,150 @@
             <p:ph type="title"/>
           </p:nvPr>
         </p:nvSpPr>
-        <p:spPr>
-          <a:xfrm>
-            <a:off x="0" y="0"/>
-            <a:ext cx="12192000" cy="6857999"/>
-          </a:xfrm>
-        </p:spPr>
-        <p:txBody>
-          <a:bodyPr/>
-          <a:lstStyle/>
-          <a:p>
-            <a:pPr algn="ctr"/>
-            <a:r>
-              <a:rPr lang="da-DK" dirty="0"/>
-              <a:t>Demo</a:t>
-            </a:r>
-            <a:br>
-              <a:rPr lang="da-DK" dirty="0"/>
-            </a:br>
-            <a:r>
-              <a:rPr lang="da-DK" dirty="0"/>
-              <a:t>Kafka</a:t>
-            </a:r>
+        <p:spPr/>
+        <p:txBody>
+          <a:bodyPr/>
+          <a:lstStyle/>
+          <a:p>
+            <a:r>
+              <a:rPr lang="da-DK" dirty="0"/>
+              <a:t>Apache Kafka - Dele</a:t>
+            </a:r>
+          </a:p>
+        </p:txBody>
+      </p:sp>
+      <p:sp>
+        <p:nvSpPr>
+          <p:cNvPr id="9" name="Pladsholder til indhold 8">
+            <a:extLst>
+              <a:ext uri="{FF2B5EF4-FFF2-40B4-BE49-F238E27FC236}">
+                <a16:creationId xmlns:a16="http://schemas.microsoft.com/office/drawing/2014/main" id="{084956D3-F9BC-364C-BE60-DE221C9ECB77}"/>
+              </a:ext>
+            </a:extLst>
+          </p:cNvPr>
+          <p:cNvSpPr>
+            <a:spLocks noGrp="1"/>
+          </p:cNvSpPr>
+          <p:nvPr>
+            <p:ph idx="1"/>
+          </p:nvPr>
+        </p:nvSpPr>
+        <p:spPr/>
+        <p:txBody>
+          <a:bodyPr>
+            <a:normAutofit/>
+          </a:bodyPr>
+          <a:lstStyle/>
+          <a:p>
+            <a:r>
+              <a:rPr lang="da-DK" dirty="0"/>
+              <a:t>Broker</a:t>
+            </a:r>
+          </a:p>
+          <a:p>
+            <a:pPr lvl="1"/>
+            <a:r>
+              <a:rPr lang="da-DK" dirty="0"/>
+              <a:t>Lager servicer</a:t>
+            </a:r>
+          </a:p>
+          <a:p>
+            <a:r>
+              <a:rPr lang="da-DK" dirty="0"/>
+              <a:t>Controller </a:t>
+            </a:r>
+          </a:p>
+          <a:p>
+            <a:pPr lvl="1"/>
+            <a:r>
+              <a:rPr lang="da-DK" dirty="0"/>
+              <a:t>Styre at events bliver </a:t>
+            </a:r>
+            <a:r>
+              <a:rPr lang="da-DK" dirty="0" err="1"/>
+              <a:t>replikeret</a:t>
+            </a:r>
+            <a:r>
+              <a:rPr lang="da-DK" dirty="0"/>
+              <a:t> og administrative opgaver</a:t>
+            </a:r>
+          </a:p>
+          <a:p>
+            <a:r>
+              <a:rPr lang="da-DK" dirty="0"/>
+              <a:t>Stream</a:t>
+            </a:r>
+          </a:p>
+          <a:p>
+            <a:pPr lvl="1"/>
+            <a:r>
+              <a:rPr lang="da-DK" dirty="0"/>
+              <a:t>Real-Time transformering og berigelse af events</a:t>
+            </a:r>
+          </a:p>
+          <a:p>
+            <a:r>
+              <a:rPr lang="da-DK" dirty="0" err="1"/>
+              <a:t>Schema</a:t>
+            </a:r>
+            <a:r>
+              <a:rPr lang="da-DK" dirty="0"/>
+              <a:t> Registry</a:t>
+            </a:r>
+          </a:p>
+          <a:p>
+            <a:pPr lvl="1"/>
+            <a:r>
+              <a:rPr lang="da-DK" dirty="0"/>
+              <a:t>Dataskema for </a:t>
+            </a:r>
+            <a:r>
+              <a:rPr lang="da-DK" dirty="0" err="1"/>
+              <a:t>topics</a:t>
+            </a:r>
+            <a:endParaRPr lang="da-DK" dirty="0"/>
+          </a:p>
+          <a:p>
+            <a:r>
+              <a:rPr lang="da-DK" dirty="0"/>
+              <a:t>Connect</a:t>
+            </a:r>
+          </a:p>
+          <a:p>
+            <a:pPr lvl="1"/>
+            <a:r>
+              <a:rPr lang="da-DK" dirty="0"/>
+              <a:t>Data import/</a:t>
+            </a:r>
+            <a:r>
+              <a:rPr lang="da-DK" dirty="0" err="1"/>
+              <a:t>export</a:t>
+            </a:r>
+            <a:r>
+              <a:rPr lang="da-DK" dirty="0"/>
+              <a:t> for event stream til og fra </a:t>
+            </a:r>
+            <a:r>
+              <a:rPr lang="da-DK" dirty="0" err="1"/>
+              <a:t>externe</a:t>
+            </a:r>
+            <a:r>
+              <a:rPr lang="da-DK" dirty="0"/>
+              <a:t> systemer</a:t>
+            </a:r>
+          </a:p>
+          <a:p>
+            <a:pPr marL="0" indent="0">
+              <a:buNone/>
+            </a:pPr>
+            <a:endParaRPr lang="da-DK" dirty="0"/>
           </a:p>
         </p:txBody>
       </p:sp>
     </p:spTree>
     <p:extLst>
       <p:ext uri="{BB962C8B-B14F-4D97-AF65-F5344CB8AC3E}">
-        <p14:creationId xmlns:p14="http://schemas.microsoft.com/office/powerpoint/2010/main" val="230170436"/>
+        <p14:creationId xmlns:p14="http://schemas.microsoft.com/office/powerpoint/2010/main" val="3462775647"/>
       </p:ext>
     </p:extLst>
   </p:cSld>
@@ -11802,10 +12473,10 @@
       </p:grpSpPr>
       <p:sp>
         <p:nvSpPr>
-          <p:cNvPr id="8" name="Titel 7">
+          <p:cNvPr id="2" name="Titel 1">
             <a:extLst>
               <a:ext uri="{FF2B5EF4-FFF2-40B4-BE49-F238E27FC236}">
-                <a16:creationId xmlns:a16="http://schemas.microsoft.com/office/drawing/2014/main" id="{964C56D4-D3DF-1B49-7986-BDEB15B6AF6E}"/>
+                <a16:creationId xmlns:a16="http://schemas.microsoft.com/office/drawing/2014/main" id="{FFEC5993-EFA9-A519-83CC-AF07225CE353}"/>
               </a:ext>
             </a:extLst>
           </p:cNvPr>
@@ -11816,215 +12487,35 @@
             <p:ph type="title"/>
           </p:nvPr>
         </p:nvSpPr>
-        <p:spPr/>
-        <p:txBody>
-          <a:bodyPr/>
-          <a:lstStyle/>
-          <a:p>
-            <a:r>
-              <a:rPr lang="da-DK" dirty="0"/>
-              <a:t>Kafka - I forhold til </a:t>
-            </a:r>
-            <a:r>
-              <a:rPr lang="da-DK" dirty="0" err="1"/>
-              <a:t>RabbitMQ</a:t>
-            </a:r>
-            <a:endParaRPr lang="da-DK" dirty="0"/>
-          </a:p>
-        </p:txBody>
-      </p:sp>
-      <p:sp>
-        <p:nvSpPr>
-          <p:cNvPr id="2" name="Pladsholder til tekst 1">
-            <a:extLst>
-              <a:ext uri="{FF2B5EF4-FFF2-40B4-BE49-F238E27FC236}">
-                <a16:creationId xmlns:a16="http://schemas.microsoft.com/office/drawing/2014/main" id="{52D09D76-F7EA-FB42-58D6-435CFFBC688F}"/>
-              </a:ext>
-            </a:extLst>
-          </p:cNvPr>
-          <p:cNvSpPr>
-            <a:spLocks noGrp="1"/>
-          </p:cNvSpPr>
-          <p:nvPr>
-            <p:ph type="body" idx="1"/>
-          </p:nvPr>
-        </p:nvSpPr>
-        <p:spPr/>
-        <p:txBody>
-          <a:bodyPr/>
-          <a:lstStyle/>
-          <a:p>
+        <p:spPr>
+          <a:xfrm>
+            <a:off x="0" y="0"/>
+            <a:ext cx="12192000" cy="6857999"/>
+          </a:xfrm>
+        </p:spPr>
+        <p:txBody>
+          <a:bodyPr/>
+          <a:lstStyle/>
+          <a:p>
+            <a:pPr algn="ctr"/>
+            <a:r>
+              <a:rPr lang="da-DK" dirty="0"/>
+              <a:t>Demo</a:t>
+            </a:r>
+            <a:br>
+              <a:rPr lang="da-DK" dirty="0"/>
+            </a:br>
             <a:r>
               <a:rPr lang="da-DK" dirty="0"/>
               <a:t>Kafka</a:t>
             </a:r>
-          </a:p>
-        </p:txBody>
-      </p:sp>
-      <p:sp>
-        <p:nvSpPr>
-          <p:cNvPr id="3" name="Pladsholder til indhold 2">
-            <a:extLst>
-              <a:ext uri="{FF2B5EF4-FFF2-40B4-BE49-F238E27FC236}">
-                <a16:creationId xmlns:a16="http://schemas.microsoft.com/office/drawing/2014/main" id="{339997B2-9ED5-7B5A-EBCA-3B5D07672F58}"/>
-              </a:ext>
-            </a:extLst>
-          </p:cNvPr>
-          <p:cNvSpPr>
-            <a:spLocks noGrp="1"/>
-          </p:cNvSpPr>
-          <p:nvPr>
-            <p:ph sz="half" idx="2"/>
-          </p:nvPr>
-        </p:nvSpPr>
-        <p:spPr/>
-        <p:txBody>
-          <a:bodyPr/>
-          <a:lstStyle/>
-          <a:p>
-            <a:r>
-              <a:rPr lang="da-DK" dirty="0" err="1"/>
-              <a:t>Topic</a:t>
-            </a:r>
-            <a:endParaRPr lang="da-DK" dirty="0"/>
-          </a:p>
-          <a:p>
-            <a:r>
-              <a:rPr lang="da-DK" dirty="0"/>
-              <a:t>Kan have skema	</a:t>
-            </a:r>
-          </a:p>
-          <a:p>
-            <a:r>
-              <a:rPr lang="da-DK" dirty="0"/>
-              <a:t>Event</a:t>
-            </a:r>
-          </a:p>
-          <a:p>
-            <a:r>
-              <a:rPr lang="da-DK" dirty="0"/>
-              <a:t>Understøtter ikke </a:t>
-            </a:r>
-            <a:r>
-              <a:rPr lang="da-DK" dirty="0" err="1"/>
-              <a:t>Request</a:t>
-            </a:r>
-            <a:r>
-              <a:rPr lang="da-DK" dirty="0"/>
-              <a:t>/</a:t>
-            </a:r>
-            <a:r>
-              <a:rPr lang="da-DK" dirty="0" err="1"/>
-              <a:t>Response</a:t>
-            </a:r>
-            <a:endParaRPr lang="da-DK" dirty="0"/>
-          </a:p>
-          <a:p>
-            <a:r>
-              <a:rPr lang="da-DK" dirty="0"/>
-              <a:t>Consumer kan kun oprette </a:t>
-            </a:r>
-            <a:r>
-              <a:rPr lang="da-DK" dirty="0" err="1"/>
-              <a:t>topic</a:t>
-            </a:r>
-            <a:r>
-              <a:rPr lang="da-DK" dirty="0"/>
-              <a:t>, hvis broker tillader det</a:t>
-            </a:r>
-          </a:p>
-        </p:txBody>
-      </p:sp>
-      <p:sp>
-        <p:nvSpPr>
-          <p:cNvPr id="4" name="Pladsholder til tekst 3">
-            <a:extLst>
-              <a:ext uri="{FF2B5EF4-FFF2-40B4-BE49-F238E27FC236}">
-                <a16:creationId xmlns:a16="http://schemas.microsoft.com/office/drawing/2014/main" id="{D2BCD25E-3062-C776-FDCD-8724CFA931AE}"/>
-              </a:ext>
-            </a:extLst>
-          </p:cNvPr>
-          <p:cNvSpPr>
-            <a:spLocks noGrp="1"/>
-          </p:cNvSpPr>
-          <p:nvPr>
-            <p:ph type="body" sz="quarter" idx="3"/>
-          </p:nvPr>
-        </p:nvSpPr>
-        <p:spPr/>
-        <p:txBody>
-          <a:bodyPr/>
-          <a:lstStyle/>
-          <a:p>
-            <a:r>
-              <a:rPr lang="da-DK" dirty="0" err="1"/>
-              <a:t>RabbitMQ</a:t>
-            </a:r>
-            <a:endParaRPr lang="da-DK" dirty="0"/>
-          </a:p>
-        </p:txBody>
-      </p:sp>
-      <p:sp>
-        <p:nvSpPr>
-          <p:cNvPr id="5" name="Pladsholder til indhold 4">
-            <a:extLst>
-              <a:ext uri="{FF2B5EF4-FFF2-40B4-BE49-F238E27FC236}">
-                <a16:creationId xmlns:a16="http://schemas.microsoft.com/office/drawing/2014/main" id="{A6395EEA-AED6-2FD6-EC89-277DA9898817}"/>
-              </a:ext>
-            </a:extLst>
-          </p:cNvPr>
-          <p:cNvSpPr>
-            <a:spLocks noGrp="1"/>
-          </p:cNvSpPr>
-          <p:nvPr>
-            <p:ph sz="quarter" idx="4"/>
-          </p:nvPr>
-        </p:nvSpPr>
-        <p:spPr/>
-        <p:txBody>
-          <a:bodyPr/>
-          <a:lstStyle/>
-          <a:p>
-            <a:r>
-              <a:rPr lang="da-DK" dirty="0"/>
-              <a:t>Queue</a:t>
-            </a:r>
-          </a:p>
-          <a:p>
-            <a:r>
-              <a:rPr lang="da-DK" dirty="0"/>
-              <a:t>Intet skema</a:t>
-            </a:r>
-          </a:p>
-          <a:p>
-            <a:r>
-              <a:rPr lang="da-DK" dirty="0"/>
-              <a:t>Message</a:t>
-            </a:r>
-          </a:p>
-          <a:p>
-            <a:r>
-              <a:rPr lang="da-DK" dirty="0"/>
-              <a:t>Remote Procedure Call</a:t>
-            </a:r>
-          </a:p>
-          <a:p>
-            <a:r>
-              <a:rPr lang="da-DK" dirty="0"/>
-              <a:t>Consumer kan selv oprette </a:t>
-            </a:r>
-            <a:r>
-              <a:rPr lang="da-DK" dirty="0" err="1"/>
-              <a:t>queue</a:t>
-            </a:r>
-            <a:endParaRPr lang="da-DK" dirty="0"/>
           </a:p>
         </p:txBody>
       </p:sp>
     </p:spTree>
     <p:extLst>
       <p:ext uri="{BB962C8B-B14F-4D97-AF65-F5344CB8AC3E}">
-        <p14:creationId xmlns:p14="http://schemas.microsoft.com/office/powerpoint/2010/main" val="1977421596"/>
+        <p14:creationId xmlns:p14="http://schemas.microsoft.com/office/powerpoint/2010/main" val="230170436"/>
       </p:ext>
     </p:extLst>
   </p:cSld>
@@ -12074,6 +12565,257 @@
           <a:p>
             <a:r>
               <a:rPr lang="da-DK" dirty="0"/>
+              <a:t>Kafka - I forhold til </a:t>
+            </a:r>
+            <a:r>
+              <a:rPr lang="da-DK" dirty="0" err="1"/>
+              <a:t>RabbitMQ</a:t>
+            </a:r>
+            <a:endParaRPr lang="da-DK" dirty="0"/>
+          </a:p>
+        </p:txBody>
+      </p:sp>
+      <p:sp>
+        <p:nvSpPr>
+          <p:cNvPr id="2" name="Pladsholder til tekst 1">
+            <a:extLst>
+              <a:ext uri="{FF2B5EF4-FFF2-40B4-BE49-F238E27FC236}">
+                <a16:creationId xmlns:a16="http://schemas.microsoft.com/office/drawing/2014/main" id="{52D09D76-F7EA-FB42-58D6-435CFFBC688F}"/>
+              </a:ext>
+            </a:extLst>
+          </p:cNvPr>
+          <p:cNvSpPr>
+            <a:spLocks noGrp="1"/>
+          </p:cNvSpPr>
+          <p:nvPr>
+            <p:ph type="body" idx="1"/>
+          </p:nvPr>
+        </p:nvSpPr>
+        <p:spPr/>
+        <p:txBody>
+          <a:bodyPr/>
+          <a:lstStyle/>
+          <a:p>
+            <a:r>
+              <a:rPr lang="da-DK" dirty="0"/>
+              <a:t>Kafka</a:t>
+            </a:r>
+          </a:p>
+        </p:txBody>
+      </p:sp>
+      <p:sp>
+        <p:nvSpPr>
+          <p:cNvPr id="3" name="Pladsholder til indhold 2">
+            <a:extLst>
+              <a:ext uri="{FF2B5EF4-FFF2-40B4-BE49-F238E27FC236}">
+                <a16:creationId xmlns:a16="http://schemas.microsoft.com/office/drawing/2014/main" id="{339997B2-9ED5-7B5A-EBCA-3B5D07672F58}"/>
+              </a:ext>
+            </a:extLst>
+          </p:cNvPr>
+          <p:cNvSpPr>
+            <a:spLocks noGrp="1"/>
+          </p:cNvSpPr>
+          <p:nvPr>
+            <p:ph sz="half" idx="2"/>
+          </p:nvPr>
+        </p:nvSpPr>
+        <p:spPr/>
+        <p:txBody>
+          <a:bodyPr/>
+          <a:lstStyle/>
+          <a:p>
+            <a:r>
+              <a:rPr lang="da-DK" dirty="0" err="1"/>
+              <a:t>Topic</a:t>
+            </a:r>
+            <a:endParaRPr lang="da-DK" dirty="0"/>
+          </a:p>
+          <a:p>
+            <a:r>
+              <a:rPr lang="da-DK" dirty="0"/>
+              <a:t>Kan have skema	</a:t>
+            </a:r>
+          </a:p>
+          <a:p>
+            <a:r>
+              <a:rPr lang="da-DK" dirty="0"/>
+              <a:t>Event</a:t>
+            </a:r>
+          </a:p>
+          <a:p>
+            <a:r>
+              <a:rPr lang="da-DK" dirty="0"/>
+              <a:t>Understøtter ikke </a:t>
+            </a:r>
+            <a:r>
+              <a:rPr lang="da-DK" dirty="0" err="1"/>
+              <a:t>Request</a:t>
+            </a:r>
+            <a:r>
+              <a:rPr lang="da-DK" dirty="0"/>
+              <a:t>/</a:t>
+            </a:r>
+            <a:r>
+              <a:rPr lang="da-DK" dirty="0" err="1"/>
+              <a:t>Response</a:t>
+            </a:r>
+            <a:endParaRPr lang="da-DK" dirty="0"/>
+          </a:p>
+          <a:p>
+            <a:r>
+              <a:rPr lang="da-DK" dirty="0"/>
+              <a:t>Consumer kan kun oprette </a:t>
+            </a:r>
+            <a:r>
+              <a:rPr lang="da-DK" dirty="0" err="1"/>
+              <a:t>topic</a:t>
+            </a:r>
+            <a:r>
+              <a:rPr lang="da-DK" dirty="0"/>
+              <a:t>, hvis broker tillader det</a:t>
+            </a:r>
+          </a:p>
+        </p:txBody>
+      </p:sp>
+      <p:sp>
+        <p:nvSpPr>
+          <p:cNvPr id="4" name="Pladsholder til tekst 3">
+            <a:extLst>
+              <a:ext uri="{FF2B5EF4-FFF2-40B4-BE49-F238E27FC236}">
+                <a16:creationId xmlns:a16="http://schemas.microsoft.com/office/drawing/2014/main" id="{D2BCD25E-3062-C776-FDCD-8724CFA931AE}"/>
+              </a:ext>
+            </a:extLst>
+          </p:cNvPr>
+          <p:cNvSpPr>
+            <a:spLocks noGrp="1"/>
+          </p:cNvSpPr>
+          <p:nvPr>
+            <p:ph type="body" sz="quarter" idx="3"/>
+          </p:nvPr>
+        </p:nvSpPr>
+        <p:spPr/>
+        <p:txBody>
+          <a:bodyPr/>
+          <a:lstStyle/>
+          <a:p>
+            <a:r>
+              <a:rPr lang="da-DK" dirty="0" err="1"/>
+              <a:t>RabbitMQ</a:t>
+            </a:r>
+            <a:endParaRPr lang="da-DK" dirty="0"/>
+          </a:p>
+        </p:txBody>
+      </p:sp>
+      <p:sp>
+        <p:nvSpPr>
+          <p:cNvPr id="5" name="Pladsholder til indhold 4">
+            <a:extLst>
+              <a:ext uri="{FF2B5EF4-FFF2-40B4-BE49-F238E27FC236}">
+                <a16:creationId xmlns:a16="http://schemas.microsoft.com/office/drawing/2014/main" id="{A6395EEA-AED6-2FD6-EC89-277DA9898817}"/>
+              </a:ext>
+            </a:extLst>
+          </p:cNvPr>
+          <p:cNvSpPr>
+            <a:spLocks noGrp="1"/>
+          </p:cNvSpPr>
+          <p:nvPr>
+            <p:ph sz="quarter" idx="4"/>
+          </p:nvPr>
+        </p:nvSpPr>
+        <p:spPr/>
+        <p:txBody>
+          <a:bodyPr/>
+          <a:lstStyle/>
+          <a:p>
+            <a:r>
+              <a:rPr lang="da-DK" dirty="0"/>
+              <a:t>Queue/Stream</a:t>
+            </a:r>
+          </a:p>
+          <a:p>
+            <a:r>
+              <a:rPr lang="da-DK" dirty="0"/>
+              <a:t>Intet skema</a:t>
+            </a:r>
+          </a:p>
+          <a:p>
+            <a:r>
+              <a:rPr lang="da-DK" dirty="0"/>
+              <a:t>Message</a:t>
+            </a:r>
+          </a:p>
+          <a:p>
+            <a:r>
+              <a:rPr lang="da-DK" dirty="0"/>
+              <a:t>Remote Procedure Call</a:t>
+            </a:r>
+          </a:p>
+          <a:p>
+            <a:r>
+              <a:rPr lang="da-DK" dirty="0"/>
+              <a:t>Consumer kan selv oprette </a:t>
+            </a:r>
+            <a:r>
+              <a:rPr lang="da-DK" dirty="0" err="1"/>
+              <a:t>queue</a:t>
+            </a:r>
+            <a:endParaRPr lang="da-DK" dirty="0"/>
+          </a:p>
+        </p:txBody>
+      </p:sp>
+    </p:spTree>
+    <p:extLst>
+      <p:ext uri="{BB962C8B-B14F-4D97-AF65-F5344CB8AC3E}">
+        <p14:creationId xmlns:p14="http://schemas.microsoft.com/office/powerpoint/2010/main" val="1977421596"/>
+      </p:ext>
+    </p:extLst>
+  </p:cSld>
+  <p:clrMapOvr>
+    <a:masterClrMapping/>
+  </p:clrMapOvr>
+</p:sld>
+</file>
+
+<file path=ppt/slides/slide34.xml><?xml version="1.0" encoding="utf-8"?>
+<p:sld xmlns:a="http://schemas.openxmlformats.org/drawingml/2006/main" xmlns:r="http://schemas.openxmlformats.org/officeDocument/2006/relationships" xmlns:p="http://schemas.openxmlformats.org/presentationml/2006/main">
+  <p:cSld>
+    <p:spTree>
+      <p:nvGrpSpPr>
+        <p:cNvPr id="1" name=""/>
+        <p:cNvGrpSpPr/>
+        <p:nvPr/>
+      </p:nvGrpSpPr>
+      <p:grpSpPr>
+        <a:xfrm>
+          <a:off x="0" y="0"/>
+          <a:ext cx="0" cy="0"/>
+          <a:chOff x="0" y="0"/>
+          <a:chExt cx="0" cy="0"/>
+        </a:xfrm>
+      </p:grpSpPr>
+      <p:sp>
+        <p:nvSpPr>
+          <p:cNvPr id="8" name="Titel 7">
+            <a:extLst>
+              <a:ext uri="{FF2B5EF4-FFF2-40B4-BE49-F238E27FC236}">
+                <a16:creationId xmlns:a16="http://schemas.microsoft.com/office/drawing/2014/main" id="{964C56D4-D3DF-1B49-7986-BDEB15B6AF6E}"/>
+              </a:ext>
+            </a:extLst>
+          </p:cNvPr>
+          <p:cNvSpPr>
+            <a:spLocks noGrp="1"/>
+          </p:cNvSpPr>
+          <p:nvPr>
+            <p:ph type="title"/>
+          </p:nvPr>
+        </p:nvSpPr>
+        <p:spPr/>
+        <p:txBody>
+          <a:bodyPr/>
+          <a:lstStyle/>
+          <a:p>
+            <a:r>
+              <a:rPr lang="da-DK" dirty="0"/>
               <a:t>Kafka - Hvis brugt i produktet</a:t>
             </a:r>
           </a:p>
@@ -12151,7 +12893,7 @@
 </p:sld>
 </file>
 
-<file path=ppt/slides/slide34.xml><?xml version="1.0" encoding="utf-8"?>
+<file path=ppt/slides/slide35.xml><?xml version="1.0" encoding="utf-8"?>
 <p:sld xmlns:a="http://schemas.openxmlformats.org/drawingml/2006/main" xmlns:r="http://schemas.openxmlformats.org/officeDocument/2006/relationships" xmlns:p="http://schemas.openxmlformats.org/presentationml/2006/main">
   <p:cSld>
     <p:spTree>
@@ -12252,7 +12994,189 @@
 </p:sld>
 </file>
 
-<file path=ppt/slides/slide35.xml><?xml version="1.0" encoding="utf-8"?>
+<file path=ppt/slides/slide36.xml><?xml version="1.0" encoding="utf-8"?>
+<p:sld xmlns:a="http://schemas.openxmlformats.org/drawingml/2006/main" xmlns:r="http://schemas.openxmlformats.org/officeDocument/2006/relationships" xmlns:p="http://schemas.openxmlformats.org/presentationml/2006/main" show="0">
+  <p:cSld>
+    <p:spTree>
+      <p:nvGrpSpPr>
+        <p:cNvPr id="1" name=""/>
+        <p:cNvGrpSpPr/>
+        <p:nvPr/>
+      </p:nvGrpSpPr>
+      <p:grpSpPr>
+        <a:xfrm>
+          <a:off x="0" y="0"/>
+          <a:ext cx="0" cy="0"/>
+          <a:chOff x="0" y="0"/>
+          <a:chExt cx="0" cy="0"/>
+        </a:xfrm>
+      </p:grpSpPr>
+      <p:sp>
+        <p:nvSpPr>
+          <p:cNvPr id="2" name="Titel 1">
+            <a:extLst>
+              <a:ext uri="{FF2B5EF4-FFF2-40B4-BE49-F238E27FC236}">
+                <a16:creationId xmlns:a16="http://schemas.microsoft.com/office/drawing/2014/main" id="{BD49CE15-8830-7735-EEBA-56B46383EED4}"/>
+              </a:ext>
+            </a:extLst>
+          </p:cNvPr>
+          <p:cNvSpPr>
+            <a:spLocks noGrp="1"/>
+          </p:cNvSpPr>
+          <p:nvPr>
+            <p:ph type="title"/>
+          </p:nvPr>
+        </p:nvSpPr>
+        <p:spPr/>
+        <p:txBody>
+          <a:bodyPr/>
+          <a:lstStyle/>
+          <a:p>
+            <a:r>
+              <a:rPr lang="da-DK" dirty="0"/>
+              <a:t>Referencer</a:t>
+            </a:r>
+          </a:p>
+        </p:txBody>
+      </p:sp>
+      <p:sp>
+        <p:nvSpPr>
+          <p:cNvPr id="3" name="Pladsholder til indhold 2">
+            <a:extLst>
+              <a:ext uri="{FF2B5EF4-FFF2-40B4-BE49-F238E27FC236}">
+                <a16:creationId xmlns:a16="http://schemas.microsoft.com/office/drawing/2014/main" id="{DBD79205-814B-8ABA-7820-A8964F2C7957}"/>
+              </a:ext>
+            </a:extLst>
+          </p:cNvPr>
+          <p:cNvSpPr>
+            <a:spLocks noGrp="1"/>
+          </p:cNvSpPr>
+          <p:nvPr>
+            <p:ph idx="1"/>
+          </p:nvPr>
+        </p:nvSpPr>
+        <p:spPr/>
+        <p:txBody>
+          <a:bodyPr/>
+          <a:lstStyle/>
+          <a:p>
+            <a:r>
+              <a:rPr lang="da-DK" dirty="0"/>
+              <a:t>[1] M. Fowler: </a:t>
+            </a:r>
+            <a:r>
+              <a:rPr lang="da-DK" dirty="0">
+                <a:hlinkClick r:id="rId2">
+                  <a:extLst>
+                    <a:ext uri="{A12FA001-AC4F-418D-AE19-62706E023703}">
+                      <ahyp:hlinkClr xmlns:ahyp="http://schemas.microsoft.com/office/drawing/2018/hyperlinkcolor" val="tx"/>
+                    </a:ext>
+                  </a:extLst>
+                </a:hlinkClick>
+              </a:rPr>
+              <a:t>https://martinfowler.com/bliki/UbiquitousLanguage.html</a:t>
+            </a:r>
+            <a:r>
+              <a:rPr lang="da-DK" dirty="0"/>
+              <a:t> (3/5/2024</a:t>
+            </a:r>
+          </a:p>
+          <a:p>
+            <a:r>
+              <a:rPr lang="da-DK" dirty="0"/>
+              <a:t>[2] Microsoft: </a:t>
+            </a:r>
+            <a:r>
+              <a:rPr lang="da-DK" dirty="0">
+                <a:hlinkClick r:id="rId3">
+                  <a:extLst>
+                    <a:ext uri="{A12FA001-AC4F-418D-AE19-62706E023703}">
+                      <ahyp:hlinkClr xmlns:ahyp="http://schemas.microsoft.com/office/drawing/2018/hyperlinkcolor" val="tx"/>
+                    </a:ext>
+                  </a:extLst>
+                </a:hlinkClick>
+              </a:rPr>
+              <a:t>https://learn.microsoft.com/en-us/dotnet/architecture/microservices/microservice-ddd-cqrs-patterns/ddd-oriented-microservice</a:t>
+            </a:r>
+            <a:r>
+              <a:rPr lang="da-DK" dirty="0"/>
+              <a:t> (8/5/2024)</a:t>
+            </a:r>
+          </a:p>
+          <a:p>
+            <a:r>
+              <a:rPr lang="da-DK" dirty="0"/>
+              <a:t>[3] </a:t>
+            </a:r>
+            <a:r>
+              <a:rPr lang="da-DK" dirty="0" err="1"/>
+              <a:t>WebAssembly</a:t>
+            </a:r>
+            <a:r>
+              <a:rPr lang="da-DK" dirty="0"/>
+              <a:t>: </a:t>
+            </a:r>
+            <a:r>
+              <a:rPr lang="da-DK" dirty="0">
+                <a:hlinkClick r:id="rId4">
+                  <a:extLst>
+                    <a:ext uri="{A12FA001-AC4F-418D-AE19-62706E023703}">
+                      <ahyp:hlinkClr xmlns:ahyp="http://schemas.microsoft.com/office/drawing/2018/hyperlinkcolor" val="tx"/>
+                    </a:ext>
+                  </a:extLst>
+                </a:hlinkClick>
+              </a:rPr>
+              <a:t>https://webassembly.org/docs/faq/</a:t>
+            </a:r>
+            <a:r>
+              <a:rPr lang="da-DK" dirty="0"/>
+              <a:t> (8/5/2024)</a:t>
+            </a:r>
+          </a:p>
+          <a:p>
+            <a:r>
+              <a:rPr lang="da-DK" dirty="0"/>
+              <a:t>[4] Apache Kafka: </a:t>
+            </a:r>
+            <a:r>
+              <a:rPr lang="da-DK" dirty="0">
+                <a:hlinkClick r:id="rId5">
+                  <a:extLst>
+                    <a:ext uri="{A12FA001-AC4F-418D-AE19-62706E023703}">
+                      <ahyp:hlinkClr xmlns:ahyp="http://schemas.microsoft.com/office/drawing/2018/hyperlinkcolor" val="tx"/>
+                    </a:ext>
+                  </a:extLst>
+                </a:hlinkClick>
+              </a:rPr>
+              <a:t>https://kafka.apache.org/documentation</a:t>
+            </a:r>
+            <a:r>
+              <a:rPr lang="da-DK" dirty="0"/>
+              <a:t> (6/5/2024)</a:t>
+            </a:r>
+          </a:p>
+          <a:p>
+            <a:endParaRPr lang="da-DK" dirty="0"/>
+          </a:p>
+          <a:p>
+            <a:endParaRPr lang="da-DK" dirty="0"/>
+          </a:p>
+        </p:txBody>
+      </p:sp>
+    </p:spTree>
+    <p:extLst>
+      <p:ext uri="{BB962C8B-B14F-4D97-AF65-F5344CB8AC3E}">
+        <p14:creationId xmlns:p14="http://schemas.microsoft.com/office/powerpoint/2010/main" val="221808590"/>
+      </p:ext>
+    </p:extLst>
+  </p:cSld>
+  <p:clrMapOvr>
+    <a:masterClrMapping/>
+  </p:clrMapOvr>
+</p:sld>
+</file>
+
+<file path=ppt/slides/slide37.xml><?xml version="1.0" encoding="utf-8"?>
 <p:sld xmlns:a="http://schemas.openxmlformats.org/drawingml/2006/main" xmlns:r="http://schemas.openxmlformats.org/officeDocument/2006/relationships" xmlns:p="http://schemas.openxmlformats.org/presentationml/2006/main">
   <p:cSld>
     <p:spTree>
@@ -12324,7 +13248,13 @@
             </a:r>
             <a:r>
               <a:rPr lang="da-DK" dirty="0">
-                <a:hlinkClick r:id="rId2"/>
+                <a:hlinkClick r:id="rId2">
+                  <a:extLst>
+                    <a:ext uri="{A12FA001-AC4F-418D-AE19-62706E023703}">
+                      <ahyp:hlinkClr xmlns:ahyp="http://schemas.microsoft.com/office/drawing/2018/hyperlinkcolor" val="tx"/>
+                    </a:ext>
+                  </a:extLst>
+                </a:hlinkClick>
               </a:rPr>
               <a:t>https://martinfowler.com/bliki/UbiquitousLanguage.html</a:t>
             </a:r>
@@ -12340,47 +13270,35 @@
             </a:r>
             <a:r>
               <a:rPr lang="da-DK" dirty="0">
-                <a:hlinkClick r:id="rId3"/>
+                <a:hlinkClick r:id="rId3">
+                  <a:extLst>
+                    <a:ext uri="{A12FA001-AC4F-418D-AE19-62706E023703}">
+                      <ahyp:hlinkClr xmlns:ahyp="http://schemas.microsoft.com/office/drawing/2018/hyperlinkcolor" val="tx"/>
+                    </a:ext>
+                  </a:extLst>
+                </a:hlinkClick>
               </a:rPr>
               <a:t>https://learn.microsoft.com/en-us/dotnet/architecture/microservices/microservice-ddd-cqrs-patterns/ddd-oriented-microservice</a:t>
             </a:r>
             <a:r>
               <a:rPr lang="da-DK" dirty="0"/>
-              <a:t> (8/5/2024)</a:t>
-            </a:r>
-          </a:p>
-          <a:p>
-            <a:r>
-              <a:rPr lang="da-DK" dirty="0"/>
-              <a:t>[3] </a:t>
-            </a:r>
-            <a:r>
-              <a:rPr lang="da-DK" dirty="0" err="1"/>
-              <a:t>WebAssembly</a:t>
-            </a:r>
-            <a:r>
-              <a:rPr lang="da-DK" dirty="0"/>
-              <a:t>: </a:t>
+              <a:t> (8/5/2024) </a:t>
+            </a:r>
+          </a:p>
+          <a:p>
+            <a:r>
+              <a:rPr lang="da-DK" dirty="0"/>
+              <a:t>[3] Apache Kafka: </a:t>
             </a:r>
             <a:r>
               <a:rPr lang="da-DK" dirty="0">
-                <a:hlinkClick r:id="rId4"/>
-              </a:rPr>
-              <a:t>https://webassembly.org/docs/faq/</a:t>
-            </a:r>
-            <a:r>
-              <a:rPr lang="da-DK" dirty="0"/>
-              <a:t> (8/5/2024)</a:t>
-            </a:r>
-          </a:p>
-          <a:p>
-            <a:r>
-              <a:rPr lang="da-DK" dirty="0"/>
-              <a:t>[4] Apache Kafka: </a:t>
-            </a:r>
-            <a:r>
-              <a:rPr lang="da-DK" dirty="0">
-                <a:hlinkClick r:id="rId5"/>
+                <a:hlinkClick r:id="rId4">
+                  <a:extLst>
+                    <a:ext uri="{A12FA001-AC4F-418D-AE19-62706E023703}">
+                      <ahyp:hlinkClr xmlns:ahyp="http://schemas.microsoft.com/office/drawing/2018/hyperlinkcolor" val="tx"/>
+                    </a:ext>
+                  </a:extLst>
+                </a:hlinkClick>
               </a:rPr>
               <a:t>https://kafka.apache.org/documentation</a:t>
             </a:r>
@@ -12400,7 +13318,7 @@
     </p:spTree>
     <p:extLst>
       <p:ext uri="{BB962C8B-B14F-4D97-AF65-F5344CB8AC3E}">
-        <p14:creationId xmlns:p14="http://schemas.microsoft.com/office/powerpoint/2010/main" val="221808590"/>
+        <p14:creationId xmlns:p14="http://schemas.microsoft.com/office/powerpoint/2010/main" val="3618761977"/>
       </p:ext>
     </p:extLst>
   </p:cSld>
@@ -12824,7 +13742,7 @@
           <a:bodyPr/>
           <a:lstStyle/>
           <a:p>
-            <a:endParaRPr lang="da-DK"/>
+            <a:endParaRPr lang="da-DK" dirty="0"/>
           </a:p>
         </p:txBody>
       </p:sp>

</xml_diff>

<commit_message>
more diagrams, updated presentation, and kafka
</commit_message>
<xml_diff>
--- a/presentation.pptx
+++ b/presentation.pptx
@@ -5,7 +5,7 @@
     <p:sldMasterId id="2147483768" r:id="rId1"/>
   </p:sldMasterIdLst>
   <p:notesMasterIdLst>
-    <p:notesMasterId r:id="rId39"/>
+    <p:notesMasterId r:id="rId42"/>
   </p:notesMasterIdLst>
   <p:sldIdLst>
     <p:sldId id="256" r:id="rId2"/>
@@ -39,12 +39,15 @@
     <p:sldId id="268" r:id="rId30"/>
     <p:sldId id="292" r:id="rId31"/>
     <p:sldId id="270" r:id="rId32"/>
-    <p:sldId id="267" r:id="rId33"/>
-    <p:sldId id="269" r:id="rId34"/>
-    <p:sldId id="271" r:id="rId35"/>
-    <p:sldId id="272" r:id="rId36"/>
-    <p:sldId id="281" r:id="rId37"/>
-    <p:sldId id="298" r:id="rId38"/>
+    <p:sldId id="301" r:id="rId33"/>
+    <p:sldId id="302" r:id="rId34"/>
+    <p:sldId id="303" r:id="rId35"/>
+    <p:sldId id="267" r:id="rId36"/>
+    <p:sldId id="269" r:id="rId37"/>
+    <p:sldId id="271" r:id="rId38"/>
+    <p:sldId id="272" r:id="rId39"/>
+    <p:sldId id="281" r:id="rId40"/>
+    <p:sldId id="298" r:id="rId41"/>
   </p:sldIdLst>
   <p:sldSz cx="12192000" cy="6858000"/>
   <p:notesSz cx="6858000" cy="9144000"/>
@@ -233,7 +236,7 @@
           <a:p>
             <a:fld id="{8F5AC0EE-C0EF-4DBE-8184-146DED29BF67}" type="datetimeFigureOut">
               <a:rPr lang="da-DK" smtClean="0"/>
-              <a:t>09-05-2024</a:t>
+              <a:t>10-05-2024</a:t>
             </a:fld>
             <a:endParaRPr lang="da-DK"/>
           </a:p>
@@ -544,30 +547,10 @@
           <a:bodyPr/>
           <a:lstStyle/>
           <a:p>
-            <a:pPr marL="0" marR="0" lvl="0" indent="0" algn="l" defTabSz="914400" rtl="0" eaLnBrk="1" fontAlgn="auto" latinLnBrk="0" hangingPunct="1">
-              <a:lnSpc>
-                <a:spcPct val="100000"/>
-              </a:lnSpc>
-              <a:spcBef>
-                <a:spcPts val="0"/>
-              </a:spcBef>
-              <a:spcAft>
-                <a:spcPts val="0"/>
-              </a:spcAft>
-              <a:buClrTx/>
-              <a:buSzTx/>
-              <a:buFontTx/>
-              <a:buNone/>
-              <a:tabLst/>
-              <a:defRPr/>
-            </a:pPr>
-            <a:r>
-              <a:rPr lang="da-DK" dirty="0"/>
-              <a:t>Kunne fremvise noget kode på hist og her</a:t>
-            </a:r>
-          </a:p>
-          <a:p>
-            <a:endParaRPr lang="da-DK" dirty="0"/>
+            <a:r>
+              <a:rPr lang="da-DK" dirty="0"/>
+              <a:t>Kort opsummering</a:t>
+            </a:r>
           </a:p>
         </p:txBody>
       </p:sp>
@@ -588,7 +571,7 @@
           <a:p>
             <a:fld id="{252E21F2-0B82-4ACE-A045-2AAC56859006}" type="slidenum">
               <a:rPr lang="da-DK" smtClean="0"/>
-              <a:t>4</a:t>
+              <a:t>3</a:t>
             </a:fld>
             <a:endParaRPr lang="da-DK"/>
           </a:p>
@@ -597,7 +580,7 @@
     </p:spTree>
     <p:extLst>
       <p:ext uri="{BB962C8B-B14F-4D97-AF65-F5344CB8AC3E}">
-        <p14:creationId xmlns:p14="http://schemas.microsoft.com/office/powerpoint/2010/main" val="4156315854"/>
+        <p14:creationId xmlns:p14="http://schemas.microsoft.com/office/powerpoint/2010/main" val="3394159357"/>
       </p:ext>
     </p:extLst>
   </p:cSld>
@@ -651,43 +634,7 @@
           <a:bodyPr/>
           <a:lstStyle/>
           <a:p>
-            <a:r>
-              <a:rPr lang="da-DK" dirty="0"/>
-              <a:t>User og Customer deler Id, navn og lokation. Id skal altid være det samme</a:t>
-            </a:r>
-          </a:p>
-          <a:p>
-            <a:r>
-              <a:rPr lang="da-DK" dirty="0" err="1"/>
-              <a:t>CompanyName</a:t>
-            </a:r>
-            <a:r>
-              <a:rPr lang="da-DK" dirty="0"/>
-              <a:t> og </a:t>
-            </a:r>
-            <a:r>
-              <a:rPr lang="da-DK" dirty="0" err="1"/>
-              <a:t>CustomerName</a:t>
-            </a:r>
-            <a:r>
-              <a:rPr lang="da-DK" dirty="0"/>
-              <a:t> er for at undgå at skulle slå op i begge databaser </a:t>
-            </a:r>
-          </a:p>
-          <a:p>
             <a:endParaRPr lang="da-DK" dirty="0"/>
-          </a:p>
-          <a:p>
-            <a:r>
-              <a:rPr lang="da-DK" dirty="0"/>
-              <a:t>https://martinfowler.com/bliki/UbiquitousLanguage.html</a:t>
-            </a:r>
-          </a:p>
-          <a:p>
-            <a:r>
-              <a:rPr lang="da-DK" dirty="0"/>
-              <a:t>https://martinfowler.com/bliki/BoundedContext.html</a:t>
-            </a:r>
           </a:p>
         </p:txBody>
       </p:sp>
@@ -708,7 +655,7 @@
           <a:p>
             <a:fld id="{252E21F2-0B82-4ACE-A045-2AAC56859006}" type="slidenum">
               <a:rPr lang="da-DK" smtClean="0"/>
-              <a:t>15</a:t>
+              <a:t>14</a:t>
             </a:fld>
             <a:endParaRPr lang="da-DK"/>
           </a:p>
@@ -717,7 +664,7 @@
     </p:spTree>
     <p:extLst>
       <p:ext uri="{BB962C8B-B14F-4D97-AF65-F5344CB8AC3E}">
-        <p14:creationId xmlns:p14="http://schemas.microsoft.com/office/powerpoint/2010/main" val="2568857346"/>
+        <p14:creationId xmlns:p14="http://schemas.microsoft.com/office/powerpoint/2010/main" val="2313198539"/>
       </p:ext>
     </p:extLst>
   </p:cSld>
@@ -773,19 +720,41 @@
           <a:p>
             <a:r>
               <a:rPr lang="da-DK" dirty="0"/>
-              <a:t>Håndtering af referencer</a:t>
-            </a:r>
-          </a:p>
-          <a:p>
-            <a:r>
-              <a:rPr lang="da-DK" dirty="0"/>
-              <a:t>Produktet fremviser ikke helt det brugbare for DDD pga. </a:t>
-            </a:r>
-            <a:r>
-              <a:rPr lang="da-DK" dirty="0" err="1"/>
-              <a:t>simplehed</a:t>
-            </a:r>
+              <a:t>User og Customer deler Id, navn og lokation. Id skal altid være det samme</a:t>
+            </a:r>
+          </a:p>
+          <a:p>
+            <a:r>
+              <a:rPr lang="da-DK" dirty="0" err="1"/>
+              <a:t>CompanyName</a:t>
+            </a:r>
+            <a:r>
+              <a:rPr lang="da-DK" dirty="0"/>
+              <a:t> og </a:t>
+            </a:r>
+            <a:r>
+              <a:rPr lang="da-DK" dirty="0" err="1"/>
+              <a:t>CustomerName</a:t>
+            </a:r>
+            <a:r>
+              <a:rPr lang="da-DK" dirty="0"/>
+              <a:t> er for at undgå at skulle slå op i begge databaser </a:t>
+            </a:r>
+          </a:p>
+          <a:p>
             <a:endParaRPr lang="da-DK" dirty="0"/>
+          </a:p>
+          <a:p>
+            <a:r>
+              <a:rPr lang="da-DK" dirty="0"/>
+              <a:t>https://martinfowler.com/bliki/UbiquitousLanguage.html</a:t>
+            </a:r>
+          </a:p>
+          <a:p>
+            <a:r>
+              <a:rPr lang="da-DK" dirty="0"/>
+              <a:t>https://martinfowler.com/bliki/BoundedContext.html</a:t>
+            </a:r>
           </a:p>
         </p:txBody>
       </p:sp>
@@ -806,7 +775,7 @@
           <a:p>
             <a:fld id="{252E21F2-0B82-4ACE-A045-2AAC56859006}" type="slidenum">
               <a:rPr lang="da-DK" smtClean="0"/>
-              <a:t>16</a:t>
+              <a:t>15</a:t>
             </a:fld>
             <a:endParaRPr lang="da-DK"/>
           </a:p>
@@ -815,7 +784,7 @@
     </p:spTree>
     <p:extLst>
       <p:ext uri="{BB962C8B-B14F-4D97-AF65-F5344CB8AC3E}">
-        <p14:creationId xmlns:p14="http://schemas.microsoft.com/office/powerpoint/2010/main" val="2516361822"/>
+        <p14:creationId xmlns:p14="http://schemas.microsoft.com/office/powerpoint/2010/main" val="2568857346"/>
       </p:ext>
     </p:extLst>
   </p:cSld>
@@ -871,68 +840,18 @@
           <a:p>
             <a:r>
               <a:rPr lang="da-DK" dirty="0"/>
-              <a:t>Channels tillader at benytte en enkel TCP forbindelse. Intet kommunikation mellem </a:t>
-            </a:r>
-            <a:r>
-              <a:rPr lang="da-DK" dirty="0" err="1"/>
-              <a:t>channels</a:t>
-            </a:r>
-            <a:r>
-              <a:rPr lang="da-DK" dirty="0"/>
-              <a:t>. Normalt en </a:t>
-            </a:r>
-            <a:r>
-              <a:rPr lang="da-DK" dirty="0" err="1"/>
-              <a:t>kannal</a:t>
-            </a:r>
-            <a:r>
-              <a:rPr lang="da-DK" dirty="0"/>
-              <a:t> per tråd </a:t>
-            </a:r>
-          </a:p>
-          <a:p>
-            <a:r>
-              <a:rPr lang="da-DK" dirty="0" err="1"/>
-              <a:t>Streams</a:t>
-            </a:r>
-            <a:r>
-              <a:rPr lang="da-DK" dirty="0"/>
-              <a:t> fjerner ikke beskeder. Kan bruges til at sende besked til flere </a:t>
-            </a:r>
-            <a:r>
-              <a:rPr lang="da-DK" dirty="0" err="1"/>
-              <a:t>consumers</a:t>
-            </a:r>
-            <a:endParaRPr lang="da-DK" dirty="0"/>
-          </a:p>
-          <a:p>
-            <a:r>
-              <a:rPr lang="da-DK" dirty="0"/>
-              <a:t>Queue </a:t>
-            </a:r>
-            <a:r>
-              <a:rPr lang="da-DK" dirty="0" err="1"/>
-              <a:t>ordered</a:t>
-            </a:r>
-            <a:r>
-              <a:rPr lang="da-DK" dirty="0"/>
-              <a:t> samling af beskeder, FIFO. </a:t>
-            </a:r>
-            <a:r>
-              <a:rPr lang="da-DK" dirty="0" err="1"/>
-              <a:t>Enqueued</a:t>
-            </a:r>
-            <a:r>
-              <a:rPr lang="da-DK" dirty="0"/>
-              <a:t>, </a:t>
-            </a:r>
-            <a:r>
-              <a:rPr lang="da-DK" dirty="0" err="1"/>
-              <a:t>dequeued</a:t>
-            </a:r>
-            <a:endParaRPr lang="da-DK" dirty="0"/>
-          </a:p>
-          <a:p>
+              <a:t>Håndtering af referencer</a:t>
+            </a:r>
+          </a:p>
+          <a:p>
+            <a:r>
+              <a:rPr lang="da-DK" dirty="0"/>
+              <a:t>Produktet fremviser ikke helt det brugbare for DDD pga. </a:t>
+            </a:r>
+            <a:r>
+              <a:rPr lang="da-DK" dirty="0" err="1"/>
+              <a:t>simplehed</a:t>
+            </a:r>
             <a:endParaRPr lang="da-DK" dirty="0"/>
           </a:p>
         </p:txBody>
@@ -954,7 +873,7 @@
           <a:p>
             <a:fld id="{252E21F2-0B82-4ACE-A045-2AAC56859006}" type="slidenum">
               <a:rPr lang="da-DK" smtClean="0"/>
-              <a:t>18</a:t>
+              <a:t>16</a:t>
             </a:fld>
             <a:endParaRPr lang="da-DK"/>
           </a:p>
@@ -963,7 +882,7 @@
     </p:spTree>
     <p:extLst>
       <p:ext uri="{BB962C8B-B14F-4D97-AF65-F5344CB8AC3E}">
-        <p14:creationId xmlns:p14="http://schemas.microsoft.com/office/powerpoint/2010/main" val="1091159589"/>
+        <p14:creationId xmlns:p14="http://schemas.microsoft.com/office/powerpoint/2010/main" val="2516361822"/>
       </p:ext>
     </p:extLst>
   </p:cSld>
@@ -1017,6 +936,70 @@
           <a:bodyPr/>
           <a:lstStyle/>
           <a:p>
+            <a:r>
+              <a:rPr lang="da-DK" dirty="0"/>
+              <a:t>Channels tillader at benytte en enkel TCP forbindelse. Intet kommunikation mellem </a:t>
+            </a:r>
+            <a:r>
+              <a:rPr lang="da-DK" dirty="0" err="1"/>
+              <a:t>channels</a:t>
+            </a:r>
+            <a:r>
+              <a:rPr lang="da-DK" dirty="0"/>
+              <a:t>. Normalt en </a:t>
+            </a:r>
+            <a:r>
+              <a:rPr lang="da-DK" dirty="0" err="1"/>
+              <a:t>kannal</a:t>
+            </a:r>
+            <a:r>
+              <a:rPr lang="da-DK" dirty="0"/>
+              <a:t> per tråd </a:t>
+            </a:r>
+          </a:p>
+          <a:p>
+            <a:r>
+              <a:rPr lang="da-DK" dirty="0" err="1"/>
+              <a:t>Streams</a:t>
+            </a:r>
+            <a:r>
+              <a:rPr lang="da-DK" dirty="0"/>
+              <a:t> fjerner ikke beskeder. Kan bruges til at sende besked til flere </a:t>
+            </a:r>
+            <a:r>
+              <a:rPr lang="da-DK" dirty="0" err="1"/>
+              <a:t>consumers</a:t>
+            </a:r>
+            <a:endParaRPr lang="da-DK" dirty="0"/>
+          </a:p>
+          <a:p>
+            <a:r>
+              <a:rPr lang="da-DK" dirty="0"/>
+              <a:t>Queue </a:t>
+            </a:r>
+            <a:r>
+              <a:rPr lang="da-DK" dirty="0" err="1"/>
+              <a:t>ordered</a:t>
+            </a:r>
+            <a:r>
+              <a:rPr lang="da-DK" dirty="0"/>
+              <a:t> samling af beskeder, FIFO. </a:t>
+            </a:r>
+            <a:r>
+              <a:rPr lang="da-DK" dirty="0" err="1"/>
+              <a:t>Enqueued</a:t>
+            </a:r>
+            <a:r>
+              <a:rPr lang="da-DK" dirty="0"/>
+              <a:t>, </a:t>
+            </a:r>
+            <a:r>
+              <a:rPr lang="da-DK" dirty="0" err="1"/>
+              <a:t>dequeued</a:t>
+            </a:r>
+            <a:endParaRPr lang="da-DK" dirty="0"/>
+          </a:p>
+          <a:p>
             <a:endParaRPr lang="da-DK" dirty="0"/>
           </a:p>
         </p:txBody>
@@ -1038,7 +1021,7 @@
           <a:p>
             <a:fld id="{252E21F2-0B82-4ACE-A045-2AAC56859006}" type="slidenum">
               <a:rPr lang="da-DK" smtClean="0"/>
-              <a:t>20</a:t>
+              <a:t>18</a:t>
             </a:fld>
             <a:endParaRPr lang="da-DK"/>
           </a:p>
@@ -1047,7 +1030,7 @@
     </p:spTree>
     <p:extLst>
       <p:ext uri="{BB962C8B-B14F-4D97-AF65-F5344CB8AC3E}">
-        <p14:creationId xmlns:p14="http://schemas.microsoft.com/office/powerpoint/2010/main" val="2289638430"/>
+        <p14:creationId xmlns:p14="http://schemas.microsoft.com/office/powerpoint/2010/main" val="1091159589"/>
       </p:ext>
     </p:extLst>
   </p:cSld>
@@ -1101,30 +1084,7 @@
           <a:bodyPr/>
           <a:lstStyle/>
           <a:p>
-            <a:r>
-              <a:rPr lang="da-DK" dirty="0" err="1"/>
-              <a:t>Seq</a:t>
-            </a:r>
-            <a:r>
-              <a:rPr lang="da-DK" dirty="0"/>
-              <a:t> og </a:t>
-            </a:r>
-            <a:r>
-              <a:rPr lang="da-DK" dirty="0" err="1"/>
-              <a:t>Serilog</a:t>
-            </a:r>
-            <a:r>
-              <a:rPr lang="da-DK" dirty="0"/>
-              <a:t> er begge lette og små? </a:t>
-            </a:r>
-            <a:r>
-              <a:rPr lang="da-DK" dirty="0" err="1"/>
-              <a:t>Koncenteret</a:t>
-            </a:r>
-            <a:r>
-              <a:rPr lang="da-DK" dirty="0"/>
-              <a:t>? </a:t>
-            </a:r>
+            <a:endParaRPr lang="da-DK" dirty="0"/>
           </a:p>
         </p:txBody>
       </p:sp>
@@ -1145,7 +1105,7 @@
           <a:p>
             <a:fld id="{252E21F2-0B82-4ACE-A045-2AAC56859006}" type="slidenum">
               <a:rPr lang="da-DK" smtClean="0"/>
-              <a:t>21</a:t>
+              <a:t>20</a:t>
             </a:fld>
             <a:endParaRPr lang="da-DK"/>
           </a:p>
@@ -1154,7 +1114,7 @@
     </p:spTree>
     <p:extLst>
       <p:ext uri="{BB962C8B-B14F-4D97-AF65-F5344CB8AC3E}">
-        <p14:creationId xmlns:p14="http://schemas.microsoft.com/office/powerpoint/2010/main" val="2294237520"/>
+        <p14:creationId xmlns:p14="http://schemas.microsoft.com/office/powerpoint/2010/main" val="2289638430"/>
       </p:ext>
     </p:extLst>
   </p:cSld>
@@ -1209,16 +1169,28 @@
           <a:lstStyle/>
           <a:p>
             <a:r>
-              <a:rPr lang="da-DK" dirty="0"/>
-              <a:t>Kunne nævne ting som </a:t>
-            </a:r>
-            <a:r>
-              <a:rPr lang="da-DK" dirty="0" err="1"/>
-              <a:t>interceptor</a:t>
-            </a:r>
-            <a:r>
-              <a:rPr lang="da-DK" dirty="0"/>
-              <a:t> </a:t>
+              <a:rPr lang="da-DK" dirty="0" err="1"/>
+              <a:t>Seq</a:t>
+            </a:r>
+            <a:r>
+              <a:rPr lang="da-DK" dirty="0"/>
+              <a:t> og </a:t>
+            </a:r>
+            <a:r>
+              <a:rPr lang="da-DK" dirty="0" err="1"/>
+              <a:t>Serilog</a:t>
+            </a:r>
+            <a:r>
+              <a:rPr lang="da-DK" dirty="0"/>
+              <a:t> er begge lette og små? </a:t>
+            </a:r>
+            <a:r>
+              <a:rPr lang="da-DK" dirty="0" err="1"/>
+              <a:t>Koncenteret</a:t>
+            </a:r>
+            <a:r>
+              <a:rPr lang="da-DK" dirty="0"/>
+              <a:t>? </a:t>
             </a:r>
           </a:p>
         </p:txBody>
@@ -1240,7 +1212,7 @@
           <a:p>
             <a:fld id="{252E21F2-0B82-4ACE-A045-2AAC56859006}" type="slidenum">
               <a:rPr lang="da-DK" smtClean="0"/>
-              <a:t>22</a:t>
+              <a:t>21</a:t>
             </a:fld>
             <a:endParaRPr lang="da-DK"/>
           </a:p>
@@ -1249,7 +1221,7 @@
     </p:spTree>
     <p:extLst>
       <p:ext uri="{BB962C8B-B14F-4D97-AF65-F5344CB8AC3E}">
-        <p14:creationId xmlns:p14="http://schemas.microsoft.com/office/powerpoint/2010/main" val="4069340254"/>
+        <p14:creationId xmlns:p14="http://schemas.microsoft.com/office/powerpoint/2010/main" val="2294237520"/>
       </p:ext>
     </p:extLst>
   </p:cSld>
@@ -1305,50 +1277,16 @@
           <a:p>
             <a:r>
               <a:rPr lang="da-DK" dirty="0"/>
-              <a:t>20x hurtigere end JavaScript, </a:t>
-            </a:r>
-            <a:r>
-              <a:rPr lang="da-DK" dirty="0" err="1"/>
-              <a:t>stack-based</a:t>
-            </a:r>
-            <a:r>
-              <a:rPr lang="da-DK" dirty="0"/>
-              <a:t> JavaScript VM, </a:t>
-            </a:r>
-            <a:r>
-              <a:rPr lang="da-DK" dirty="0" err="1"/>
-              <a:t>sandboxed</a:t>
-            </a:r>
-            <a:r>
-              <a:rPr lang="da-DK" dirty="0"/>
-              <a:t>, binær format, C/C++ compiler</a:t>
-            </a:r>
-          </a:p>
-          <a:p>
-            <a:pPr marL="0" marR="0" lvl="0" indent="0" algn="l" defTabSz="914400" rtl="0" eaLnBrk="1" fontAlgn="auto" latinLnBrk="0" hangingPunct="1">
-              <a:lnSpc>
-                <a:spcPct val="100000"/>
-              </a:lnSpc>
-              <a:spcBef>
-                <a:spcPts val="0"/>
-              </a:spcBef>
-              <a:spcAft>
-                <a:spcPts val="0"/>
-              </a:spcAft>
-              <a:buClrTx/>
-              <a:buSzTx/>
-              <a:buFontTx/>
-              <a:buNone/>
-              <a:tabLst/>
-              <a:defRPr/>
-            </a:pPr>
-            <a:r>
-              <a:rPr lang="da-DK" dirty="0"/>
-              <a:t>https://webassembly.org/docs/faq/</a:t>
-            </a:r>
-          </a:p>
-          <a:p>
-            <a:endParaRPr lang="da-DK" dirty="0"/>
+              <a:t>Kunne nævne ting som </a:t>
+            </a:r>
+            <a:r>
+              <a:rPr lang="da-DK" dirty="0" err="1"/>
+              <a:t>interceptor</a:t>
+            </a:r>
+            <a:r>
+              <a:rPr lang="da-DK" dirty="0"/>
+              <a:t> </a:t>
+            </a:r>
           </a:p>
         </p:txBody>
       </p:sp>
@@ -1369,7 +1307,7 @@
           <a:p>
             <a:fld id="{252E21F2-0B82-4ACE-A045-2AAC56859006}" type="slidenum">
               <a:rPr lang="da-DK" smtClean="0"/>
-              <a:t>23</a:t>
+              <a:t>22</a:t>
             </a:fld>
             <a:endParaRPr lang="da-DK"/>
           </a:p>
@@ -1378,7 +1316,7 @@
     </p:spTree>
     <p:extLst>
       <p:ext uri="{BB962C8B-B14F-4D97-AF65-F5344CB8AC3E}">
-        <p14:creationId xmlns:p14="http://schemas.microsoft.com/office/powerpoint/2010/main" val="3114175968"/>
+        <p14:creationId xmlns:p14="http://schemas.microsoft.com/office/powerpoint/2010/main" val="4069340254"/>
       </p:ext>
     </p:extLst>
   </p:cSld>
@@ -1434,16 +1372,50 @@
           <a:p>
             <a:r>
               <a:rPr lang="da-DK" dirty="0"/>
-              <a:t>Kunne nævne ting som </a:t>
-            </a:r>
-            <a:r>
-              <a:rPr lang="da-DK" dirty="0" err="1"/>
-              <a:t>interceptor</a:t>
-            </a:r>
-            <a:r>
-              <a:rPr lang="da-DK" dirty="0"/>
-              <a:t> </a:t>
-            </a:r>
+              <a:t>20x hurtigere end JavaScript, </a:t>
+            </a:r>
+            <a:r>
+              <a:rPr lang="da-DK" dirty="0" err="1"/>
+              <a:t>stack-based</a:t>
+            </a:r>
+            <a:r>
+              <a:rPr lang="da-DK" dirty="0"/>
+              <a:t> JavaScript VM, </a:t>
+            </a:r>
+            <a:r>
+              <a:rPr lang="da-DK" dirty="0" err="1"/>
+              <a:t>sandboxed</a:t>
+            </a:r>
+            <a:r>
+              <a:rPr lang="da-DK" dirty="0"/>
+              <a:t>, binær format, C/C++ compiler</a:t>
+            </a:r>
+          </a:p>
+          <a:p>
+            <a:pPr marL="0" marR="0" lvl="0" indent="0" algn="l" defTabSz="914400" rtl="0" eaLnBrk="1" fontAlgn="auto" latinLnBrk="0" hangingPunct="1">
+              <a:lnSpc>
+                <a:spcPct val="100000"/>
+              </a:lnSpc>
+              <a:spcBef>
+                <a:spcPts val="0"/>
+              </a:spcBef>
+              <a:spcAft>
+                <a:spcPts val="0"/>
+              </a:spcAft>
+              <a:buClrTx/>
+              <a:buSzTx/>
+              <a:buFontTx/>
+              <a:buNone/>
+              <a:tabLst/>
+              <a:defRPr/>
+            </a:pPr>
+            <a:r>
+              <a:rPr lang="da-DK" dirty="0"/>
+              <a:t>https://webassembly.org/docs/faq/</a:t>
+            </a:r>
+          </a:p>
+          <a:p>
+            <a:endParaRPr lang="da-DK" dirty="0"/>
           </a:p>
         </p:txBody>
       </p:sp>
@@ -1464,7 +1436,7 @@
           <a:p>
             <a:fld id="{252E21F2-0B82-4ACE-A045-2AAC56859006}" type="slidenum">
               <a:rPr lang="da-DK" smtClean="0"/>
-              <a:t>25</a:t>
+              <a:t>23</a:t>
             </a:fld>
             <a:endParaRPr lang="da-DK"/>
           </a:p>
@@ -1473,7 +1445,7 @@
     </p:spTree>
     <p:extLst>
       <p:ext uri="{BB962C8B-B14F-4D97-AF65-F5344CB8AC3E}">
-        <p14:creationId xmlns:p14="http://schemas.microsoft.com/office/powerpoint/2010/main" val="2371307318"/>
+        <p14:creationId xmlns:p14="http://schemas.microsoft.com/office/powerpoint/2010/main" val="3114175968"/>
       </p:ext>
     </p:extLst>
   </p:cSld>
@@ -1528,26 +1500,17 @@
           <a:lstStyle/>
           <a:p>
             <a:r>
-              <a:rPr lang="da-DK" dirty="0" err="1"/>
-              <a:t>Refresh</a:t>
+              <a:rPr lang="da-DK" dirty="0"/>
+              <a:t>Kunne nævne ting som </a:t>
+            </a:r>
+            <a:r>
+              <a:rPr lang="da-DK" dirty="0" err="1"/>
+              <a:t>interceptor</a:t>
             </a:r>
             <a:r>
               <a:rPr lang="da-DK" dirty="0"/>
               <a:t> </a:t>
             </a:r>
-            <a:r>
-              <a:rPr lang="da-DK" dirty="0" err="1"/>
-              <a:t>token</a:t>
-            </a:r>
-            <a:r>
-              <a:rPr lang="da-DK" dirty="0"/>
-              <a:t> bliver ikke sat til invalid når den bruges til skabe nye </a:t>
-            </a:r>
-            <a:r>
-              <a:rPr lang="da-DK" dirty="0" err="1"/>
-              <a:t>tokens</a:t>
-            </a:r>
-            <a:endParaRPr lang="da-DK" dirty="0"/>
           </a:p>
         </p:txBody>
       </p:sp>
@@ -1568,7 +1531,7 @@
           <a:p>
             <a:fld id="{252E21F2-0B82-4ACE-A045-2AAC56859006}" type="slidenum">
               <a:rPr lang="da-DK" smtClean="0"/>
-              <a:t>26</a:t>
+              <a:t>25</a:t>
             </a:fld>
             <a:endParaRPr lang="da-DK"/>
           </a:p>
@@ -1577,7 +1540,7 @@
     </p:spTree>
     <p:extLst>
       <p:ext uri="{BB962C8B-B14F-4D97-AF65-F5344CB8AC3E}">
-        <p14:creationId xmlns:p14="http://schemas.microsoft.com/office/powerpoint/2010/main" val="671521866"/>
+        <p14:creationId xmlns:p14="http://schemas.microsoft.com/office/powerpoint/2010/main" val="2371307318"/>
       </p:ext>
     </p:extLst>
   </p:cSld>
@@ -1632,15 +1595,26 @@
           <a:lstStyle/>
           <a:p>
             <a:r>
-              <a:rPr lang="da-DK" dirty="0"/>
-              <a:t>https://kafka.apache.org/documentation/#intro_nutshell</a:t>
-            </a:r>
-          </a:p>
-          <a:p>
-            <a:r>
-              <a:rPr lang="da-DK" dirty="0"/>
-              <a:t>https://kafka.apache.org/documentation/#kraft_role</a:t>
-            </a:r>
+              <a:rPr lang="da-DK" dirty="0" err="1"/>
+              <a:t>Refresh</a:t>
+            </a:r>
+            <a:r>
+              <a:rPr lang="da-DK" dirty="0"/>
+              <a:t> </a:t>
+            </a:r>
+            <a:r>
+              <a:rPr lang="da-DK" dirty="0" err="1"/>
+              <a:t>token</a:t>
+            </a:r>
+            <a:r>
+              <a:rPr lang="da-DK" dirty="0"/>
+              <a:t> bliver ikke sat til invalid når den bruges til skabe nye </a:t>
+            </a:r>
+            <a:r>
+              <a:rPr lang="da-DK" dirty="0" err="1"/>
+              <a:t>tokens</a:t>
+            </a:r>
+            <a:endParaRPr lang="da-DK" dirty="0"/>
           </a:p>
         </p:txBody>
       </p:sp>
@@ -1661,7 +1635,7 @@
           <a:p>
             <a:fld id="{252E21F2-0B82-4ACE-A045-2AAC56859006}" type="slidenum">
               <a:rPr lang="da-DK" smtClean="0"/>
-              <a:t>28</a:t>
+              <a:t>26</a:t>
             </a:fld>
             <a:endParaRPr lang="da-DK"/>
           </a:p>
@@ -1670,7 +1644,7 @@
     </p:spTree>
     <p:extLst>
       <p:ext uri="{BB962C8B-B14F-4D97-AF65-F5344CB8AC3E}">
-        <p14:creationId xmlns:p14="http://schemas.microsoft.com/office/powerpoint/2010/main" val="8081506"/>
+        <p14:creationId xmlns:p14="http://schemas.microsoft.com/office/powerpoint/2010/main" val="671521866"/>
       </p:ext>
     </p:extLst>
   </p:cSld>
@@ -1724,24 +1698,30 @@
           <a:bodyPr/>
           <a:lstStyle/>
           <a:p>
-            <a:r>
-              <a:rPr lang="da-DK" dirty="0"/>
-              <a:t>https://martinfowler.com/microservices/</a:t>
-            </a:r>
-          </a:p>
-          <a:p>
-            <a:r>
-              <a:rPr lang="da-DK" dirty="0"/>
-              <a:t>Hver boks er sin egen </a:t>
-            </a:r>
-            <a:r>
-              <a:rPr lang="da-DK" dirty="0" err="1"/>
-              <a:t>microservice</a:t>
-            </a:r>
-            <a:r>
-              <a:rPr lang="da-DK" dirty="0"/>
-              <a:t> i princippet</a:t>
-            </a:r>
+            <a:pPr marL="0" marR="0" lvl="0" indent="0" algn="l" defTabSz="914400" rtl="0" eaLnBrk="1" fontAlgn="auto" latinLnBrk="0" hangingPunct="1">
+              <a:lnSpc>
+                <a:spcPct val="100000"/>
+              </a:lnSpc>
+              <a:spcBef>
+                <a:spcPts val="0"/>
+              </a:spcBef>
+              <a:spcAft>
+                <a:spcPts val="0"/>
+              </a:spcAft>
+              <a:buClrTx/>
+              <a:buSzTx/>
+              <a:buFontTx/>
+              <a:buNone/>
+              <a:tabLst/>
+              <a:defRPr/>
+            </a:pPr>
+            <a:r>
+              <a:rPr lang="da-DK" dirty="0"/>
+              <a:t>Kunne fremvise noget kode på hist og her</a:t>
+            </a:r>
+          </a:p>
+          <a:p>
+            <a:endParaRPr lang="da-DK" dirty="0"/>
           </a:p>
         </p:txBody>
       </p:sp>
@@ -1762,7 +1742,7 @@
           <a:p>
             <a:fld id="{252E21F2-0B82-4ACE-A045-2AAC56859006}" type="slidenum">
               <a:rPr lang="da-DK" smtClean="0"/>
-              <a:t>6</a:t>
+              <a:t>4</a:t>
             </a:fld>
             <a:endParaRPr lang="da-DK"/>
           </a:p>
@@ -1771,7 +1751,7 @@
     </p:spTree>
     <p:extLst>
       <p:ext uri="{BB962C8B-B14F-4D97-AF65-F5344CB8AC3E}">
-        <p14:creationId xmlns:p14="http://schemas.microsoft.com/office/powerpoint/2010/main" val="669242770"/>
+        <p14:creationId xmlns:p14="http://schemas.microsoft.com/office/powerpoint/2010/main" val="4156315854"/>
       </p:ext>
     </p:extLst>
   </p:cSld>
@@ -1825,124 +1805,15 @@
           <a:bodyPr/>
           <a:lstStyle/>
           <a:p>
-            <a:pPr marL="0" marR="0" lvl="0" indent="0" algn="l" defTabSz="914400" rtl="0" eaLnBrk="1" fontAlgn="auto" latinLnBrk="0" hangingPunct="1">
-              <a:lnSpc>
-                <a:spcPct val="100000"/>
-              </a:lnSpc>
-              <a:spcBef>
-                <a:spcPts val="0"/>
-              </a:spcBef>
-              <a:spcAft>
-                <a:spcPts val="0"/>
-              </a:spcAft>
-              <a:buClrTx/>
-              <a:buSzTx/>
-              <a:buFontTx/>
-              <a:buNone/>
-              <a:tabLst/>
-              <a:defRPr/>
-            </a:pPr>
-            <a:r>
-              <a:rPr lang="da-DK" dirty="0"/>
-              <a:t>Event </a:t>
-            </a:r>
-            <a:r>
-              <a:rPr lang="da-DK" dirty="0" err="1"/>
-              <a:t>schema</a:t>
-            </a:r>
-            <a:r>
-              <a:rPr lang="da-DK" dirty="0"/>
-              <a:t> //ikke nødvendigt</a:t>
-            </a:r>
-          </a:p>
-          <a:p>
-            <a:r>
-              <a:rPr lang="da-DK" dirty="0"/>
-              <a:t>Event, noget der er sket</a:t>
-            </a:r>
-          </a:p>
-          <a:p>
-            <a:r>
-              <a:rPr lang="da-DK" dirty="0" err="1"/>
-              <a:t>Topic</a:t>
-            </a:r>
-            <a:r>
-              <a:rPr lang="da-DK" dirty="0"/>
-              <a:t> </a:t>
-            </a:r>
-            <a:r>
-              <a:rPr lang="da-DK" dirty="0" err="1"/>
-              <a:t>partitioneret</a:t>
-            </a:r>
-            <a:r>
-              <a:rPr lang="da-DK" dirty="0"/>
-              <a:t> – en </a:t>
-            </a:r>
-            <a:r>
-              <a:rPr lang="da-DK" dirty="0" err="1"/>
-              <a:t>consumer</a:t>
-            </a:r>
-            <a:r>
-              <a:rPr lang="da-DK" dirty="0"/>
-              <a:t> kan få data fra en eller flere partitioner </a:t>
-            </a:r>
-          </a:p>
-          <a:p>
-            <a:r>
-              <a:rPr lang="da-DK" dirty="0"/>
-              <a:t>Event </a:t>
-            </a:r>
-            <a:r>
-              <a:rPr lang="da-DK" dirty="0" err="1"/>
-              <a:t>Replikering</a:t>
-            </a:r>
-            <a:r>
-              <a:rPr lang="da-DK" dirty="0"/>
-              <a:t>, event er </a:t>
-            </a:r>
-            <a:r>
-              <a:rPr lang="da-DK" dirty="0" err="1"/>
-              <a:t>replikeret</a:t>
-            </a:r>
-            <a:r>
-              <a:rPr lang="da-DK" dirty="0"/>
-              <a:t> over flere brokers</a:t>
-            </a:r>
-          </a:p>
-          <a:p>
-            <a:r>
-              <a:rPr lang="da-DK" dirty="0"/>
-              <a:t>Consumer </a:t>
-            </a:r>
-            <a:r>
-              <a:rPr lang="da-DK" dirty="0" err="1"/>
-              <a:t>groupId</a:t>
-            </a:r>
-            <a:r>
-              <a:rPr lang="da-DK" dirty="0"/>
-              <a:t>, hvis samme id, </a:t>
-            </a:r>
-            <a:r>
-              <a:rPr lang="da-DK" dirty="0" err="1"/>
-              <a:t>round-robin</a:t>
-            </a:r>
-            <a:r>
-              <a:rPr lang="da-DK" dirty="0"/>
-              <a:t> fra </a:t>
-            </a:r>
-            <a:r>
-              <a:rPr lang="da-DK" dirty="0" err="1"/>
-              <a:t>partioner</a:t>
-            </a:r>
-            <a:r>
-              <a:rPr lang="da-DK" dirty="0"/>
-              <a:t> og der er mere end en partitioner</a:t>
-            </a:r>
-          </a:p>
-          <a:p>
-            <a:r>
-              <a:rPr lang="da-DK" dirty="0"/>
-              <a:t>https://stackoverflow.com/questions/38024514/understanding-kafka-topics-and-partitions</a:t>
+            <a:r>
+              <a:rPr lang="da-DK" dirty="0"/>
+              <a:t>https://kafka.apache.org/documentation/#intro_nutshell</a:t>
+            </a:r>
+          </a:p>
+          <a:p>
+            <a:r>
+              <a:rPr lang="da-DK" dirty="0"/>
+              <a:t>https://kafka.apache.org/documentation/#kraft_role</a:t>
             </a:r>
           </a:p>
         </p:txBody>
@@ -1964,7 +1835,7 @@
           <a:p>
             <a:fld id="{252E21F2-0B82-4ACE-A045-2AAC56859006}" type="slidenum">
               <a:rPr lang="da-DK" smtClean="0"/>
-              <a:t>29</a:t>
+              <a:t>28</a:t>
             </a:fld>
             <a:endParaRPr lang="da-DK"/>
           </a:p>
@@ -1973,7 +1844,7 @@
     </p:spTree>
     <p:extLst>
       <p:ext uri="{BB962C8B-B14F-4D97-AF65-F5344CB8AC3E}">
-        <p14:creationId xmlns:p14="http://schemas.microsoft.com/office/powerpoint/2010/main" val="2764263524"/>
+        <p14:creationId xmlns:p14="http://schemas.microsoft.com/office/powerpoint/2010/main" val="8081506"/>
       </p:ext>
     </p:extLst>
   </p:cSld>
@@ -2027,7 +1898,125 @@
           <a:bodyPr/>
           <a:lstStyle/>
           <a:p>
-            <a:endParaRPr lang="da-DK" dirty="0"/>
+            <a:pPr marL="0" marR="0" lvl="0" indent="0" algn="l" defTabSz="914400" rtl="0" eaLnBrk="1" fontAlgn="auto" latinLnBrk="0" hangingPunct="1">
+              <a:lnSpc>
+                <a:spcPct val="100000"/>
+              </a:lnSpc>
+              <a:spcBef>
+                <a:spcPts val="0"/>
+              </a:spcBef>
+              <a:spcAft>
+                <a:spcPts val="0"/>
+              </a:spcAft>
+              <a:buClrTx/>
+              <a:buSzTx/>
+              <a:buFontTx/>
+              <a:buNone/>
+              <a:tabLst/>
+              <a:defRPr/>
+            </a:pPr>
+            <a:r>
+              <a:rPr lang="da-DK" dirty="0"/>
+              <a:t>Event </a:t>
+            </a:r>
+            <a:r>
+              <a:rPr lang="da-DK" dirty="0" err="1"/>
+              <a:t>schema</a:t>
+            </a:r>
+            <a:r>
+              <a:rPr lang="da-DK" dirty="0"/>
+              <a:t> //ikke nødvendigt</a:t>
+            </a:r>
+          </a:p>
+          <a:p>
+            <a:r>
+              <a:rPr lang="da-DK" dirty="0"/>
+              <a:t>Event, noget der er sket</a:t>
+            </a:r>
+          </a:p>
+          <a:p>
+            <a:r>
+              <a:rPr lang="da-DK" dirty="0" err="1"/>
+              <a:t>Topic</a:t>
+            </a:r>
+            <a:r>
+              <a:rPr lang="da-DK" dirty="0"/>
+              <a:t> </a:t>
+            </a:r>
+            <a:r>
+              <a:rPr lang="da-DK" dirty="0" err="1"/>
+              <a:t>partitioneret</a:t>
+            </a:r>
+            <a:r>
+              <a:rPr lang="da-DK" dirty="0"/>
+              <a:t> – en </a:t>
+            </a:r>
+            <a:r>
+              <a:rPr lang="da-DK" dirty="0" err="1"/>
+              <a:t>consumer</a:t>
+            </a:r>
+            <a:r>
+              <a:rPr lang="da-DK" dirty="0"/>
+              <a:t> kan få data fra en eller flere partitioner </a:t>
+            </a:r>
+          </a:p>
+          <a:p>
+            <a:r>
+              <a:rPr lang="da-DK" dirty="0"/>
+              <a:t>Event </a:t>
+            </a:r>
+            <a:r>
+              <a:rPr lang="da-DK" dirty="0" err="1"/>
+              <a:t>Replikering</a:t>
+            </a:r>
+            <a:r>
+              <a:rPr lang="da-DK" dirty="0"/>
+              <a:t>, event er </a:t>
+            </a:r>
+            <a:r>
+              <a:rPr lang="da-DK" dirty="0" err="1"/>
+              <a:t>replikeret</a:t>
+            </a:r>
+            <a:r>
+              <a:rPr lang="da-DK" dirty="0"/>
+              <a:t> over flere brokers</a:t>
+            </a:r>
+          </a:p>
+          <a:p>
+            <a:r>
+              <a:rPr lang="da-DK" dirty="0"/>
+              <a:t>Consumer </a:t>
+            </a:r>
+            <a:r>
+              <a:rPr lang="da-DK" dirty="0" err="1"/>
+              <a:t>groupId</a:t>
+            </a:r>
+            <a:r>
+              <a:rPr lang="da-DK" dirty="0"/>
+              <a:t>, hvis samme id, </a:t>
+            </a:r>
+            <a:r>
+              <a:rPr lang="da-DK" dirty="0" err="1"/>
+              <a:t>round-robin</a:t>
+            </a:r>
+            <a:r>
+              <a:rPr lang="da-DK" dirty="0"/>
+              <a:t> fra </a:t>
+            </a:r>
+            <a:r>
+              <a:rPr lang="da-DK" dirty="0" err="1"/>
+              <a:t>partioner</a:t>
+            </a:r>
+            <a:r>
+              <a:rPr lang="da-DK" dirty="0"/>
+              <a:t> og der er mere end en partitioner</a:t>
+            </a:r>
+          </a:p>
+          <a:p>
+            <a:r>
+              <a:rPr lang="da-DK" dirty="0"/>
+              <a:t>https://stackoverflow.com/questions/38024514/understanding-kafka-topics-and-partitions</a:t>
+            </a:r>
           </a:p>
         </p:txBody>
       </p:sp>
@@ -2048,7 +2037,7 @@
           <a:p>
             <a:fld id="{252E21F2-0B82-4ACE-A045-2AAC56859006}" type="slidenum">
               <a:rPr lang="da-DK" smtClean="0"/>
-              <a:t>30</a:t>
+              <a:t>29</a:t>
             </a:fld>
             <a:endParaRPr lang="da-DK"/>
           </a:p>
@@ -2057,7 +2046,7 @@
     </p:spTree>
     <p:extLst>
       <p:ext uri="{BB962C8B-B14F-4D97-AF65-F5344CB8AC3E}">
-        <p14:creationId xmlns:p14="http://schemas.microsoft.com/office/powerpoint/2010/main" val="2125408469"/>
+        <p14:creationId xmlns:p14="http://schemas.microsoft.com/office/powerpoint/2010/main" val="2764263524"/>
       </p:ext>
     </p:extLst>
   </p:cSld>
@@ -2111,36 +2100,7 @@
           <a:bodyPr/>
           <a:lstStyle/>
           <a:p>
-            <a:r>
-              <a:rPr lang="da-DK" dirty="0"/>
-              <a:t>Nævn at broker nu kan være controllers, men før var det zookeeper</a:t>
-            </a:r>
-          </a:p>
-          <a:p>
-            <a:r>
-              <a:rPr lang="da-DK" dirty="0" err="1"/>
-              <a:t>ZooKeeper</a:t>
-            </a:r>
-            <a:r>
-              <a:rPr lang="da-DK" dirty="0"/>
-              <a:t> udskiftet med </a:t>
-            </a:r>
-            <a:r>
-              <a:rPr lang="da-DK" dirty="0" err="1"/>
-              <a:t>KRaft</a:t>
-            </a:r>
-            <a:r>
-              <a:rPr lang="da-DK" dirty="0"/>
-              <a:t>, en </a:t>
-            </a:r>
-            <a:r>
-              <a:rPr lang="da-DK" dirty="0" err="1"/>
-              <a:t>kafka</a:t>
-            </a:r>
-            <a:r>
-              <a:rPr lang="da-DK" dirty="0"/>
-              <a:t> server som enten er en controller, broker eller begge</a:t>
-            </a:r>
+            <a:endParaRPr lang="da-DK" dirty="0"/>
           </a:p>
         </p:txBody>
       </p:sp>
@@ -2161,7 +2121,7 @@
           <a:p>
             <a:fld id="{252E21F2-0B82-4ACE-A045-2AAC56859006}" type="slidenum">
               <a:rPr lang="da-DK" smtClean="0"/>
-              <a:t>31</a:t>
+              <a:t>30</a:t>
             </a:fld>
             <a:endParaRPr lang="da-DK"/>
           </a:p>
@@ -2170,7 +2130,7 @@
     </p:spTree>
     <p:extLst>
       <p:ext uri="{BB962C8B-B14F-4D97-AF65-F5344CB8AC3E}">
-        <p14:creationId xmlns:p14="http://schemas.microsoft.com/office/powerpoint/2010/main" val="3998614641"/>
+        <p14:creationId xmlns:p14="http://schemas.microsoft.com/office/powerpoint/2010/main" val="2125408469"/>
       </p:ext>
     </p:extLst>
   </p:cSld>
@@ -2225,81 +2185,34 @@
           <a:lstStyle/>
           <a:p>
             <a:r>
-              <a:rPr lang="da-DK" dirty="0" err="1"/>
-              <a:t>Confluent</a:t>
-            </a:r>
-            <a:r>
-              <a:rPr lang="da-DK" dirty="0"/>
-              <a:t> Kafka</a:t>
-            </a:r>
-          </a:p>
-          <a:p>
-            <a:r>
-              <a:rPr lang="da-DK" dirty="0"/>
-              <a:t>Kunne havde brugt </a:t>
-            </a:r>
-            <a:r>
-              <a:rPr lang="da-DK" dirty="0" err="1"/>
-              <a:t>Knet</a:t>
-            </a:r>
-            <a:endParaRPr lang="da-DK" dirty="0"/>
-          </a:p>
-          <a:p>
-            <a:r>
-              <a:rPr lang="da-DK" dirty="0"/>
-              <a:t>JSON, </a:t>
-            </a:r>
-            <a:r>
-              <a:rPr lang="da-DK" dirty="0" err="1"/>
-              <a:t>Arvo</a:t>
-            </a:r>
-            <a:r>
-              <a:rPr lang="da-DK" dirty="0"/>
-              <a:t>, </a:t>
-            </a:r>
-            <a:r>
-              <a:rPr lang="da-DK" dirty="0" err="1"/>
-              <a:t>Protobuf</a:t>
-            </a:r>
-            <a:r>
-              <a:rPr lang="da-DK" dirty="0"/>
-              <a:t>. </a:t>
-            </a:r>
-            <a:r>
-              <a:rPr lang="da-DK" dirty="0" err="1"/>
-              <a:t>Arvo</a:t>
-            </a:r>
-            <a:r>
-              <a:rPr lang="da-DK" dirty="0"/>
-              <a:t> brugt, da den virker til at være det mest </a:t>
-            </a:r>
-            <a:r>
-              <a:rPr lang="da-DK" dirty="0" err="1"/>
-              <a:t>almendlige</a:t>
-            </a:r>
-            <a:r>
-              <a:rPr lang="da-DK" dirty="0"/>
-              <a:t>. </a:t>
-            </a:r>
-            <a:r>
-              <a:rPr lang="da-DK" dirty="0" err="1"/>
-              <a:t>Arvo</a:t>
-            </a:r>
-            <a:r>
-              <a:rPr lang="da-DK" dirty="0"/>
-              <a:t> er Apache</a:t>
-            </a:r>
-          </a:p>
-          <a:p>
-            <a:r>
-              <a:rPr lang="da-DK" dirty="0"/>
-              <a:t>Key/Value, Key bruges til at sikre sig at beskeder sendes til den samme partition</a:t>
-            </a:r>
-          </a:p>
-          <a:p>
-            <a:r>
-              <a:rPr lang="da-DK" dirty="0"/>
-              <a:t>https://github.com/confluentinc/cp-all-in-one/blob/7.6.1-post/cp-all-in-one-kraft/docker-compose.yml</a:t>
+              <a:rPr lang="da-DK" dirty="0"/>
+              <a:t>Nævn at broker nu kan være controllers, men før var det zookeeper</a:t>
+            </a:r>
+          </a:p>
+          <a:p>
+            <a:r>
+              <a:rPr lang="da-DK" dirty="0" err="1"/>
+              <a:t>ZooKeeper</a:t>
+            </a:r>
+            <a:r>
+              <a:rPr lang="da-DK" dirty="0"/>
+              <a:t> udskiftet med </a:t>
+            </a:r>
+            <a:r>
+              <a:rPr lang="da-DK" dirty="0" err="1"/>
+              <a:t>KRaft</a:t>
+            </a:r>
+            <a:r>
+              <a:rPr lang="da-DK" dirty="0"/>
+              <a:t>, en </a:t>
+            </a:r>
+            <a:r>
+              <a:rPr lang="da-DK" dirty="0" err="1"/>
+              <a:t>kafka</a:t>
+            </a:r>
+            <a:r>
+              <a:rPr lang="da-DK" dirty="0"/>
+              <a:t> server som enten er en controller, broker eller begge</a:t>
             </a:r>
           </a:p>
         </p:txBody>
@@ -2321,7 +2234,7 @@
           <a:p>
             <a:fld id="{252E21F2-0B82-4ACE-A045-2AAC56859006}" type="slidenum">
               <a:rPr lang="da-DK" smtClean="0"/>
-              <a:t>32</a:t>
+              <a:t>31</a:t>
             </a:fld>
             <a:endParaRPr lang="da-DK"/>
           </a:p>
@@ -2330,7 +2243,7 @@
     </p:spTree>
     <p:extLst>
       <p:ext uri="{BB962C8B-B14F-4D97-AF65-F5344CB8AC3E}">
-        <p14:creationId xmlns:p14="http://schemas.microsoft.com/office/powerpoint/2010/main" val="3004894068"/>
+        <p14:creationId xmlns:p14="http://schemas.microsoft.com/office/powerpoint/2010/main" val="3998614641"/>
       </p:ext>
     </p:extLst>
   </p:cSld>
@@ -2386,40 +2299,10 @@
           <a:p>
             <a:r>
               <a:rPr lang="da-DK" dirty="0"/>
-              <a:t>Remote Procedure </a:t>
-            </a:r>
-            <a:r>
-              <a:rPr lang="da-DK" dirty="0" err="1"/>
-              <a:t>Cal</a:t>
-            </a:r>
-            <a:endParaRPr lang="da-DK" dirty="0"/>
-          </a:p>
-          <a:p>
-            <a:r>
-              <a:rPr lang="da-DK" dirty="0"/>
               <a:t>Nævn at </a:t>
             </a:r>
             <a:r>
               <a:rPr lang="da-DK" dirty="0" err="1"/>
-              <a:t>kafka</a:t>
-            </a:r>
-            <a:r>
-              <a:rPr lang="da-DK" dirty="0"/>
-              <a:t> ikke understøtter </a:t>
-            </a:r>
-            <a:r>
-              <a:rPr lang="da-DK" dirty="0" err="1"/>
-              <a:t>request-response</a:t>
-            </a:r>
-            <a:endParaRPr lang="da-DK" dirty="0"/>
-          </a:p>
-          <a:p>
-            <a:r>
-              <a:rPr lang="da-DK" dirty="0"/>
-              <a:t>Nævn at </a:t>
-            </a:r>
-            <a:r>
-              <a:rPr lang="da-DK" dirty="0" err="1"/>
               <a:t>Rabbit</a:t>
             </a:r>
             <a:r>
@@ -2508,21 +2391,7 @@
             </a:r>
             <a:r>
               <a:rPr lang="da-DK" dirty="0"/>
-              <a:t>. </a:t>
-            </a:r>
-          </a:p>
-          <a:p>
-            <a:r>
-              <a:rPr lang="da-DK" dirty="0"/>
-              <a:t>https://kafka.apache.org/documentation/#intro_nutshell nævner Kafka som en alternativ til </a:t>
-            </a:r>
-            <a:r>
-              <a:rPr lang="da-DK" dirty="0" err="1"/>
-              <a:t>RabbitMQ</a:t>
-            </a:r>
-            <a:r>
-              <a:rPr lang="da-DK" dirty="0"/>
-              <a:t> </a:t>
+              <a:t>.</a:t>
             </a:r>
           </a:p>
         </p:txBody>
@@ -2544,7 +2413,7 @@
           <a:p>
             <a:fld id="{252E21F2-0B82-4ACE-A045-2AAC56859006}" type="slidenum">
               <a:rPr lang="da-DK" smtClean="0"/>
-              <a:t>33</a:t>
+              <a:t>32</a:t>
             </a:fld>
             <a:endParaRPr lang="da-DK"/>
           </a:p>
@@ -2553,7 +2422,7 @@
     </p:spTree>
     <p:extLst>
       <p:ext uri="{BB962C8B-B14F-4D97-AF65-F5344CB8AC3E}">
-        <p14:creationId xmlns:p14="http://schemas.microsoft.com/office/powerpoint/2010/main" val="1108710331"/>
+        <p14:creationId xmlns:p14="http://schemas.microsoft.com/office/powerpoint/2010/main" val="706796139"/>
       </p:ext>
     </p:extLst>
   </p:cSld>
@@ -2609,7 +2478,75 @@
           <a:p>
             <a:r>
               <a:rPr lang="da-DK" dirty="0"/>
-              <a:t>Nævn at for </a:t>
+              <a:t>Nævn at </a:t>
+            </a:r>
+            <a:r>
+              <a:rPr lang="da-DK" dirty="0" err="1"/>
+              <a:t>Rabbit</a:t>
+            </a:r>
+            <a:r>
+              <a:rPr lang="da-DK" dirty="0"/>
+              <a:t> Stream tillader en </a:t>
+            </a:r>
+            <a:r>
+              <a:rPr lang="da-DK" dirty="0" err="1"/>
+              <a:t>ligende</a:t>
+            </a:r>
+            <a:r>
+              <a:rPr lang="da-DK" dirty="0"/>
+              <a:t> opførelse som Kafka</a:t>
+            </a:r>
+          </a:p>
+          <a:p>
+            <a:r>
+              <a:rPr lang="da-DK" dirty="0"/>
+              <a:t>Korrekt opsætning af producer, </a:t>
+            </a:r>
+            <a:r>
+              <a:rPr lang="da-DK" dirty="0" err="1"/>
+              <a:t>consumer</a:t>
+            </a:r>
+            <a:r>
+              <a:rPr lang="da-DK" dirty="0"/>
+              <a:t> og partitioner tillader </a:t>
+            </a:r>
+            <a:r>
+              <a:rPr lang="da-DK" dirty="0" err="1"/>
+              <a:t>round-robin</a:t>
+            </a:r>
+            <a:r>
+              <a:rPr lang="da-DK" dirty="0"/>
+              <a:t> i Kafka. Flere </a:t>
+            </a:r>
+            <a:r>
+              <a:rPr lang="da-DK" dirty="0" err="1"/>
+              <a:t>consumer</a:t>
+            </a:r>
+            <a:r>
+              <a:rPr lang="da-DK" dirty="0"/>
+              <a:t> end partitioner, nogle </a:t>
+            </a:r>
+            <a:r>
+              <a:rPr lang="da-DK" dirty="0" err="1"/>
+              <a:t>consumer</a:t>
+            </a:r>
+            <a:r>
+              <a:rPr lang="da-DK" dirty="0"/>
+              <a:t> får intet data</a:t>
+            </a:r>
+          </a:p>
+          <a:p>
+            <a:r>
+              <a:rPr lang="da-DK" dirty="0"/>
+              <a:t>Kafka </a:t>
+            </a:r>
+            <a:r>
+              <a:rPr lang="da-DK" dirty="0" err="1"/>
+              <a:t>consumer</a:t>
+            </a:r>
+            <a:r>
+              <a:rPr lang="da-DK" dirty="0"/>
+              <a:t> kan læse enten læse events efter opstart eller også dem før. </a:t>
             </a:r>
             <a:r>
               <a:rPr lang="da-DK" dirty="0" err="1"/>
@@ -2617,7 +2554,7 @@
             </a:r>
             <a:r>
               <a:rPr lang="da-DK" dirty="0"/>
-              <a:t> er der intet der tvinger en </a:t>
+              <a:t> </a:t>
             </a:r>
             <a:r>
               <a:rPr lang="da-DK" dirty="0" err="1"/>
@@ -2625,24 +2562,15 @@
             </a:r>
             <a:r>
               <a:rPr lang="da-DK" dirty="0"/>
-              <a:t> at svare på en RPC</a:t>
-            </a:r>
-          </a:p>
-          <a:p>
-            <a:r>
-              <a:rPr lang="da-DK" dirty="0"/>
-              <a:t>Kafka er nok bedre for Event Collaboration/</a:t>
-            </a:r>
-            <a:r>
-              <a:rPr lang="da-DK" dirty="0" err="1"/>
-              <a:t>Sourcing</a:t>
-            </a:r>
-            <a:endParaRPr lang="da-DK" dirty="0"/>
-          </a:p>
-          <a:p>
-            <a:r>
-              <a:rPr lang="da-DK" dirty="0"/>
-              <a:t>https://martinfowler.com/eaaDev/EventCollaboration.html</a:t>
+              <a:t> læser beskeder i </a:t>
+            </a:r>
+            <a:r>
+              <a:rPr lang="da-DK" dirty="0" err="1"/>
+              <a:t>quenen</a:t>
+            </a:r>
+            <a:r>
+              <a:rPr lang="da-DK" dirty="0"/>
+              <a:t>.</a:t>
             </a:r>
           </a:p>
         </p:txBody>
@@ -2664,7 +2592,7 @@
           <a:p>
             <a:fld id="{252E21F2-0B82-4ACE-A045-2AAC56859006}" type="slidenum">
               <a:rPr lang="da-DK" smtClean="0"/>
-              <a:t>34</a:t>
+              <a:t>33</a:t>
             </a:fld>
             <a:endParaRPr lang="da-DK"/>
           </a:p>
@@ -2673,7 +2601,7 @@
     </p:spTree>
     <p:extLst>
       <p:ext uri="{BB962C8B-B14F-4D97-AF65-F5344CB8AC3E}">
-        <p14:creationId xmlns:p14="http://schemas.microsoft.com/office/powerpoint/2010/main" val="282527506"/>
+        <p14:creationId xmlns:p14="http://schemas.microsoft.com/office/powerpoint/2010/main" val="193030540"/>
       </p:ext>
     </p:extLst>
   </p:cSld>
@@ -2729,27 +2657,29 @@
           <a:p>
             <a:r>
               <a:rPr lang="da-DK" dirty="0"/>
-              <a:t>Begge kræver at de kender hinanden.</a:t>
-            </a:r>
-          </a:p>
-          <a:p>
-            <a:r>
-              <a:rPr lang="da-DK" dirty="0"/>
-              <a:t>A kunne sende en url’en til en REST API med over</a:t>
-            </a:r>
-          </a:p>
-          <a:p>
-            <a:r>
-              <a:rPr lang="da-DK" dirty="0"/>
-              <a:t>Kafka er nok bedre hvis </a:t>
-            </a:r>
-            <a:r>
-              <a:rPr lang="da-DK" dirty="0" err="1"/>
-              <a:t>producer’en</a:t>
-            </a:r>
-            <a:r>
-              <a:rPr lang="da-DK" dirty="0"/>
-              <a:t> ikke skal reagere på </a:t>
+              <a:t>Nævn at </a:t>
+            </a:r>
+            <a:r>
+              <a:rPr lang="da-DK" dirty="0" err="1"/>
+              <a:t>Rabbit</a:t>
+            </a:r>
+            <a:r>
+              <a:rPr lang="da-DK" dirty="0"/>
+              <a:t> Stream tillader en </a:t>
+            </a:r>
+            <a:r>
+              <a:rPr lang="da-DK" dirty="0" err="1"/>
+              <a:t>ligende</a:t>
+            </a:r>
+            <a:r>
+              <a:rPr lang="da-DK" dirty="0"/>
+              <a:t> opførelse som Kafka</a:t>
+            </a:r>
+          </a:p>
+          <a:p>
+            <a:r>
+              <a:rPr lang="da-DK" dirty="0"/>
+              <a:t>Korrekt opsætning af producer, </a:t>
             </a:r>
             <a:r>
               <a:rPr lang="da-DK" dirty="0" err="1"/>
@@ -2757,29 +2687,229 @@
             </a:r>
             <a:r>
               <a:rPr lang="da-DK" dirty="0"/>
+              <a:t> og partitioner tillader </a:t>
+            </a:r>
+            <a:r>
+              <a:rPr lang="da-DK" dirty="0" err="1"/>
+              <a:t>round-robin</a:t>
+            </a:r>
+            <a:r>
+              <a:rPr lang="da-DK" dirty="0"/>
+              <a:t> i Kafka. Flere </a:t>
+            </a:r>
+            <a:r>
+              <a:rPr lang="da-DK" dirty="0" err="1"/>
+              <a:t>consumer</a:t>
+            </a:r>
+            <a:r>
+              <a:rPr lang="da-DK" dirty="0"/>
+              <a:t> end partitioner, nogle </a:t>
+            </a:r>
+            <a:r>
+              <a:rPr lang="da-DK" dirty="0" err="1"/>
+              <a:t>consumer</a:t>
+            </a:r>
+            <a:r>
+              <a:rPr lang="da-DK" dirty="0"/>
+              <a:t> får intet data</a:t>
+            </a:r>
+          </a:p>
+          <a:p>
+            <a:r>
+              <a:rPr lang="da-DK" dirty="0"/>
+              <a:t>Kafka </a:t>
+            </a:r>
+            <a:r>
+              <a:rPr lang="da-DK" dirty="0" err="1"/>
+              <a:t>consumer</a:t>
+            </a:r>
+            <a:r>
+              <a:rPr lang="da-DK" dirty="0"/>
+              <a:t> kan læse enten læse events efter opstart eller også dem før. </a:t>
+            </a:r>
+            <a:r>
+              <a:rPr lang="da-DK" dirty="0" err="1"/>
+              <a:t>RabbitMQ</a:t>
+            </a:r>
+            <a:r>
+              <a:rPr lang="da-DK" dirty="0"/>
               <a:t> </a:t>
             </a:r>
-          </a:p>
-          <a:p>
-            <a:r>
-              <a:rPr lang="da-DK" dirty="0"/>
-              <a:t>Sidste kræver at kun en enkel </a:t>
-            </a:r>
             <a:r>
               <a:rPr lang="da-DK" dirty="0" err="1"/>
               <a:t>consumer</a:t>
             </a:r>
             <a:r>
               <a:rPr lang="da-DK" dirty="0"/>
-              <a:t> </a:t>
-            </a:r>
-            <a:r>
-              <a:rPr lang="da-DK" dirty="0" err="1"/>
-              <a:t>group</a:t>
-            </a:r>
-            <a:r>
-              <a:rPr lang="da-DK" dirty="0"/>
-              <a:t> sender data tilbage</a:t>
+              <a:t> læser beskeder i </a:t>
+            </a:r>
+            <a:r>
+              <a:rPr lang="da-DK" dirty="0" err="1"/>
+              <a:t>quenen</a:t>
+            </a:r>
+            <a:r>
+              <a:rPr lang="da-DK" dirty="0"/>
+              <a:t>.</a:t>
+            </a:r>
+          </a:p>
+        </p:txBody>
+      </p:sp>
+      <p:sp>
+        <p:nvSpPr>
+          <p:cNvPr id="4" name="Pladsholder til slidenummer 3"/>
+          <p:cNvSpPr>
+            <a:spLocks noGrp="1"/>
+          </p:cNvSpPr>
+          <p:nvPr>
+            <p:ph type="sldNum" sz="quarter" idx="5"/>
+          </p:nvPr>
+        </p:nvSpPr>
+        <p:spPr/>
+        <p:txBody>
+          <a:bodyPr/>
+          <a:lstStyle/>
+          <a:p>
+            <a:fld id="{252E21F2-0B82-4ACE-A045-2AAC56859006}" type="slidenum">
+              <a:rPr lang="da-DK" smtClean="0"/>
+              <a:t>34</a:t>
+            </a:fld>
+            <a:endParaRPr lang="da-DK"/>
+          </a:p>
+        </p:txBody>
+      </p:sp>
+    </p:spTree>
+    <p:extLst>
+      <p:ext uri="{BB962C8B-B14F-4D97-AF65-F5344CB8AC3E}">
+        <p14:creationId xmlns:p14="http://schemas.microsoft.com/office/powerpoint/2010/main" val="3854854098"/>
+      </p:ext>
+    </p:extLst>
+  </p:cSld>
+  <p:clrMapOvr>
+    <a:masterClrMapping/>
+  </p:clrMapOvr>
+</p:notes>
+</file>
+
+<file path=ppt/notesSlides/notesSlide27.xml><?xml version="1.0" encoding="utf-8"?>
+<p:notes xmlns:a="http://schemas.openxmlformats.org/drawingml/2006/main" xmlns:r="http://schemas.openxmlformats.org/officeDocument/2006/relationships" xmlns:p="http://schemas.openxmlformats.org/presentationml/2006/main">
+  <p:cSld>
+    <p:spTree>
+      <p:nvGrpSpPr>
+        <p:cNvPr id="1" name=""/>
+        <p:cNvGrpSpPr/>
+        <p:nvPr/>
+      </p:nvGrpSpPr>
+      <p:grpSpPr>
+        <a:xfrm>
+          <a:off x="0" y="0"/>
+          <a:ext cx="0" cy="0"/>
+          <a:chOff x="0" y="0"/>
+          <a:chExt cx="0" cy="0"/>
+        </a:xfrm>
+      </p:grpSpPr>
+      <p:sp>
+        <p:nvSpPr>
+          <p:cNvPr id="2" name="Pladsholder til slidebillede 1"/>
+          <p:cNvSpPr>
+            <a:spLocks noGrp="1" noRot="1" noChangeAspect="1"/>
+          </p:cNvSpPr>
+          <p:nvPr>
+            <p:ph type="sldImg"/>
+          </p:nvPr>
+        </p:nvSpPr>
+        <p:spPr/>
+      </p:sp>
+      <p:sp>
+        <p:nvSpPr>
+          <p:cNvPr id="3" name="Pladsholder til noter 2"/>
+          <p:cNvSpPr>
+            <a:spLocks noGrp="1"/>
+          </p:cNvSpPr>
+          <p:nvPr>
+            <p:ph type="body" idx="1"/>
+          </p:nvPr>
+        </p:nvSpPr>
+        <p:spPr/>
+        <p:txBody>
+          <a:bodyPr/>
+          <a:lstStyle/>
+          <a:p>
+            <a:r>
+              <a:rPr lang="da-DK" dirty="0" err="1"/>
+              <a:t>Confluent</a:t>
+            </a:r>
+            <a:r>
+              <a:rPr lang="da-DK" dirty="0"/>
+              <a:t> Kafka</a:t>
+            </a:r>
+          </a:p>
+          <a:p>
+            <a:r>
+              <a:rPr lang="da-DK" dirty="0"/>
+              <a:t>Kunne havde brugt </a:t>
+            </a:r>
+            <a:r>
+              <a:rPr lang="da-DK" dirty="0" err="1"/>
+              <a:t>Knet</a:t>
+            </a:r>
+            <a:endParaRPr lang="da-DK" dirty="0"/>
+          </a:p>
+          <a:p>
+            <a:r>
+              <a:rPr lang="da-DK" dirty="0"/>
+              <a:t>JSON, </a:t>
+            </a:r>
+            <a:r>
+              <a:rPr lang="da-DK" dirty="0" err="1"/>
+              <a:t>Arvo</a:t>
+            </a:r>
+            <a:r>
+              <a:rPr lang="da-DK" dirty="0"/>
+              <a:t>, </a:t>
+            </a:r>
+            <a:r>
+              <a:rPr lang="da-DK" dirty="0" err="1"/>
+              <a:t>Protobuf</a:t>
+            </a:r>
+            <a:r>
+              <a:rPr lang="da-DK" dirty="0"/>
+              <a:t>. </a:t>
+            </a:r>
+            <a:r>
+              <a:rPr lang="da-DK" dirty="0" err="1"/>
+              <a:t>Arvo</a:t>
+            </a:r>
+            <a:r>
+              <a:rPr lang="da-DK" dirty="0"/>
+              <a:t> brugt, da den virker til at være det mest </a:t>
+            </a:r>
+            <a:r>
+              <a:rPr lang="da-DK" dirty="0" err="1"/>
+              <a:t>almendlige</a:t>
+            </a:r>
+            <a:r>
+              <a:rPr lang="da-DK" dirty="0"/>
+              <a:t>. </a:t>
+            </a:r>
+            <a:r>
+              <a:rPr lang="da-DK" dirty="0" err="1"/>
+              <a:t>Arvo</a:t>
+            </a:r>
+            <a:r>
+              <a:rPr lang="da-DK" dirty="0"/>
+              <a:t> er Apache</a:t>
+            </a:r>
+          </a:p>
+          <a:p>
+            <a:r>
+              <a:rPr lang="da-DK" dirty="0"/>
+              <a:t>Key/Value, Key bruges til at sikre sig at beskeder sendes til den samme partition</a:t>
+            </a:r>
+          </a:p>
+          <a:p>
+            <a:r>
+              <a:rPr lang="da-DK" dirty="0"/>
+              <a:t>https://github.com/confluentinc/cp-all-in-one/blob/7.6.1-post/cp-all-in-one-kraft/docker-compose.yml</a:t>
             </a:r>
           </a:p>
         </p:txBody>
@@ -2810,7 +2940,255 @@
     </p:spTree>
     <p:extLst>
       <p:ext uri="{BB962C8B-B14F-4D97-AF65-F5344CB8AC3E}">
-        <p14:creationId xmlns:p14="http://schemas.microsoft.com/office/powerpoint/2010/main" val="1430961321"/>
+        <p14:creationId xmlns:p14="http://schemas.microsoft.com/office/powerpoint/2010/main" val="3004894068"/>
+      </p:ext>
+    </p:extLst>
+  </p:cSld>
+  <p:clrMapOvr>
+    <a:masterClrMapping/>
+  </p:clrMapOvr>
+</p:notes>
+</file>
+
+<file path=ppt/notesSlides/notesSlide28.xml><?xml version="1.0" encoding="utf-8"?>
+<p:notes xmlns:a="http://schemas.openxmlformats.org/drawingml/2006/main" xmlns:r="http://schemas.openxmlformats.org/officeDocument/2006/relationships" xmlns:p="http://schemas.openxmlformats.org/presentationml/2006/main">
+  <p:cSld>
+    <p:spTree>
+      <p:nvGrpSpPr>
+        <p:cNvPr id="1" name=""/>
+        <p:cNvGrpSpPr/>
+        <p:nvPr/>
+      </p:nvGrpSpPr>
+      <p:grpSpPr>
+        <a:xfrm>
+          <a:off x="0" y="0"/>
+          <a:ext cx="0" cy="0"/>
+          <a:chOff x="0" y="0"/>
+          <a:chExt cx="0" cy="0"/>
+        </a:xfrm>
+      </p:grpSpPr>
+      <p:sp>
+        <p:nvSpPr>
+          <p:cNvPr id="2" name="Pladsholder til slidebillede 1"/>
+          <p:cNvSpPr>
+            <a:spLocks noGrp="1" noRot="1" noChangeAspect="1"/>
+          </p:cNvSpPr>
+          <p:nvPr>
+            <p:ph type="sldImg"/>
+          </p:nvPr>
+        </p:nvSpPr>
+        <p:spPr/>
+      </p:sp>
+      <p:sp>
+        <p:nvSpPr>
+          <p:cNvPr id="3" name="Pladsholder til noter 2"/>
+          <p:cNvSpPr>
+            <a:spLocks noGrp="1"/>
+          </p:cNvSpPr>
+          <p:nvPr>
+            <p:ph type="body" idx="1"/>
+          </p:nvPr>
+        </p:nvSpPr>
+        <p:spPr/>
+        <p:txBody>
+          <a:bodyPr/>
+          <a:lstStyle/>
+          <a:p>
+            <a:r>
+              <a:rPr lang="da-DK" dirty="0"/>
+              <a:t>Remote Procedure </a:t>
+            </a:r>
+            <a:r>
+              <a:rPr lang="da-DK" dirty="0" err="1"/>
+              <a:t>Cal</a:t>
+            </a:r>
+            <a:endParaRPr lang="da-DK" dirty="0"/>
+          </a:p>
+          <a:p>
+            <a:r>
+              <a:rPr lang="da-DK" dirty="0"/>
+              <a:t>Nævn at </a:t>
+            </a:r>
+            <a:r>
+              <a:rPr lang="da-DK" dirty="0" err="1"/>
+              <a:t>kafka</a:t>
+            </a:r>
+            <a:r>
+              <a:rPr lang="da-DK" dirty="0"/>
+              <a:t> ikke understøtter </a:t>
+            </a:r>
+            <a:r>
+              <a:rPr lang="da-DK" dirty="0" err="1"/>
+              <a:t>request-response</a:t>
+            </a:r>
+            <a:r>
+              <a:rPr lang="da-DK" dirty="0"/>
+              <a:t> </a:t>
+            </a:r>
+          </a:p>
+          <a:p>
+            <a:r>
+              <a:rPr lang="da-DK" dirty="0"/>
+              <a:t>https://kafka.apache.org/documentation/#intro_nutshell nævner Kafka som en alternativ til </a:t>
+            </a:r>
+            <a:r>
+              <a:rPr lang="da-DK" dirty="0" err="1"/>
+              <a:t>RabbitMQ</a:t>
+            </a:r>
+            <a:r>
+              <a:rPr lang="da-DK" dirty="0"/>
+              <a:t> </a:t>
+            </a:r>
+          </a:p>
+        </p:txBody>
+      </p:sp>
+      <p:sp>
+        <p:nvSpPr>
+          <p:cNvPr id="4" name="Pladsholder til slidenummer 3"/>
+          <p:cNvSpPr>
+            <a:spLocks noGrp="1"/>
+          </p:cNvSpPr>
+          <p:nvPr>
+            <p:ph type="sldNum" sz="quarter" idx="5"/>
+          </p:nvPr>
+        </p:nvSpPr>
+        <p:spPr/>
+        <p:txBody>
+          <a:bodyPr/>
+          <a:lstStyle/>
+          <a:p>
+            <a:fld id="{252E21F2-0B82-4ACE-A045-2AAC56859006}" type="slidenum">
+              <a:rPr lang="da-DK" smtClean="0"/>
+              <a:t>36</a:t>
+            </a:fld>
+            <a:endParaRPr lang="da-DK"/>
+          </a:p>
+        </p:txBody>
+      </p:sp>
+    </p:spTree>
+    <p:extLst>
+      <p:ext uri="{BB962C8B-B14F-4D97-AF65-F5344CB8AC3E}">
+        <p14:creationId xmlns:p14="http://schemas.microsoft.com/office/powerpoint/2010/main" val="1108710331"/>
+      </p:ext>
+    </p:extLst>
+  </p:cSld>
+  <p:clrMapOvr>
+    <a:masterClrMapping/>
+  </p:clrMapOvr>
+</p:notes>
+</file>
+
+<file path=ppt/notesSlides/notesSlide29.xml><?xml version="1.0" encoding="utf-8"?>
+<p:notes xmlns:a="http://schemas.openxmlformats.org/drawingml/2006/main" xmlns:r="http://schemas.openxmlformats.org/officeDocument/2006/relationships" xmlns:p="http://schemas.openxmlformats.org/presentationml/2006/main">
+  <p:cSld>
+    <p:spTree>
+      <p:nvGrpSpPr>
+        <p:cNvPr id="1" name=""/>
+        <p:cNvGrpSpPr/>
+        <p:nvPr/>
+      </p:nvGrpSpPr>
+      <p:grpSpPr>
+        <a:xfrm>
+          <a:off x="0" y="0"/>
+          <a:ext cx="0" cy="0"/>
+          <a:chOff x="0" y="0"/>
+          <a:chExt cx="0" cy="0"/>
+        </a:xfrm>
+      </p:grpSpPr>
+      <p:sp>
+        <p:nvSpPr>
+          <p:cNvPr id="2" name="Pladsholder til slidebillede 1"/>
+          <p:cNvSpPr>
+            <a:spLocks noGrp="1" noRot="1" noChangeAspect="1"/>
+          </p:cNvSpPr>
+          <p:nvPr>
+            <p:ph type="sldImg"/>
+          </p:nvPr>
+        </p:nvSpPr>
+        <p:spPr/>
+      </p:sp>
+      <p:sp>
+        <p:nvSpPr>
+          <p:cNvPr id="3" name="Pladsholder til noter 2"/>
+          <p:cNvSpPr>
+            <a:spLocks noGrp="1"/>
+          </p:cNvSpPr>
+          <p:nvPr>
+            <p:ph type="body" idx="1"/>
+          </p:nvPr>
+        </p:nvSpPr>
+        <p:spPr/>
+        <p:txBody>
+          <a:bodyPr/>
+          <a:lstStyle/>
+          <a:p>
+            <a:r>
+              <a:rPr lang="da-DK" dirty="0"/>
+              <a:t>Nævn at for </a:t>
+            </a:r>
+            <a:r>
+              <a:rPr lang="da-DK" dirty="0" err="1"/>
+              <a:t>RabbitMQ</a:t>
+            </a:r>
+            <a:r>
+              <a:rPr lang="da-DK" dirty="0"/>
+              <a:t> er der intet der tvinger en </a:t>
+            </a:r>
+            <a:r>
+              <a:rPr lang="da-DK" dirty="0" err="1"/>
+              <a:t>consumer</a:t>
+            </a:r>
+            <a:r>
+              <a:rPr lang="da-DK" dirty="0"/>
+              <a:t> at svare på en RPC</a:t>
+            </a:r>
+          </a:p>
+          <a:p>
+            <a:r>
+              <a:rPr lang="da-DK" dirty="0"/>
+              <a:t>Kafka er nok bedre for Event Collaboration/</a:t>
+            </a:r>
+            <a:r>
+              <a:rPr lang="da-DK" dirty="0" err="1"/>
+              <a:t>Sourcing</a:t>
+            </a:r>
+            <a:endParaRPr lang="da-DK" dirty="0"/>
+          </a:p>
+          <a:p>
+            <a:r>
+              <a:rPr lang="da-DK" dirty="0"/>
+              <a:t>https://martinfowler.com/eaaDev/EventCollaboration.html</a:t>
+            </a:r>
+          </a:p>
+        </p:txBody>
+      </p:sp>
+      <p:sp>
+        <p:nvSpPr>
+          <p:cNvPr id="4" name="Pladsholder til slidenummer 3"/>
+          <p:cNvSpPr>
+            <a:spLocks noGrp="1"/>
+          </p:cNvSpPr>
+          <p:nvPr>
+            <p:ph type="sldNum" sz="quarter" idx="5"/>
+          </p:nvPr>
+        </p:nvSpPr>
+        <p:spPr/>
+        <p:txBody>
+          <a:bodyPr/>
+          <a:lstStyle/>
+          <a:p>
+            <a:fld id="{252E21F2-0B82-4ACE-A045-2AAC56859006}" type="slidenum">
+              <a:rPr lang="da-DK" smtClean="0"/>
+              <a:t>37</a:t>
+            </a:fld>
+            <a:endParaRPr lang="da-DK"/>
+          </a:p>
+        </p:txBody>
+      </p:sp>
+    </p:spTree>
+    <p:extLst>
+      <p:ext uri="{BB962C8B-B14F-4D97-AF65-F5344CB8AC3E}">
+        <p14:creationId xmlns:p14="http://schemas.microsoft.com/office/powerpoint/2010/main" val="282527506"/>
       </p:ext>
     </p:extLst>
   </p:cSld>
@@ -2866,131 +3244,22 @@
           <a:p>
             <a:r>
               <a:rPr lang="da-DK" dirty="0"/>
-              <a:t>Nedarvning ude -&gt; ind</a:t>
-            </a:r>
-          </a:p>
-          <a:p>
-            <a:r>
-              <a:rPr lang="da-DK" dirty="0" err="1"/>
-              <a:t>Infrastucture</a:t>
-            </a:r>
-            <a:r>
-              <a:rPr lang="da-DK" dirty="0"/>
-              <a:t> -&gt; </a:t>
-            </a:r>
-            <a:r>
-              <a:rPr lang="da-DK" dirty="0" err="1"/>
-              <a:t>entityframework</a:t>
-            </a:r>
-            <a:endParaRPr lang="da-DK" dirty="0"/>
-          </a:p>
-          <a:p>
-            <a:endParaRPr lang="da-DK" dirty="0"/>
-          </a:p>
-          <a:p>
-            <a:r>
-              <a:rPr lang="da-DK" dirty="0" err="1"/>
-              <a:t>Onion</a:t>
-            </a:r>
-            <a:r>
-              <a:rPr lang="da-DK" dirty="0"/>
-              <a:t> Arkitektur</a:t>
-            </a:r>
-          </a:p>
-          <a:p>
-            <a:r>
-              <a:rPr lang="da-DK" dirty="0"/>
-              <a:t>Diagram</a:t>
-            </a:r>
-          </a:p>
-          <a:p>
-            <a:r>
-              <a:rPr lang="da-DK" dirty="0"/>
-              <a:t>Domain </a:t>
-            </a:r>
-            <a:r>
-              <a:rPr lang="da-DK" dirty="0" err="1"/>
-              <a:t>Serice</a:t>
-            </a:r>
-            <a:r>
-              <a:rPr lang="da-DK" dirty="0"/>
-              <a:t> </a:t>
-            </a:r>
-            <a:r>
-              <a:rPr lang="da-DK" dirty="0" err="1"/>
-              <a:t>Layer</a:t>
-            </a:r>
-            <a:r>
-              <a:rPr lang="da-DK" dirty="0"/>
-              <a:t> had domæne logik, </a:t>
-            </a:r>
-            <a:r>
-              <a:rPr lang="da-DK" dirty="0" err="1"/>
-              <a:t>application</a:t>
-            </a:r>
-            <a:r>
-              <a:rPr lang="da-DK" dirty="0"/>
-              <a:t> service </a:t>
-            </a:r>
-            <a:r>
-              <a:rPr lang="da-DK" dirty="0" err="1"/>
-              <a:t>layer</a:t>
-            </a:r>
-            <a:r>
-              <a:rPr lang="da-DK" dirty="0"/>
-              <a:t> har ikke</a:t>
-            </a:r>
-          </a:p>
-          <a:p>
-            <a:endParaRPr lang="da-DK" dirty="0"/>
-          </a:p>
-          <a:p>
-            <a:r>
-              <a:rPr lang="da-DK" dirty="0"/>
-              <a:t>Domain og Application Service </a:t>
-            </a:r>
-            <a:r>
-              <a:rPr lang="da-DK" dirty="0" err="1"/>
-              <a:t>Layer</a:t>
-            </a:r>
-            <a:endParaRPr lang="da-DK" dirty="0"/>
-          </a:p>
-          <a:p>
-            <a:r>
-              <a:rPr lang="da-DK" dirty="0" err="1"/>
-              <a:t>Infrastructure</a:t>
-            </a:r>
-            <a:r>
-              <a:rPr lang="da-DK" dirty="0"/>
-              <a:t> </a:t>
-            </a:r>
-            <a:r>
-              <a:rPr lang="da-DK" dirty="0" err="1"/>
-              <a:t>Persistance</a:t>
-            </a:r>
-            <a:r>
-              <a:rPr lang="da-DK" dirty="0"/>
-              <a:t> </a:t>
-            </a:r>
-            <a:r>
-              <a:rPr lang="da-DK" dirty="0" err="1"/>
-              <a:t>Layer</a:t>
-            </a:r>
-            <a:endParaRPr lang="da-DK" dirty="0"/>
-          </a:p>
-          <a:p>
-            <a:r>
-              <a:rPr lang="da-DK" dirty="0"/>
-              <a:t>Domain </a:t>
-            </a:r>
-            <a:r>
-              <a:rPr lang="da-DK" dirty="0" err="1"/>
-              <a:t>Layer</a:t>
-            </a:r>
-            <a:endParaRPr lang="da-DK" dirty="0"/>
-          </a:p>
-          <a:p>
-            <a:endParaRPr lang="da-DK" dirty="0"/>
+              <a:t>https://martinfowler.com/microservices/</a:t>
+            </a:r>
+          </a:p>
+          <a:p>
+            <a:r>
+              <a:rPr lang="da-DK" dirty="0"/>
+              <a:t>Hver boks er sin egen </a:t>
+            </a:r>
+            <a:r>
+              <a:rPr lang="da-DK" dirty="0" err="1"/>
+              <a:t>microservice</a:t>
+            </a:r>
+            <a:r>
+              <a:rPr lang="da-DK" dirty="0"/>
+              <a:t> i princippet</a:t>
+            </a:r>
           </a:p>
         </p:txBody>
       </p:sp>
@@ -3011,7 +3280,7 @@
           <a:p>
             <a:fld id="{252E21F2-0B82-4ACE-A045-2AAC56859006}" type="slidenum">
               <a:rPr lang="da-DK" smtClean="0"/>
-              <a:t>7</a:t>
+              <a:t>6</a:t>
             </a:fld>
             <a:endParaRPr lang="da-DK"/>
           </a:p>
@@ -3020,7 +3289,150 @@
     </p:spTree>
     <p:extLst>
       <p:ext uri="{BB962C8B-B14F-4D97-AF65-F5344CB8AC3E}">
-        <p14:creationId xmlns:p14="http://schemas.microsoft.com/office/powerpoint/2010/main" val="1916579596"/>
+        <p14:creationId xmlns:p14="http://schemas.microsoft.com/office/powerpoint/2010/main" val="669242770"/>
+      </p:ext>
+    </p:extLst>
+  </p:cSld>
+  <p:clrMapOvr>
+    <a:masterClrMapping/>
+  </p:clrMapOvr>
+</p:notes>
+</file>
+
+<file path=ppt/notesSlides/notesSlide30.xml><?xml version="1.0" encoding="utf-8"?>
+<p:notes xmlns:a="http://schemas.openxmlformats.org/drawingml/2006/main" xmlns:r="http://schemas.openxmlformats.org/officeDocument/2006/relationships" xmlns:p="http://schemas.openxmlformats.org/presentationml/2006/main">
+  <p:cSld>
+    <p:spTree>
+      <p:nvGrpSpPr>
+        <p:cNvPr id="1" name=""/>
+        <p:cNvGrpSpPr/>
+        <p:nvPr/>
+      </p:nvGrpSpPr>
+      <p:grpSpPr>
+        <a:xfrm>
+          <a:off x="0" y="0"/>
+          <a:ext cx="0" cy="0"/>
+          <a:chOff x="0" y="0"/>
+          <a:chExt cx="0" cy="0"/>
+        </a:xfrm>
+      </p:grpSpPr>
+      <p:sp>
+        <p:nvSpPr>
+          <p:cNvPr id="2" name="Pladsholder til slidebillede 1"/>
+          <p:cNvSpPr>
+            <a:spLocks noGrp="1" noRot="1" noChangeAspect="1"/>
+          </p:cNvSpPr>
+          <p:nvPr>
+            <p:ph type="sldImg"/>
+          </p:nvPr>
+        </p:nvSpPr>
+        <p:spPr/>
+      </p:sp>
+      <p:sp>
+        <p:nvSpPr>
+          <p:cNvPr id="3" name="Pladsholder til noter 2"/>
+          <p:cNvSpPr>
+            <a:spLocks noGrp="1"/>
+          </p:cNvSpPr>
+          <p:nvPr>
+            <p:ph type="body" idx="1"/>
+          </p:nvPr>
+        </p:nvSpPr>
+        <p:spPr/>
+        <p:txBody>
+          <a:bodyPr/>
+          <a:lstStyle/>
+          <a:p>
+            <a:r>
+              <a:rPr lang="da-DK" dirty="0"/>
+              <a:t>Begge kræver at de kender hinanden.</a:t>
+            </a:r>
+          </a:p>
+          <a:p>
+            <a:r>
+              <a:rPr lang="da-DK" dirty="0"/>
+              <a:t>A kunne sende en url’en til en REST API med over</a:t>
+            </a:r>
+          </a:p>
+          <a:p>
+            <a:r>
+              <a:rPr lang="da-DK" dirty="0"/>
+              <a:t>Kafka er nok bedre hvis </a:t>
+            </a:r>
+            <a:r>
+              <a:rPr lang="da-DK" dirty="0" err="1"/>
+              <a:t>producer’en</a:t>
+            </a:r>
+            <a:r>
+              <a:rPr lang="da-DK" dirty="0"/>
+              <a:t> ikke skal reagere på </a:t>
+            </a:r>
+            <a:r>
+              <a:rPr lang="da-DK" dirty="0" err="1"/>
+              <a:t>consumer</a:t>
+            </a:r>
+            <a:r>
+              <a:rPr lang="da-DK" dirty="0"/>
+              <a:t> </a:t>
+            </a:r>
+          </a:p>
+          <a:p>
+            <a:r>
+              <a:rPr lang="da-DK" dirty="0"/>
+              <a:t>Sidste kræver at kun en enkel </a:t>
+            </a:r>
+            <a:r>
+              <a:rPr lang="da-DK" dirty="0" err="1"/>
+              <a:t>consumer</a:t>
+            </a:r>
+            <a:r>
+              <a:rPr lang="da-DK" dirty="0"/>
+              <a:t> </a:t>
+            </a:r>
+            <a:r>
+              <a:rPr lang="da-DK" dirty="0" err="1"/>
+              <a:t>group</a:t>
+            </a:r>
+            <a:r>
+              <a:rPr lang="da-DK" dirty="0"/>
+              <a:t> sender data tilbage</a:t>
+            </a:r>
+          </a:p>
+          <a:p>
+            <a:r>
+              <a:rPr lang="da-DK" dirty="0"/>
+              <a:t>Sidste kræver nok også at beskeden bliver gemt i en database med behandlings status </a:t>
+            </a:r>
+          </a:p>
+        </p:txBody>
+      </p:sp>
+      <p:sp>
+        <p:nvSpPr>
+          <p:cNvPr id="4" name="Pladsholder til slidenummer 3"/>
+          <p:cNvSpPr>
+            <a:spLocks noGrp="1"/>
+          </p:cNvSpPr>
+          <p:nvPr>
+            <p:ph type="sldNum" sz="quarter" idx="5"/>
+          </p:nvPr>
+        </p:nvSpPr>
+        <p:spPr/>
+        <p:txBody>
+          <a:bodyPr/>
+          <a:lstStyle/>
+          <a:p>
+            <a:fld id="{252E21F2-0B82-4ACE-A045-2AAC56859006}" type="slidenum">
+              <a:rPr lang="da-DK" smtClean="0"/>
+              <a:t>38</a:t>
+            </a:fld>
+            <a:endParaRPr lang="da-DK"/>
+          </a:p>
+        </p:txBody>
+      </p:sp>
+    </p:spTree>
+    <p:extLst>
+      <p:ext uri="{BB962C8B-B14F-4D97-AF65-F5344CB8AC3E}">
+        <p14:creationId xmlns:p14="http://schemas.microsoft.com/office/powerpoint/2010/main" val="1430961321"/>
       </p:ext>
     </p:extLst>
   </p:cSld>
@@ -3076,18 +3488,88 @@
           <a:p>
             <a:r>
               <a:rPr lang="da-DK" dirty="0"/>
-              <a:t>Presentation </a:t>
+              <a:t>Nedarvning ude -&gt; ind</a:t>
+            </a:r>
+          </a:p>
+          <a:p>
+            <a:r>
+              <a:rPr lang="da-DK" dirty="0" err="1"/>
+              <a:t>Infrastucture</a:t>
+            </a:r>
+            <a:r>
+              <a:rPr lang="da-DK" dirty="0"/>
+              <a:t> -&gt; </a:t>
+            </a:r>
+            <a:r>
+              <a:rPr lang="da-DK" dirty="0" err="1"/>
+              <a:t>entityframework</a:t>
+            </a:r>
+            <a:endParaRPr lang="da-DK" dirty="0"/>
+          </a:p>
+          <a:p>
+            <a:endParaRPr lang="da-DK" dirty="0"/>
+          </a:p>
+          <a:p>
+            <a:r>
+              <a:rPr lang="da-DK" dirty="0" err="1"/>
+              <a:t>Onion</a:t>
+            </a:r>
+            <a:r>
+              <a:rPr lang="da-DK" dirty="0"/>
+              <a:t> Arkitektur</a:t>
+            </a:r>
+          </a:p>
+          <a:p>
+            <a:r>
+              <a:rPr lang="da-DK" dirty="0"/>
+              <a:t>Diagram</a:t>
+            </a:r>
+          </a:p>
+          <a:p>
+            <a:r>
+              <a:rPr lang="da-DK" dirty="0"/>
+              <a:t>Domain </a:t>
+            </a:r>
+            <a:r>
+              <a:rPr lang="da-DK" dirty="0" err="1"/>
+              <a:t>Serice</a:t>
+            </a:r>
+            <a:r>
+              <a:rPr lang="da-DK" dirty="0"/>
+              <a:t> </a:t>
             </a:r>
             <a:r>
               <a:rPr lang="da-DK" dirty="0" err="1"/>
               <a:t>Layer</a:t>
             </a:r>
+            <a:r>
+              <a:rPr lang="da-DK" dirty="0"/>
+              <a:t> had domæne logik, </a:t>
+            </a:r>
+            <a:r>
+              <a:rPr lang="da-DK" dirty="0" err="1"/>
+              <a:t>application</a:t>
+            </a:r>
+            <a:r>
+              <a:rPr lang="da-DK" dirty="0"/>
+              <a:t> service </a:t>
+            </a:r>
+            <a:r>
+              <a:rPr lang="da-DK" dirty="0" err="1"/>
+              <a:t>layer</a:t>
+            </a:r>
+            <a:r>
+              <a:rPr lang="da-DK" dirty="0"/>
+              <a:t> har ikke</a:t>
+            </a:r>
+          </a:p>
+          <a:p>
             <a:endParaRPr lang="da-DK" dirty="0"/>
           </a:p>
           <a:p>
             <a:r>
               <a:rPr lang="da-DK" dirty="0"/>
-              <a:t>Application Service </a:t>
+              <a:t>Domain og Application Service </a:t>
             </a:r>
             <a:r>
               <a:rPr lang="da-DK" dirty="0" err="1"/>
@@ -3103,6 +3585,25 @@
             <a:r>
               <a:rPr lang="da-DK" dirty="0"/>
               <a:t> </a:t>
+            </a:r>
+            <a:r>
+              <a:rPr lang="da-DK" dirty="0" err="1"/>
+              <a:t>Persistance</a:t>
+            </a:r>
+            <a:r>
+              <a:rPr lang="da-DK" dirty="0"/>
+              <a:t> </a:t>
+            </a:r>
+            <a:r>
+              <a:rPr lang="da-DK" dirty="0" err="1"/>
+              <a:t>Layer</a:t>
+            </a:r>
+            <a:endParaRPr lang="da-DK" dirty="0"/>
+          </a:p>
+          <a:p>
+            <a:r>
+              <a:rPr lang="da-DK" dirty="0"/>
+              <a:t>Domain </a:t>
             </a:r>
             <a:r>
               <a:rPr lang="da-DK" dirty="0" err="1"/>
@@ -3132,7 +3633,7 @@
           <a:p>
             <a:fld id="{252E21F2-0B82-4ACE-A045-2AAC56859006}" type="slidenum">
               <a:rPr lang="da-DK" smtClean="0"/>
-              <a:t>8</a:t>
+              <a:t>7</a:t>
             </a:fld>
             <a:endParaRPr lang="da-DK"/>
           </a:p>
@@ -3141,7 +3642,7 @@
     </p:spTree>
     <p:extLst>
       <p:ext uri="{BB962C8B-B14F-4D97-AF65-F5344CB8AC3E}">
-        <p14:creationId xmlns:p14="http://schemas.microsoft.com/office/powerpoint/2010/main" val="3983630066"/>
+        <p14:creationId xmlns:p14="http://schemas.microsoft.com/office/powerpoint/2010/main" val="1916579596"/>
       </p:ext>
     </p:extLst>
   </p:cSld>
@@ -3208,44 +3709,22 @@
           <a:p>
             <a:r>
               <a:rPr lang="da-DK" dirty="0"/>
-              <a:t>Domain og Application Service </a:t>
+              <a:t>Application Service </a:t>
             </a:r>
             <a:r>
               <a:rPr lang="da-DK" dirty="0" err="1"/>
               <a:t>Layer</a:t>
             </a:r>
+            <a:endParaRPr lang="da-DK" dirty="0"/>
+          </a:p>
+          <a:p>
+            <a:r>
+              <a:rPr lang="da-DK" dirty="0" err="1"/>
+              <a:t>Infrastructure</a:t>
+            </a:r>
             <a:r>
               <a:rPr lang="da-DK" dirty="0"/>
               <a:t> </a:t>
-            </a:r>
-          </a:p>
-          <a:p>
-            <a:r>
-              <a:rPr lang="da-DK" dirty="0" err="1"/>
-              <a:t>Infrastructure</a:t>
-            </a:r>
-            <a:r>
-              <a:rPr lang="da-DK" dirty="0"/>
-              <a:t> </a:t>
-            </a:r>
-            <a:r>
-              <a:rPr lang="da-DK" dirty="0" err="1"/>
-              <a:t>Persistance</a:t>
-            </a:r>
-            <a:r>
-              <a:rPr lang="da-DK" dirty="0"/>
-              <a:t> </a:t>
-            </a:r>
-            <a:r>
-              <a:rPr lang="da-DK" dirty="0" err="1"/>
-              <a:t>Layer</a:t>
-            </a:r>
-            <a:endParaRPr lang="da-DK" dirty="0"/>
-          </a:p>
-          <a:p>
-            <a:r>
-              <a:rPr lang="da-DK" dirty="0"/>
-              <a:t>Domain </a:t>
             </a:r>
             <a:r>
               <a:rPr lang="da-DK" dirty="0" err="1"/>
@@ -3275,7 +3754,7 @@
           <a:p>
             <a:fld id="{252E21F2-0B82-4ACE-A045-2AAC56859006}" type="slidenum">
               <a:rPr lang="da-DK" smtClean="0"/>
-              <a:t>9</a:t>
+              <a:t>8</a:t>
             </a:fld>
             <a:endParaRPr lang="da-DK"/>
           </a:p>
@@ -3284,7 +3763,7 @@
     </p:spTree>
     <p:extLst>
       <p:ext uri="{BB962C8B-B14F-4D97-AF65-F5344CB8AC3E}">
-        <p14:creationId xmlns:p14="http://schemas.microsoft.com/office/powerpoint/2010/main" val="4130427050"/>
+        <p14:creationId xmlns:p14="http://schemas.microsoft.com/office/powerpoint/2010/main" val="3983630066"/>
       </p:ext>
     </p:extLst>
   </p:cSld>
@@ -3340,29 +3819,64 @@
           <a:p>
             <a:r>
               <a:rPr lang="da-DK" dirty="0"/>
-              <a:t>User </a:t>
-            </a:r>
-            <a:r>
-              <a:rPr lang="da-DK" dirty="0" err="1"/>
-              <a:t>Frontend</a:t>
+              <a:t>Presentation </a:t>
+            </a:r>
+            <a:r>
+              <a:rPr lang="da-DK" dirty="0" err="1"/>
+              <a:t>Layer</a:t>
             </a:r>
             <a:endParaRPr lang="da-DK" dirty="0"/>
           </a:p>
           <a:p>
             <a:r>
               <a:rPr lang="da-DK" dirty="0"/>
-              <a:t>Catering REST</a:t>
-            </a:r>
-          </a:p>
-          <a:p>
-            <a:r>
-              <a:rPr lang="da-DK" dirty="0" err="1"/>
-              <a:t>Catering.DataProcessPlatform</a:t>
-            </a:r>
-            <a:r>
-              <a:rPr lang="da-DK" dirty="0"/>
-              <a:t> konsol </a:t>
-            </a:r>
+              <a:t>Domain og Application Service </a:t>
+            </a:r>
+            <a:r>
+              <a:rPr lang="da-DK" dirty="0" err="1"/>
+              <a:t>Layer</a:t>
+            </a:r>
+            <a:r>
+              <a:rPr lang="da-DK" dirty="0"/>
+              <a:t> </a:t>
+            </a:r>
+          </a:p>
+          <a:p>
+            <a:r>
+              <a:rPr lang="da-DK" dirty="0" err="1"/>
+              <a:t>Infrastructure</a:t>
+            </a:r>
+            <a:r>
+              <a:rPr lang="da-DK" dirty="0"/>
+              <a:t> </a:t>
+            </a:r>
+            <a:r>
+              <a:rPr lang="da-DK" dirty="0" err="1"/>
+              <a:t>Persistance</a:t>
+            </a:r>
+            <a:r>
+              <a:rPr lang="da-DK" dirty="0"/>
+              <a:t> </a:t>
+            </a:r>
+            <a:r>
+              <a:rPr lang="da-DK" dirty="0" err="1"/>
+              <a:t>Layer</a:t>
+            </a:r>
+            <a:endParaRPr lang="da-DK" dirty="0"/>
+          </a:p>
+          <a:p>
+            <a:r>
+              <a:rPr lang="da-DK" dirty="0"/>
+              <a:t>Domain </a:t>
+            </a:r>
+            <a:r>
+              <a:rPr lang="da-DK" dirty="0" err="1"/>
+              <a:t>Layer</a:t>
+            </a:r>
+            <a:endParaRPr lang="da-DK" dirty="0"/>
+          </a:p>
+          <a:p>
+            <a:endParaRPr lang="da-DK" dirty="0"/>
           </a:p>
         </p:txBody>
       </p:sp>
@@ -3383,7 +3897,7 @@
           <a:p>
             <a:fld id="{252E21F2-0B82-4ACE-A045-2AAC56859006}" type="slidenum">
               <a:rPr lang="da-DK" smtClean="0"/>
-              <a:t>10</a:t>
+              <a:t>9</a:t>
             </a:fld>
             <a:endParaRPr lang="da-DK"/>
           </a:p>
@@ -3392,7 +3906,7 @@
     </p:spTree>
     <p:extLst>
       <p:ext uri="{BB962C8B-B14F-4D97-AF65-F5344CB8AC3E}">
-        <p14:creationId xmlns:p14="http://schemas.microsoft.com/office/powerpoint/2010/main" val="110564417"/>
+        <p14:creationId xmlns:p14="http://schemas.microsoft.com/office/powerpoint/2010/main" val="4130427050"/>
       </p:ext>
     </p:extLst>
   </p:cSld>
@@ -3447,55 +3961,29 @@
           <a:lstStyle/>
           <a:p>
             <a:r>
-              <a:rPr lang="da-DK" dirty="0" err="1"/>
-              <a:t>Ubiquitous</a:t>
-            </a:r>
-            <a:r>
-              <a:rPr lang="da-DK" dirty="0"/>
-              <a:t> Language, koden skal tilpasset forretningssproget</a:t>
-            </a:r>
-          </a:p>
-          <a:p>
+              <a:rPr lang="da-DK" dirty="0"/>
+              <a:t>User </a:t>
+            </a:r>
+            <a:r>
+              <a:rPr lang="da-DK" dirty="0" err="1"/>
+              <a:t>Frontend</a:t>
+            </a:r>
             <a:endParaRPr lang="da-DK" dirty="0"/>
           </a:p>
           <a:p>
             <a:r>
               <a:rPr lang="da-DK" dirty="0"/>
-              <a:t>Domæne – forretningsregler, forretningsmodeller</a:t>
-            </a:r>
-          </a:p>
-          <a:p>
-            <a:r>
-              <a:rPr lang="da-DK" dirty="0"/>
-              <a:t>Applikation – jobs softwaren skal gøre og direkte til domæne objekter til at udføre arbejdet. </a:t>
-            </a:r>
-            <a:r>
-              <a:rPr lang="da-DK" dirty="0" err="1"/>
-              <a:t>Use</a:t>
-            </a:r>
-            <a:r>
-              <a:rPr lang="da-DK" dirty="0"/>
-              <a:t> cases for en givet </a:t>
-            </a:r>
-            <a:r>
-              <a:rPr lang="da-DK" dirty="0" err="1"/>
-              <a:t>frontend</a:t>
-            </a:r>
-            <a:endParaRPr lang="da-DK" dirty="0"/>
-          </a:p>
-          <a:p>
-            <a:r>
-              <a:rPr lang="da-DK" dirty="0"/>
-              <a:t>Infrastruktur – vedblev data  </a:t>
-            </a:r>
-          </a:p>
-          <a:p>
-            <a:endParaRPr lang="da-DK" dirty="0"/>
-          </a:p>
-          <a:p>
-            <a:r>
-              <a:rPr lang="da-DK" dirty="0"/>
-              <a:t>https://learn.microsoft.com/en-us/dotnet/architecture/microservices/microservice-ddd-cqrs-patterns/ddd-oriented-microservice</a:t>
+              <a:t>Catering REST</a:t>
+            </a:r>
+          </a:p>
+          <a:p>
+            <a:r>
+              <a:rPr lang="da-DK" dirty="0" err="1"/>
+              <a:t>Catering.DataProcessPlatform</a:t>
+            </a:r>
+            <a:r>
+              <a:rPr lang="da-DK" dirty="0"/>
+              <a:t> konsol </a:t>
             </a:r>
           </a:p>
         </p:txBody>
@@ -3517,7 +4005,7 @@
           <a:p>
             <a:fld id="{252E21F2-0B82-4ACE-A045-2AAC56859006}" type="slidenum">
               <a:rPr lang="da-DK" smtClean="0"/>
-              <a:t>12</a:t>
+              <a:t>10</a:t>
             </a:fld>
             <a:endParaRPr lang="da-DK"/>
           </a:p>
@@ -3526,7 +4014,7 @@
     </p:spTree>
     <p:extLst>
       <p:ext uri="{BB962C8B-B14F-4D97-AF65-F5344CB8AC3E}">
-        <p14:creationId xmlns:p14="http://schemas.microsoft.com/office/powerpoint/2010/main" val="2824294709"/>
+        <p14:creationId xmlns:p14="http://schemas.microsoft.com/office/powerpoint/2010/main" val="110564417"/>
       </p:ext>
     </p:extLst>
   </p:cSld>
@@ -3582,96 +4070,72 @@
           <a:p>
             <a:r>
               <a:rPr lang="da-DK" dirty="0"/>
-              <a:t>Kun en enkel aggregatrod skulle påvirkes af gangen.</a:t>
-            </a:r>
-          </a:p>
-          <a:p>
-            <a:r>
-              <a:rPr lang="da-DK" dirty="0"/>
-              <a:t>Overholdes ikke helt dette i produktet, da det ville kræve event og håndtering af disse</a:t>
-            </a:r>
-          </a:p>
-          <a:p>
-            <a:r>
-              <a:rPr lang="da-DK" dirty="0"/>
-              <a:t>Søgning: F.eks. </a:t>
-            </a:r>
-            <a:r>
-              <a:rPr lang="da-DK" dirty="0" err="1"/>
-              <a:t>MenuPart</a:t>
-            </a:r>
-            <a:r>
-              <a:rPr lang="da-DK" dirty="0"/>
-              <a:t> indeholdte information omkring den bestemte </a:t>
-            </a:r>
-            <a:r>
-              <a:rPr lang="da-DK" dirty="0" err="1"/>
-              <a:t>MenuPart</a:t>
-            </a:r>
-            <a:r>
-              <a:rPr lang="da-DK" dirty="0"/>
-              <a:t> er vegansk eller ej, så ville der være en metode på roden der returner true, hvis alle </a:t>
-            </a:r>
-            <a:r>
-              <a:rPr lang="da-DK" dirty="0" err="1"/>
-              <a:t>MenuParts</a:t>
-            </a:r>
-            <a:r>
-              <a:rPr lang="da-DK" dirty="0"/>
-              <a:t> i Menu er </a:t>
-            </a:r>
-            <a:r>
-              <a:rPr lang="da-DK" dirty="0" err="1"/>
-              <a:t>veganisk</a:t>
+              <a:t>Domænet i dette projekt er catering </a:t>
+            </a:r>
+          </a:p>
+          <a:p>
+            <a:r>
+              <a:rPr lang="da-DK" dirty="0"/>
+              <a:t>DDD prøve at få software til at være en model af et virkelig system eller </a:t>
+            </a:r>
+            <a:r>
+              <a:rPr lang="da-DK" dirty="0" err="1"/>
+              <a:t>processe</a:t>
             </a:r>
             <a:endParaRPr lang="da-DK" dirty="0"/>
           </a:p>
           <a:p>
             <a:r>
               <a:rPr lang="da-DK" dirty="0" err="1"/>
-              <a:t>IAggregateRoot</a:t>
-            </a:r>
-            <a:r>
-              <a:rPr lang="da-DK" dirty="0"/>
-              <a:t> og </a:t>
-            </a:r>
-            <a:r>
-              <a:rPr lang="da-DK" dirty="0" err="1"/>
-              <a:t>ReferenceId</a:t>
-            </a:r>
-            <a:r>
-              <a:rPr lang="da-DK" dirty="0"/>
-              <a:t>, hjælpe med at styre hvad er en rod (for </a:t>
-            </a:r>
-            <a:r>
-              <a:rPr lang="da-DK" dirty="0" err="1"/>
-              <a:t>entiyframework</a:t>
-            </a:r>
-            <a:r>
-              <a:rPr lang="da-DK" dirty="0"/>
-              <a:t>) og </a:t>
-            </a:r>
-            <a:r>
-              <a:rPr lang="da-DK" dirty="0" err="1"/>
-              <a:t>referenceId</a:t>
-            </a:r>
-            <a:r>
-              <a:rPr lang="da-DK" dirty="0"/>
-              <a:t> kan være </a:t>
-            </a:r>
-            <a:r>
-              <a:rPr lang="da-DK" dirty="0" err="1"/>
-              <a:t>burgbart</a:t>
-            </a:r>
-            <a:r>
-              <a:rPr lang="da-DK" dirty="0"/>
-              <a:t> for komplekse </a:t>
-            </a:r>
-            <a:r>
-              <a:rPr lang="da-DK" dirty="0" err="1"/>
-              <a:t>id’er</a:t>
-            </a:r>
+              <a:t>Ubiquitous</a:t>
+            </a:r>
+            <a:r>
+              <a:rPr lang="da-DK" dirty="0"/>
+              <a:t> Language, koden skal tilpasset forretningssproget</a:t>
+            </a:r>
+          </a:p>
+          <a:p>
             <a:endParaRPr lang="da-DK" dirty="0"/>
+          </a:p>
+          <a:p>
+            <a:r>
+              <a:rPr lang="da-DK" dirty="0"/>
+              <a:t>Domæne – forretningsregler, forretningsmodeller</a:t>
+            </a:r>
+          </a:p>
+          <a:p>
+            <a:r>
+              <a:rPr lang="da-DK" dirty="0"/>
+              <a:t>Applikation – jobs softwaren skal gøre og direkte til domæne objekter til at udføre arbejdet. </a:t>
+            </a:r>
+            <a:r>
+              <a:rPr lang="da-DK" dirty="0" err="1"/>
+              <a:t>Use</a:t>
+            </a:r>
+            <a:r>
+              <a:rPr lang="da-DK" dirty="0"/>
+              <a:t> cases for en givet </a:t>
+            </a:r>
+            <a:r>
+              <a:rPr lang="da-DK" dirty="0" err="1"/>
+              <a:t>frontend</a:t>
+            </a:r>
+            <a:endParaRPr lang="da-DK" dirty="0"/>
+          </a:p>
+          <a:p>
+            <a:r>
+              <a:rPr lang="da-DK" dirty="0"/>
+              <a:t>Infrastruktur – vedblev data  </a:t>
+            </a:r>
+          </a:p>
+          <a:p>
+            <a:endParaRPr lang="da-DK" dirty="0"/>
+          </a:p>
+          <a:p>
+            <a:r>
+              <a:rPr lang="da-DK" dirty="0"/>
+              <a:t>https://learn.microsoft.com/en-us/dotnet/architecture/microservices/microservice-ddd-cqrs-patterns/ddd-oriented-microservice</a:t>
+            </a:r>
           </a:p>
         </p:txBody>
       </p:sp>
@@ -3692,7 +4156,7 @@
           <a:p>
             <a:fld id="{252E21F2-0B82-4ACE-A045-2AAC56859006}" type="slidenum">
               <a:rPr lang="da-DK" smtClean="0"/>
-              <a:t>13</a:t>
+              <a:t>12</a:t>
             </a:fld>
             <a:endParaRPr lang="da-DK"/>
           </a:p>
@@ -3701,7 +4165,7 @@
     </p:spTree>
     <p:extLst>
       <p:ext uri="{BB962C8B-B14F-4D97-AF65-F5344CB8AC3E}">
-        <p14:creationId xmlns:p14="http://schemas.microsoft.com/office/powerpoint/2010/main" val="815936762"/>
+        <p14:creationId xmlns:p14="http://schemas.microsoft.com/office/powerpoint/2010/main" val="2824294709"/>
       </p:ext>
     </p:extLst>
   </p:cSld>
@@ -3755,6 +4219,97 @@
           <a:bodyPr/>
           <a:lstStyle/>
           <a:p>
+            <a:r>
+              <a:rPr lang="da-DK" dirty="0"/>
+              <a:t>Kun en enkel aggregatrod skulle påvirkes af gangen.</a:t>
+            </a:r>
+          </a:p>
+          <a:p>
+            <a:r>
+              <a:rPr lang="da-DK" dirty="0"/>
+              <a:t>Overholdes ikke helt dette i produktet, da det ville kræve event og håndtering af disse</a:t>
+            </a:r>
+          </a:p>
+          <a:p>
+            <a:r>
+              <a:rPr lang="da-DK" dirty="0"/>
+              <a:t>Søgning: F.eks. </a:t>
+            </a:r>
+            <a:r>
+              <a:rPr lang="da-DK" dirty="0" err="1"/>
+              <a:t>MenuPart</a:t>
+            </a:r>
+            <a:r>
+              <a:rPr lang="da-DK" dirty="0"/>
+              <a:t> indeholdte information omkring den bestemte </a:t>
+            </a:r>
+            <a:r>
+              <a:rPr lang="da-DK" dirty="0" err="1"/>
+              <a:t>MenuPart</a:t>
+            </a:r>
+            <a:r>
+              <a:rPr lang="da-DK" dirty="0"/>
+              <a:t> er vegansk eller ej, så ville der være en metode på roden der returner true, hvis alle </a:t>
+            </a:r>
+            <a:r>
+              <a:rPr lang="da-DK" dirty="0" err="1"/>
+              <a:t>MenuParts</a:t>
+            </a:r>
+            <a:r>
+              <a:rPr lang="da-DK" dirty="0"/>
+              <a:t> i Menu er </a:t>
+            </a:r>
+            <a:r>
+              <a:rPr lang="da-DK" dirty="0" err="1"/>
+              <a:t>veganisk</a:t>
+            </a:r>
+            <a:endParaRPr lang="da-DK" dirty="0"/>
+          </a:p>
+          <a:p>
+            <a:r>
+              <a:rPr lang="da-DK" dirty="0" err="1"/>
+              <a:t>IAggregateRoot</a:t>
+            </a:r>
+            <a:r>
+              <a:rPr lang="da-DK" dirty="0"/>
+              <a:t> og </a:t>
+            </a:r>
+            <a:r>
+              <a:rPr lang="da-DK" dirty="0" err="1"/>
+              <a:t>ReferenceId</a:t>
+            </a:r>
+            <a:r>
+              <a:rPr lang="da-DK" dirty="0"/>
+              <a:t>, hjælpe med at styre hvad er en rod (for </a:t>
+            </a:r>
+            <a:r>
+              <a:rPr lang="da-DK" dirty="0" err="1"/>
+              <a:t>entiyframework</a:t>
+            </a:r>
+            <a:r>
+              <a:rPr lang="da-DK" dirty="0"/>
+              <a:t>) og </a:t>
+            </a:r>
+            <a:r>
+              <a:rPr lang="da-DK" dirty="0" err="1"/>
+              <a:t>referenceId</a:t>
+            </a:r>
+            <a:r>
+              <a:rPr lang="da-DK" dirty="0"/>
+              <a:t> kan være </a:t>
+            </a:r>
+            <a:r>
+              <a:rPr lang="da-DK" dirty="0" err="1"/>
+              <a:t>burgbart</a:t>
+            </a:r>
+            <a:r>
+              <a:rPr lang="da-DK" dirty="0"/>
+              <a:t> for komplekse </a:t>
+            </a:r>
+            <a:r>
+              <a:rPr lang="da-DK" dirty="0" err="1"/>
+              <a:t>id’er</a:t>
+            </a:r>
             <a:endParaRPr lang="da-DK" dirty="0"/>
           </a:p>
         </p:txBody>
@@ -3776,7 +4331,7 @@
           <a:p>
             <a:fld id="{252E21F2-0B82-4ACE-A045-2AAC56859006}" type="slidenum">
               <a:rPr lang="da-DK" smtClean="0"/>
-              <a:t>14</a:t>
+              <a:t>13</a:t>
             </a:fld>
             <a:endParaRPr lang="da-DK"/>
           </a:p>
@@ -3785,7 +4340,7 @@
     </p:spTree>
     <p:extLst>
       <p:ext uri="{BB962C8B-B14F-4D97-AF65-F5344CB8AC3E}">
-        <p14:creationId xmlns:p14="http://schemas.microsoft.com/office/powerpoint/2010/main" val="2313198539"/>
+        <p14:creationId xmlns:p14="http://schemas.microsoft.com/office/powerpoint/2010/main" val="815936762"/>
       </p:ext>
     </p:extLst>
   </p:cSld>
@@ -3965,7 +4520,7 @@
           <a:p>
             <a:fld id="{904F8374-DDA3-4289-A3C4-A561B6E67BA2}" type="datetimeFigureOut">
               <a:rPr lang="da-DK" smtClean="0"/>
-              <a:t>09-05-2024</a:t>
+              <a:t>10-05-2024</a:t>
             </a:fld>
             <a:endParaRPr lang="da-DK"/>
           </a:p>
@@ -4232,7 +4787,7 @@
           <a:p>
             <a:fld id="{904F8374-DDA3-4289-A3C4-A561B6E67BA2}" type="datetimeFigureOut">
               <a:rPr lang="da-DK" smtClean="0"/>
-              <a:t>09-05-2024</a:t>
+              <a:t>10-05-2024</a:t>
             </a:fld>
             <a:endParaRPr lang="da-DK"/>
           </a:p>
@@ -4463,7 +5018,7 @@
           <a:p>
             <a:fld id="{904F8374-DDA3-4289-A3C4-A561B6E67BA2}" type="datetimeFigureOut">
               <a:rPr lang="da-DK" smtClean="0"/>
-              <a:t>09-05-2024</a:t>
+              <a:t>10-05-2024</a:t>
             </a:fld>
             <a:endParaRPr lang="da-DK"/>
           </a:p>
@@ -4773,7 +5328,7 @@
           <a:p>
             <a:fld id="{904F8374-DDA3-4289-A3C4-A561B6E67BA2}" type="datetimeFigureOut">
               <a:rPr lang="da-DK" smtClean="0"/>
-              <a:t>09-05-2024</a:t>
+              <a:t>10-05-2024</a:t>
             </a:fld>
             <a:endParaRPr lang="da-DK"/>
           </a:p>
@@ -5246,7 +5801,7 @@
           <a:p>
             <a:fld id="{904F8374-DDA3-4289-A3C4-A561B6E67BA2}" type="datetimeFigureOut">
               <a:rPr lang="da-DK" smtClean="0"/>
-              <a:t>09-05-2024</a:t>
+              <a:t>10-05-2024</a:t>
             </a:fld>
             <a:endParaRPr lang="da-DK"/>
           </a:p>
@@ -5793,7 +6348,7 @@
           <a:p>
             <a:fld id="{904F8374-DDA3-4289-A3C4-A561B6E67BA2}" type="datetimeFigureOut">
               <a:rPr lang="da-DK" smtClean="0"/>
-              <a:t>09-05-2024</a:t>
+              <a:t>10-05-2024</a:t>
             </a:fld>
             <a:endParaRPr lang="da-DK"/>
           </a:p>
@@ -6567,7 +7122,7 @@
           <a:p>
             <a:fld id="{904F8374-DDA3-4289-A3C4-A561B6E67BA2}" type="datetimeFigureOut">
               <a:rPr lang="da-DK" smtClean="0"/>
-              <a:t>09-05-2024</a:t>
+              <a:t>10-05-2024</a:t>
             </a:fld>
             <a:endParaRPr lang="da-DK"/>
           </a:p>
@@ -6742,7 +7297,7 @@
           <a:p>
             <a:fld id="{904F8374-DDA3-4289-A3C4-A561B6E67BA2}" type="datetimeFigureOut">
               <a:rPr lang="da-DK" smtClean="0"/>
-              <a:t>09-05-2024</a:t>
+              <a:t>10-05-2024</a:t>
             </a:fld>
             <a:endParaRPr lang="da-DK"/>
           </a:p>
@@ -6965,7 +7520,7 @@
           <a:p>
             <a:fld id="{904F8374-DDA3-4289-A3C4-A561B6E67BA2}" type="datetimeFigureOut">
               <a:rPr lang="da-DK" smtClean="0"/>
-              <a:t>09-05-2024</a:t>
+              <a:t>10-05-2024</a:t>
             </a:fld>
             <a:endParaRPr lang="da-DK"/>
           </a:p>
@@ -7145,7 +7700,7 @@
           <a:p>
             <a:fld id="{904F8374-DDA3-4289-A3C4-A561B6E67BA2}" type="datetimeFigureOut">
               <a:rPr lang="da-DK" smtClean="0"/>
-              <a:t>09-05-2024</a:t>
+              <a:t>10-05-2024</a:t>
             </a:fld>
             <a:endParaRPr lang="da-DK"/>
           </a:p>
@@ -7434,7 +7989,7 @@
           <a:p>
             <a:fld id="{904F8374-DDA3-4289-A3C4-A561B6E67BA2}" type="datetimeFigureOut">
               <a:rPr lang="da-DK" smtClean="0"/>
-              <a:t>09-05-2024</a:t>
+              <a:t>10-05-2024</a:t>
             </a:fld>
             <a:endParaRPr lang="da-DK"/>
           </a:p>
@@ -7676,7 +8231,7 @@
           <a:p>
             <a:fld id="{904F8374-DDA3-4289-A3C4-A561B6E67BA2}" type="datetimeFigureOut">
               <a:rPr lang="da-DK" smtClean="0"/>
-              <a:t>09-05-2024</a:t>
+              <a:t>10-05-2024</a:t>
             </a:fld>
             <a:endParaRPr lang="da-DK"/>
           </a:p>
@@ -8055,7 +8610,7 @@
           <a:p>
             <a:fld id="{904F8374-DDA3-4289-A3C4-A561B6E67BA2}" type="datetimeFigureOut">
               <a:rPr lang="da-DK" smtClean="0"/>
-              <a:t>09-05-2024</a:t>
+              <a:t>10-05-2024</a:t>
             </a:fld>
             <a:endParaRPr lang="da-DK"/>
           </a:p>
@@ -8173,7 +8728,7 @@
           <a:p>
             <a:fld id="{904F8374-DDA3-4289-A3C4-A561B6E67BA2}" type="datetimeFigureOut">
               <a:rPr lang="da-DK" smtClean="0"/>
-              <a:t>09-05-2024</a:t>
+              <a:t>10-05-2024</a:t>
             </a:fld>
             <a:endParaRPr lang="da-DK"/>
           </a:p>
@@ -8268,7 +8823,7 @@
           <a:p>
             <a:fld id="{904F8374-DDA3-4289-A3C4-A561B6E67BA2}" type="datetimeFigureOut">
               <a:rPr lang="da-DK" smtClean="0"/>
-              <a:t>09-05-2024</a:t>
+              <a:t>10-05-2024</a:t>
             </a:fld>
             <a:endParaRPr lang="da-DK"/>
           </a:p>
@@ -8517,7 +9072,7 @@
           <a:p>
             <a:fld id="{904F8374-DDA3-4289-A3C4-A561B6E67BA2}" type="datetimeFigureOut">
               <a:rPr lang="da-DK" smtClean="0"/>
-              <a:t>09-05-2024</a:t>
+              <a:t>10-05-2024</a:t>
             </a:fld>
             <a:endParaRPr lang="da-DK"/>
           </a:p>
@@ -8774,7 +9329,7 @@
           <a:p>
             <a:fld id="{904F8374-DDA3-4289-A3C4-A561B6E67BA2}" type="datetimeFigureOut">
               <a:rPr lang="da-DK" smtClean="0"/>
-              <a:t>09-05-2024</a:t>
+              <a:t>10-05-2024</a:t>
             </a:fld>
             <a:endParaRPr lang="da-DK"/>
           </a:p>
@@ -9017,7 +9572,7 @@
           <a:p>
             <a:fld id="{904F8374-DDA3-4289-A3C4-A561B6E67BA2}" type="datetimeFigureOut">
               <a:rPr lang="da-DK" smtClean="0"/>
-              <a:t>09-05-2024</a:t>
+              <a:t>10-05-2024</a:t>
             </a:fld>
             <a:endParaRPr lang="da-DK"/>
           </a:p>
@@ -9715,6 +10270,12 @@
             </a:r>
           </a:p>
           <a:p>
+            <a:r>
+              <a:rPr lang="da-DK" dirty="0"/>
+              <a:t>Domæne eksperter</a:t>
+            </a:r>
+          </a:p>
+          <a:p>
             <a:endParaRPr lang="da-DK" dirty="0"/>
           </a:p>
           <a:p>
@@ -10095,6 +10656,42 @@
           </a:p>
         </p:txBody>
       </p:sp>
+      <p:pic>
+        <p:nvPicPr>
+          <p:cNvPr id="5" name="Billede 4">
+            <a:extLst>
+              <a:ext uri="{FF2B5EF4-FFF2-40B4-BE49-F238E27FC236}">
+                <a16:creationId xmlns:a16="http://schemas.microsoft.com/office/drawing/2014/main" id="{98162E0F-1D44-8C31-9B1F-A531EC229008}"/>
+              </a:ext>
+            </a:extLst>
+          </p:cNvPr>
+          <p:cNvPicPr>
+            <a:picLocks noChangeAspect="1"/>
+          </p:cNvPicPr>
+          <p:nvPr/>
+        </p:nvPicPr>
+        <p:blipFill>
+          <a:blip r:embed="rId3">
+            <a:extLst>
+              <a:ext uri="{28A0092B-C50C-407E-A947-70E740481C1C}">
+                <a14:useLocalDpi xmlns:a14="http://schemas.microsoft.com/office/drawing/2010/main" val="0"/>
+              </a:ext>
+            </a:extLst>
+          </a:blip>
+          <a:stretch>
+            <a:fillRect/>
+          </a:stretch>
+        </p:blipFill>
+        <p:spPr>
+          <a:xfrm>
+            <a:off x="6172200" y="3638550"/>
+            <a:ext cx="4962525" cy="2324100"/>
+          </a:xfrm>
+          <a:prstGeom prst="rect">
+            <a:avLst/>
+          </a:prstGeom>
+        </p:spPr>
+      </p:pic>
     </p:spTree>
     <p:extLst>
       <p:ext uri="{BB962C8B-B14F-4D97-AF65-F5344CB8AC3E}">
@@ -10610,12 +11207,32 @@
             </a:r>
           </a:p>
           <a:p>
+            <a:pPr lvl="1"/>
+            <a:r>
+              <a:rPr lang="da-DK" dirty="0" err="1"/>
+              <a:t>Round-robin</a:t>
+            </a:r>
+            <a:endParaRPr lang="da-DK" dirty="0"/>
+          </a:p>
+          <a:p>
             <a:r>
               <a:rPr lang="da-DK" dirty="0"/>
               <a:t>Stream</a:t>
             </a:r>
           </a:p>
           <a:p>
+            <a:pPr lvl="1"/>
+            <a:r>
+              <a:rPr lang="da-DK" dirty="0"/>
+              <a:t>Send til alle </a:t>
+            </a:r>
+            <a:r>
+              <a:rPr lang="da-DK" dirty="0" err="1"/>
+              <a:t>consumers</a:t>
+            </a:r>
+            <a:endParaRPr lang="da-DK" dirty="0"/>
+          </a:p>
+          <a:p>
             <a:r>
               <a:rPr lang="da-DK" dirty="0"/>
               <a:t>Skrive beskeder</a:t>
@@ -10626,13 +11243,6 @@
               <a:rPr lang="da-DK" dirty="0"/>
               <a:t>Læse beskeder</a:t>
             </a:r>
-          </a:p>
-          <a:p>
-            <a:r>
-              <a:rPr lang="da-DK" dirty="0" err="1"/>
-              <a:t>Round-robin</a:t>
-            </a:r>
-            <a:endParaRPr lang="da-DK" dirty="0"/>
           </a:p>
           <a:p>
             <a:r>
@@ -12642,7 +13252,7 @@
           <p:cNvPr id="2" name="Titel 1">
             <a:extLst>
               <a:ext uri="{FF2B5EF4-FFF2-40B4-BE49-F238E27FC236}">
-                <a16:creationId xmlns:a16="http://schemas.microsoft.com/office/drawing/2014/main" id="{FFEC5993-EFA9-A519-83CC-AF07225CE353}"/>
+                <a16:creationId xmlns:a16="http://schemas.microsoft.com/office/drawing/2014/main" id="{3619FEFF-8C80-E463-8638-98D6D67306F1}"/>
               </a:ext>
             </a:extLst>
           </p:cNvPr>
@@ -12653,35 +13263,57 @@
             <p:ph type="title"/>
           </p:nvPr>
         </p:nvSpPr>
+        <p:spPr/>
+        <p:txBody>
+          <a:bodyPr/>
+          <a:lstStyle/>
+          <a:p>
+            <a:r>
+              <a:rPr lang="da-DK" dirty="0"/>
+              <a:t>Kafka - partitioner</a:t>
+            </a:r>
+          </a:p>
+        </p:txBody>
+      </p:sp>
+      <p:pic>
+        <p:nvPicPr>
+          <p:cNvPr id="5" name="Pladsholder til indhold 4">
+            <a:extLst>
+              <a:ext uri="{FF2B5EF4-FFF2-40B4-BE49-F238E27FC236}">
+                <a16:creationId xmlns:a16="http://schemas.microsoft.com/office/drawing/2014/main" id="{B945296C-3408-0044-144C-7DA535AC563A}"/>
+              </a:ext>
+            </a:extLst>
+          </p:cNvPr>
+          <p:cNvPicPr>
+            <a:picLocks noGrp="1" noChangeAspect="1"/>
+          </p:cNvPicPr>
+          <p:nvPr>
+            <p:ph idx="1"/>
+          </p:nvPr>
+        </p:nvPicPr>
+        <p:blipFill>
+          <a:blip r:embed="rId3">
+            <a:extLst>
+              <a:ext uri="{28A0092B-C50C-407E-A947-70E740481C1C}">
+                <a14:useLocalDpi xmlns:a14="http://schemas.microsoft.com/office/drawing/2010/main" val="0"/>
+              </a:ext>
+            </a:extLst>
+          </a:blip>
+          <a:stretch>
+            <a:fillRect/>
+          </a:stretch>
+        </p:blipFill>
         <p:spPr>
           <a:xfrm>
-            <a:off x="0" y="0"/>
-            <a:ext cx="12192000" cy="6857999"/>
+            <a:off x="3662362" y="2377281"/>
+            <a:ext cx="4867275" cy="3657600"/>
           </a:xfrm>
         </p:spPr>
-        <p:txBody>
-          <a:bodyPr/>
-          <a:lstStyle/>
-          <a:p>
-            <a:pPr algn="ctr"/>
-            <a:r>
-              <a:rPr lang="da-DK" dirty="0"/>
-              <a:t>Demo</a:t>
-            </a:r>
-            <a:br>
-              <a:rPr lang="da-DK" dirty="0"/>
-            </a:br>
-            <a:r>
-              <a:rPr lang="da-DK" dirty="0"/>
-              <a:t>Kafka</a:t>
-            </a:r>
-          </a:p>
-        </p:txBody>
-      </p:sp>
+      </p:pic>
     </p:spTree>
     <p:extLst>
       <p:ext uri="{BB962C8B-B14F-4D97-AF65-F5344CB8AC3E}">
-        <p14:creationId xmlns:p14="http://schemas.microsoft.com/office/powerpoint/2010/main" val="230170436"/>
+        <p14:creationId xmlns:p14="http://schemas.microsoft.com/office/powerpoint/2010/main" val="3859196325"/>
       </p:ext>
     </p:extLst>
   </p:cSld>
@@ -12710,10 +13342,10 @@
       </p:grpSpPr>
       <p:sp>
         <p:nvSpPr>
-          <p:cNvPr id="8" name="Titel 7">
+          <p:cNvPr id="2" name="Titel 1">
             <a:extLst>
               <a:ext uri="{FF2B5EF4-FFF2-40B4-BE49-F238E27FC236}">
-                <a16:creationId xmlns:a16="http://schemas.microsoft.com/office/drawing/2014/main" id="{964C56D4-D3DF-1B49-7986-BDEB15B6AF6E}"/>
+                <a16:creationId xmlns:a16="http://schemas.microsoft.com/office/drawing/2014/main" id="{3619FEFF-8C80-E463-8638-98D6D67306F1}"/>
               </a:ext>
             </a:extLst>
           </p:cNvPr>
@@ -12731,208 +13363,50 @@
           <a:p>
             <a:r>
               <a:rPr lang="da-DK" dirty="0"/>
-              <a:t>Kafka - I forhold til </a:t>
-            </a:r>
-            <a:r>
-              <a:rPr lang="da-DK" dirty="0" err="1"/>
-              <a:t>RabbitMQ</a:t>
-            </a:r>
-            <a:endParaRPr lang="da-DK" dirty="0"/>
-          </a:p>
-        </p:txBody>
-      </p:sp>
-      <p:sp>
-        <p:nvSpPr>
-          <p:cNvPr id="2" name="Pladsholder til tekst 1">
+              <a:t>Kafka - partitioner</a:t>
+            </a:r>
+          </a:p>
+        </p:txBody>
+      </p:sp>
+      <p:pic>
+        <p:nvPicPr>
+          <p:cNvPr id="5" name="Pladsholder til indhold 4">
             <a:extLst>
               <a:ext uri="{FF2B5EF4-FFF2-40B4-BE49-F238E27FC236}">
-                <a16:creationId xmlns:a16="http://schemas.microsoft.com/office/drawing/2014/main" id="{52D09D76-F7EA-FB42-58D6-435CFFBC688F}"/>
+                <a16:creationId xmlns:a16="http://schemas.microsoft.com/office/drawing/2014/main" id="{F43CCC08-BEA9-ECA5-F5AA-CCB14F8704E6}"/>
               </a:ext>
             </a:extLst>
           </p:cNvPr>
-          <p:cNvSpPr>
-            <a:spLocks noGrp="1"/>
-          </p:cNvSpPr>
-          <p:nvPr>
-            <p:ph type="body" idx="1"/>
-          </p:nvPr>
-        </p:nvSpPr>
-        <p:spPr/>
-        <p:txBody>
-          <a:bodyPr/>
-          <a:lstStyle/>
-          <a:p>
-            <a:r>
-              <a:rPr lang="da-DK" dirty="0"/>
-              <a:t>Kafka</a:t>
-            </a:r>
-          </a:p>
-        </p:txBody>
-      </p:sp>
-      <p:sp>
-        <p:nvSpPr>
-          <p:cNvPr id="3" name="Pladsholder til indhold 2">
+          <p:cNvPicPr>
+            <a:picLocks noGrp="1" noChangeAspect="1"/>
+          </p:cNvPicPr>
+          <p:nvPr>
+            <p:ph idx="1"/>
+          </p:nvPr>
+        </p:nvPicPr>
+        <p:blipFill>
+          <a:blip r:embed="rId3">
             <a:extLst>
-              <a:ext uri="{FF2B5EF4-FFF2-40B4-BE49-F238E27FC236}">
-                <a16:creationId xmlns:a16="http://schemas.microsoft.com/office/drawing/2014/main" id="{339997B2-9ED5-7B5A-EBCA-3B5D07672F58}"/>
+              <a:ext uri="{28A0092B-C50C-407E-A947-70E740481C1C}">
+                <a14:useLocalDpi xmlns:a14="http://schemas.microsoft.com/office/drawing/2010/main" val="0"/>
               </a:ext>
             </a:extLst>
-          </p:cNvPr>
-          <p:cNvSpPr>
-            <a:spLocks noGrp="1"/>
-          </p:cNvSpPr>
-          <p:nvPr>
-            <p:ph sz="half" idx="2"/>
-          </p:nvPr>
-        </p:nvSpPr>
-        <p:spPr/>
-        <p:txBody>
-          <a:bodyPr/>
-          <a:lstStyle/>
-          <a:p>
-            <a:r>
-              <a:rPr lang="da-DK" dirty="0" err="1"/>
-              <a:t>Topic</a:t>
-            </a:r>
-            <a:endParaRPr lang="da-DK" dirty="0"/>
-          </a:p>
-          <a:p>
-            <a:r>
-              <a:rPr lang="da-DK" dirty="0"/>
-              <a:t>Kan have skema	</a:t>
-            </a:r>
-          </a:p>
-          <a:p>
-            <a:r>
-              <a:rPr lang="da-DK" dirty="0"/>
-              <a:t>Event</a:t>
-            </a:r>
-          </a:p>
-          <a:p>
-            <a:r>
-              <a:rPr lang="da-DK" dirty="0"/>
-              <a:t>Understøtter ikke </a:t>
-            </a:r>
-            <a:r>
-              <a:rPr lang="da-DK" dirty="0" err="1"/>
-              <a:t>Request</a:t>
-            </a:r>
-            <a:r>
-              <a:rPr lang="da-DK" dirty="0"/>
-              <a:t>/</a:t>
-            </a:r>
-            <a:r>
-              <a:rPr lang="da-DK" dirty="0" err="1"/>
-              <a:t>Response</a:t>
-            </a:r>
-            <a:endParaRPr lang="da-DK" dirty="0"/>
-          </a:p>
-          <a:p>
-            <a:r>
-              <a:rPr lang="da-DK" dirty="0"/>
-              <a:t>Consumer kan kun oprette </a:t>
-            </a:r>
-            <a:r>
-              <a:rPr lang="da-DK" dirty="0" err="1"/>
-              <a:t>topic</a:t>
-            </a:r>
-            <a:r>
-              <a:rPr lang="da-DK" dirty="0"/>
-              <a:t>, hvis broker tillader det</a:t>
-            </a:r>
-          </a:p>
-        </p:txBody>
-      </p:sp>
-      <p:sp>
-        <p:nvSpPr>
-          <p:cNvPr id="4" name="Pladsholder til tekst 3">
-            <a:extLst>
-              <a:ext uri="{FF2B5EF4-FFF2-40B4-BE49-F238E27FC236}">
-                <a16:creationId xmlns:a16="http://schemas.microsoft.com/office/drawing/2014/main" id="{D2BCD25E-3062-C776-FDCD-8724CFA931AE}"/>
-              </a:ext>
-            </a:extLst>
-          </p:cNvPr>
-          <p:cNvSpPr>
-            <a:spLocks noGrp="1"/>
-          </p:cNvSpPr>
-          <p:nvPr>
-            <p:ph type="body" sz="quarter" idx="3"/>
-          </p:nvPr>
-        </p:nvSpPr>
-        <p:spPr/>
-        <p:txBody>
-          <a:bodyPr/>
-          <a:lstStyle/>
-          <a:p>
-            <a:r>
-              <a:rPr lang="da-DK" dirty="0" err="1"/>
-              <a:t>RabbitMQ</a:t>
-            </a:r>
-            <a:endParaRPr lang="da-DK" dirty="0"/>
-          </a:p>
-        </p:txBody>
-      </p:sp>
-      <p:sp>
-        <p:nvSpPr>
-          <p:cNvPr id="5" name="Pladsholder til indhold 4">
-            <a:extLst>
-              <a:ext uri="{FF2B5EF4-FFF2-40B4-BE49-F238E27FC236}">
-                <a16:creationId xmlns:a16="http://schemas.microsoft.com/office/drawing/2014/main" id="{A6395EEA-AED6-2FD6-EC89-277DA9898817}"/>
-              </a:ext>
-            </a:extLst>
-          </p:cNvPr>
-          <p:cNvSpPr>
-            <a:spLocks noGrp="1"/>
-          </p:cNvSpPr>
-          <p:nvPr>
-            <p:ph sz="quarter" idx="4"/>
-          </p:nvPr>
-        </p:nvSpPr>
-        <p:spPr/>
-        <p:txBody>
-          <a:bodyPr/>
-          <a:lstStyle/>
-          <a:p>
-            <a:r>
-              <a:rPr lang="da-DK" dirty="0"/>
-              <a:t>Queue/Stream</a:t>
-            </a:r>
-          </a:p>
-          <a:p>
-            <a:r>
-              <a:rPr lang="da-DK" dirty="0"/>
-              <a:t>Intet skema</a:t>
-            </a:r>
-          </a:p>
-          <a:p>
-            <a:r>
-              <a:rPr lang="da-DK" dirty="0"/>
-              <a:t>Message</a:t>
-            </a:r>
-          </a:p>
-          <a:p>
-            <a:r>
-              <a:rPr lang="da-DK" dirty="0"/>
-              <a:t>Remote Procedure Call</a:t>
-            </a:r>
-          </a:p>
-          <a:p>
-            <a:r>
-              <a:rPr lang="da-DK" dirty="0"/>
-              <a:t>Consumer kan selv oprette </a:t>
-            </a:r>
-            <a:r>
-              <a:rPr lang="da-DK" dirty="0" err="1"/>
-              <a:t>queue</a:t>
-            </a:r>
-            <a:endParaRPr lang="da-DK" dirty="0"/>
-          </a:p>
-        </p:txBody>
-      </p:sp>
+          </a:blip>
+          <a:stretch>
+            <a:fillRect/>
+          </a:stretch>
+        </p:blipFill>
+        <p:spPr>
+          <a:xfrm>
+            <a:off x="3662362" y="2377281"/>
+            <a:ext cx="4867275" cy="3657600"/>
+          </a:xfrm>
+        </p:spPr>
+      </p:pic>
     </p:spTree>
     <p:extLst>
       <p:ext uri="{BB962C8B-B14F-4D97-AF65-F5344CB8AC3E}">
-        <p14:creationId xmlns:p14="http://schemas.microsoft.com/office/powerpoint/2010/main" val="1977421596"/>
+        <p14:creationId xmlns:p14="http://schemas.microsoft.com/office/powerpoint/2010/main" val="2256734993"/>
       </p:ext>
     </p:extLst>
   </p:cSld>
@@ -12961,6 +13435,421 @@
       </p:grpSpPr>
       <p:sp>
         <p:nvSpPr>
+          <p:cNvPr id="2" name="Titel 1">
+            <a:extLst>
+              <a:ext uri="{FF2B5EF4-FFF2-40B4-BE49-F238E27FC236}">
+                <a16:creationId xmlns:a16="http://schemas.microsoft.com/office/drawing/2014/main" id="{3619FEFF-8C80-E463-8638-98D6D67306F1}"/>
+              </a:ext>
+            </a:extLst>
+          </p:cNvPr>
+          <p:cNvSpPr>
+            <a:spLocks noGrp="1"/>
+          </p:cNvSpPr>
+          <p:nvPr>
+            <p:ph type="title"/>
+          </p:nvPr>
+        </p:nvSpPr>
+        <p:spPr/>
+        <p:txBody>
+          <a:bodyPr/>
+          <a:lstStyle/>
+          <a:p>
+            <a:r>
+              <a:rPr lang="da-DK" dirty="0"/>
+              <a:t>Kafka - partitioner</a:t>
+            </a:r>
+          </a:p>
+        </p:txBody>
+      </p:sp>
+      <p:pic>
+        <p:nvPicPr>
+          <p:cNvPr id="5" name="Pladsholder til indhold 4">
+            <a:extLst>
+              <a:ext uri="{FF2B5EF4-FFF2-40B4-BE49-F238E27FC236}">
+                <a16:creationId xmlns:a16="http://schemas.microsoft.com/office/drawing/2014/main" id="{635D7DC8-6A24-FBBA-5D4C-F9F6F5F5FBE9}"/>
+              </a:ext>
+            </a:extLst>
+          </p:cNvPr>
+          <p:cNvPicPr>
+            <a:picLocks noGrp="1" noChangeAspect="1"/>
+          </p:cNvPicPr>
+          <p:nvPr>
+            <p:ph idx="1"/>
+          </p:nvPr>
+        </p:nvPicPr>
+        <p:blipFill>
+          <a:blip r:embed="rId3">
+            <a:extLst>
+              <a:ext uri="{28A0092B-C50C-407E-A947-70E740481C1C}">
+                <a14:useLocalDpi xmlns:a14="http://schemas.microsoft.com/office/drawing/2010/main" val="0"/>
+              </a:ext>
+            </a:extLst>
+          </a:blip>
+          <a:stretch>
+            <a:fillRect/>
+          </a:stretch>
+        </p:blipFill>
+        <p:spPr>
+          <a:xfrm>
+            <a:off x="3662362" y="2377281"/>
+            <a:ext cx="4867275" cy="3657600"/>
+          </a:xfrm>
+        </p:spPr>
+      </p:pic>
+    </p:spTree>
+    <p:extLst>
+      <p:ext uri="{BB962C8B-B14F-4D97-AF65-F5344CB8AC3E}">
+        <p14:creationId xmlns:p14="http://schemas.microsoft.com/office/powerpoint/2010/main" val="3414003879"/>
+      </p:ext>
+    </p:extLst>
+  </p:cSld>
+  <p:clrMapOvr>
+    <a:masterClrMapping/>
+  </p:clrMapOvr>
+</p:sld>
+</file>
+
+<file path=ppt/slides/slide35.xml><?xml version="1.0" encoding="utf-8"?>
+<p:sld xmlns:a="http://schemas.openxmlformats.org/drawingml/2006/main" xmlns:r="http://schemas.openxmlformats.org/officeDocument/2006/relationships" xmlns:p="http://schemas.openxmlformats.org/presentationml/2006/main">
+  <p:cSld>
+    <p:spTree>
+      <p:nvGrpSpPr>
+        <p:cNvPr id="1" name=""/>
+        <p:cNvGrpSpPr/>
+        <p:nvPr/>
+      </p:nvGrpSpPr>
+      <p:grpSpPr>
+        <a:xfrm>
+          <a:off x="0" y="0"/>
+          <a:ext cx="0" cy="0"/>
+          <a:chOff x="0" y="0"/>
+          <a:chExt cx="0" cy="0"/>
+        </a:xfrm>
+      </p:grpSpPr>
+      <p:sp>
+        <p:nvSpPr>
+          <p:cNvPr id="2" name="Titel 1">
+            <a:extLst>
+              <a:ext uri="{FF2B5EF4-FFF2-40B4-BE49-F238E27FC236}">
+                <a16:creationId xmlns:a16="http://schemas.microsoft.com/office/drawing/2014/main" id="{FFEC5993-EFA9-A519-83CC-AF07225CE353}"/>
+              </a:ext>
+            </a:extLst>
+          </p:cNvPr>
+          <p:cNvSpPr>
+            <a:spLocks noGrp="1"/>
+          </p:cNvSpPr>
+          <p:nvPr>
+            <p:ph type="title"/>
+          </p:nvPr>
+        </p:nvSpPr>
+        <p:spPr>
+          <a:xfrm>
+            <a:off x="0" y="0"/>
+            <a:ext cx="12192000" cy="6857999"/>
+          </a:xfrm>
+        </p:spPr>
+        <p:txBody>
+          <a:bodyPr/>
+          <a:lstStyle/>
+          <a:p>
+            <a:pPr algn="ctr"/>
+            <a:r>
+              <a:rPr lang="da-DK" dirty="0"/>
+              <a:t>Demo</a:t>
+            </a:r>
+            <a:br>
+              <a:rPr lang="da-DK" dirty="0"/>
+            </a:br>
+            <a:r>
+              <a:rPr lang="da-DK" dirty="0"/>
+              <a:t>Kafka</a:t>
+            </a:r>
+          </a:p>
+        </p:txBody>
+      </p:sp>
+    </p:spTree>
+    <p:extLst>
+      <p:ext uri="{BB962C8B-B14F-4D97-AF65-F5344CB8AC3E}">
+        <p14:creationId xmlns:p14="http://schemas.microsoft.com/office/powerpoint/2010/main" val="230170436"/>
+      </p:ext>
+    </p:extLst>
+  </p:cSld>
+  <p:clrMapOvr>
+    <a:masterClrMapping/>
+  </p:clrMapOvr>
+</p:sld>
+</file>
+
+<file path=ppt/slides/slide36.xml><?xml version="1.0" encoding="utf-8"?>
+<p:sld xmlns:a="http://schemas.openxmlformats.org/drawingml/2006/main" xmlns:r="http://schemas.openxmlformats.org/officeDocument/2006/relationships" xmlns:p="http://schemas.openxmlformats.org/presentationml/2006/main">
+  <p:cSld>
+    <p:spTree>
+      <p:nvGrpSpPr>
+        <p:cNvPr id="1" name=""/>
+        <p:cNvGrpSpPr/>
+        <p:nvPr/>
+      </p:nvGrpSpPr>
+      <p:grpSpPr>
+        <a:xfrm>
+          <a:off x="0" y="0"/>
+          <a:ext cx="0" cy="0"/>
+          <a:chOff x="0" y="0"/>
+          <a:chExt cx="0" cy="0"/>
+        </a:xfrm>
+      </p:grpSpPr>
+      <p:sp>
+        <p:nvSpPr>
+          <p:cNvPr id="8" name="Titel 7">
+            <a:extLst>
+              <a:ext uri="{FF2B5EF4-FFF2-40B4-BE49-F238E27FC236}">
+                <a16:creationId xmlns:a16="http://schemas.microsoft.com/office/drawing/2014/main" id="{964C56D4-D3DF-1B49-7986-BDEB15B6AF6E}"/>
+              </a:ext>
+            </a:extLst>
+          </p:cNvPr>
+          <p:cNvSpPr>
+            <a:spLocks noGrp="1"/>
+          </p:cNvSpPr>
+          <p:nvPr>
+            <p:ph type="title"/>
+          </p:nvPr>
+        </p:nvSpPr>
+        <p:spPr/>
+        <p:txBody>
+          <a:bodyPr/>
+          <a:lstStyle/>
+          <a:p>
+            <a:r>
+              <a:rPr lang="da-DK" dirty="0"/>
+              <a:t>Kafka - I forhold til </a:t>
+            </a:r>
+            <a:r>
+              <a:rPr lang="da-DK" dirty="0" err="1"/>
+              <a:t>RabbitMQ</a:t>
+            </a:r>
+            <a:endParaRPr lang="da-DK" dirty="0"/>
+          </a:p>
+        </p:txBody>
+      </p:sp>
+      <p:sp>
+        <p:nvSpPr>
+          <p:cNvPr id="2" name="Pladsholder til tekst 1">
+            <a:extLst>
+              <a:ext uri="{FF2B5EF4-FFF2-40B4-BE49-F238E27FC236}">
+                <a16:creationId xmlns:a16="http://schemas.microsoft.com/office/drawing/2014/main" id="{52D09D76-F7EA-FB42-58D6-435CFFBC688F}"/>
+              </a:ext>
+            </a:extLst>
+          </p:cNvPr>
+          <p:cNvSpPr>
+            <a:spLocks noGrp="1"/>
+          </p:cNvSpPr>
+          <p:nvPr>
+            <p:ph type="body" idx="1"/>
+          </p:nvPr>
+        </p:nvSpPr>
+        <p:spPr/>
+        <p:txBody>
+          <a:bodyPr/>
+          <a:lstStyle/>
+          <a:p>
+            <a:r>
+              <a:rPr lang="da-DK" dirty="0"/>
+              <a:t>Kafka</a:t>
+            </a:r>
+          </a:p>
+        </p:txBody>
+      </p:sp>
+      <p:sp>
+        <p:nvSpPr>
+          <p:cNvPr id="3" name="Pladsholder til indhold 2">
+            <a:extLst>
+              <a:ext uri="{FF2B5EF4-FFF2-40B4-BE49-F238E27FC236}">
+                <a16:creationId xmlns:a16="http://schemas.microsoft.com/office/drawing/2014/main" id="{339997B2-9ED5-7B5A-EBCA-3B5D07672F58}"/>
+              </a:ext>
+            </a:extLst>
+          </p:cNvPr>
+          <p:cNvSpPr>
+            <a:spLocks noGrp="1"/>
+          </p:cNvSpPr>
+          <p:nvPr>
+            <p:ph sz="half" idx="2"/>
+          </p:nvPr>
+        </p:nvSpPr>
+        <p:spPr/>
+        <p:txBody>
+          <a:bodyPr/>
+          <a:lstStyle/>
+          <a:p>
+            <a:r>
+              <a:rPr lang="da-DK" dirty="0" err="1"/>
+              <a:t>Topic</a:t>
+            </a:r>
+            <a:endParaRPr lang="da-DK" dirty="0"/>
+          </a:p>
+          <a:p>
+            <a:r>
+              <a:rPr lang="da-DK" dirty="0"/>
+              <a:t>Kan have skema	</a:t>
+            </a:r>
+          </a:p>
+          <a:p>
+            <a:r>
+              <a:rPr lang="da-DK" dirty="0"/>
+              <a:t>Event</a:t>
+            </a:r>
+          </a:p>
+          <a:p>
+            <a:r>
+              <a:rPr lang="da-DK" dirty="0"/>
+              <a:t>Understøtter ikke </a:t>
+            </a:r>
+            <a:r>
+              <a:rPr lang="da-DK" dirty="0" err="1"/>
+              <a:t>Request</a:t>
+            </a:r>
+            <a:r>
+              <a:rPr lang="da-DK" dirty="0"/>
+              <a:t>/</a:t>
+            </a:r>
+            <a:r>
+              <a:rPr lang="da-DK" dirty="0" err="1"/>
+              <a:t>Response</a:t>
+            </a:r>
+            <a:endParaRPr lang="da-DK" dirty="0"/>
+          </a:p>
+          <a:p>
+            <a:r>
+              <a:rPr lang="da-DK" dirty="0"/>
+              <a:t>Consumer kan kun oprette </a:t>
+            </a:r>
+            <a:r>
+              <a:rPr lang="da-DK" dirty="0" err="1"/>
+              <a:t>topic</a:t>
+            </a:r>
+            <a:r>
+              <a:rPr lang="da-DK" dirty="0"/>
+              <a:t>, hvis broker tillader det</a:t>
+            </a:r>
+          </a:p>
+        </p:txBody>
+      </p:sp>
+      <p:sp>
+        <p:nvSpPr>
+          <p:cNvPr id="4" name="Pladsholder til tekst 3">
+            <a:extLst>
+              <a:ext uri="{FF2B5EF4-FFF2-40B4-BE49-F238E27FC236}">
+                <a16:creationId xmlns:a16="http://schemas.microsoft.com/office/drawing/2014/main" id="{D2BCD25E-3062-C776-FDCD-8724CFA931AE}"/>
+              </a:ext>
+            </a:extLst>
+          </p:cNvPr>
+          <p:cNvSpPr>
+            <a:spLocks noGrp="1"/>
+          </p:cNvSpPr>
+          <p:nvPr>
+            <p:ph type="body" sz="quarter" idx="3"/>
+          </p:nvPr>
+        </p:nvSpPr>
+        <p:spPr/>
+        <p:txBody>
+          <a:bodyPr/>
+          <a:lstStyle/>
+          <a:p>
+            <a:r>
+              <a:rPr lang="da-DK" dirty="0" err="1"/>
+              <a:t>RabbitMQ</a:t>
+            </a:r>
+            <a:endParaRPr lang="da-DK" dirty="0"/>
+          </a:p>
+        </p:txBody>
+      </p:sp>
+      <p:sp>
+        <p:nvSpPr>
+          <p:cNvPr id="5" name="Pladsholder til indhold 4">
+            <a:extLst>
+              <a:ext uri="{FF2B5EF4-FFF2-40B4-BE49-F238E27FC236}">
+                <a16:creationId xmlns:a16="http://schemas.microsoft.com/office/drawing/2014/main" id="{A6395EEA-AED6-2FD6-EC89-277DA9898817}"/>
+              </a:ext>
+            </a:extLst>
+          </p:cNvPr>
+          <p:cNvSpPr>
+            <a:spLocks noGrp="1"/>
+          </p:cNvSpPr>
+          <p:nvPr>
+            <p:ph sz="quarter" idx="4"/>
+          </p:nvPr>
+        </p:nvSpPr>
+        <p:spPr/>
+        <p:txBody>
+          <a:bodyPr/>
+          <a:lstStyle/>
+          <a:p>
+            <a:r>
+              <a:rPr lang="da-DK" dirty="0"/>
+              <a:t>Queue/Stream</a:t>
+            </a:r>
+          </a:p>
+          <a:p>
+            <a:r>
+              <a:rPr lang="da-DK" dirty="0"/>
+              <a:t>Intet skema</a:t>
+            </a:r>
+          </a:p>
+          <a:p>
+            <a:r>
+              <a:rPr lang="da-DK" dirty="0"/>
+              <a:t>Message</a:t>
+            </a:r>
+          </a:p>
+          <a:p>
+            <a:r>
+              <a:rPr lang="da-DK" dirty="0"/>
+              <a:t>Remote Procedure Call</a:t>
+            </a:r>
+          </a:p>
+          <a:p>
+            <a:r>
+              <a:rPr lang="da-DK" dirty="0"/>
+              <a:t>Consumer kan selv oprette </a:t>
+            </a:r>
+            <a:r>
+              <a:rPr lang="da-DK" dirty="0" err="1"/>
+              <a:t>queue</a:t>
+            </a:r>
+            <a:endParaRPr lang="da-DK" dirty="0"/>
+          </a:p>
+        </p:txBody>
+      </p:sp>
+    </p:spTree>
+    <p:extLst>
+      <p:ext uri="{BB962C8B-B14F-4D97-AF65-F5344CB8AC3E}">
+        <p14:creationId xmlns:p14="http://schemas.microsoft.com/office/powerpoint/2010/main" val="1977421596"/>
+      </p:ext>
+    </p:extLst>
+  </p:cSld>
+  <p:clrMapOvr>
+    <a:masterClrMapping/>
+  </p:clrMapOvr>
+</p:sld>
+</file>
+
+<file path=ppt/slides/slide37.xml><?xml version="1.0" encoding="utf-8"?>
+<p:sld xmlns:a="http://schemas.openxmlformats.org/drawingml/2006/main" xmlns:r="http://schemas.openxmlformats.org/officeDocument/2006/relationships" xmlns:p="http://schemas.openxmlformats.org/presentationml/2006/main">
+  <p:cSld>
+    <p:spTree>
+      <p:nvGrpSpPr>
+        <p:cNvPr id="1" name=""/>
+        <p:cNvGrpSpPr/>
+        <p:nvPr/>
+      </p:nvGrpSpPr>
+      <p:grpSpPr>
+        <a:xfrm>
+          <a:off x="0" y="0"/>
+          <a:ext cx="0" cy="0"/>
+          <a:chOff x="0" y="0"/>
+          <a:chExt cx="0" cy="0"/>
+        </a:xfrm>
+      </p:grpSpPr>
+      <p:sp>
+        <p:nvSpPr>
           <p:cNvPr id="8" name="Titel 7">
             <a:extLst>
               <a:ext uri="{FF2B5EF4-FFF2-40B4-BE49-F238E27FC236}">
@@ -13059,7 +13948,7 @@
 </p:sld>
 </file>
 
-<file path=ppt/slides/slide35.xml><?xml version="1.0" encoding="utf-8"?>
+<file path=ppt/slides/slide38.xml><?xml version="1.0" encoding="utf-8"?>
 <p:sld xmlns:a="http://schemas.openxmlformats.org/drawingml/2006/main" xmlns:r="http://schemas.openxmlformats.org/officeDocument/2006/relationships" xmlns:p="http://schemas.openxmlformats.org/presentationml/2006/main">
   <p:cSld>
     <p:spTree>
@@ -13157,7 +14046,7 @@
 </p:sld>
 </file>
 
-<file path=ppt/slides/slide36.xml><?xml version="1.0" encoding="utf-8"?>
+<file path=ppt/slides/slide39.xml><?xml version="1.0" encoding="utf-8"?>
 <p:sld xmlns:a="http://schemas.openxmlformats.org/drawingml/2006/main" xmlns:r="http://schemas.openxmlformats.org/officeDocument/2006/relationships" xmlns:p="http://schemas.openxmlformats.org/presentationml/2006/main" show="0">
   <p:cSld>
     <p:spTree>
@@ -13330,158 +14219,6 @@
     <p:extLst>
       <p:ext uri="{BB962C8B-B14F-4D97-AF65-F5344CB8AC3E}">
         <p14:creationId xmlns:p14="http://schemas.microsoft.com/office/powerpoint/2010/main" val="221808590"/>
-      </p:ext>
-    </p:extLst>
-  </p:cSld>
-  <p:clrMapOvr>
-    <a:masterClrMapping/>
-  </p:clrMapOvr>
-</p:sld>
-</file>
-
-<file path=ppt/slides/slide37.xml><?xml version="1.0" encoding="utf-8"?>
-<p:sld xmlns:a="http://schemas.openxmlformats.org/drawingml/2006/main" xmlns:r="http://schemas.openxmlformats.org/officeDocument/2006/relationships" xmlns:p="http://schemas.openxmlformats.org/presentationml/2006/main">
-  <p:cSld>
-    <p:spTree>
-      <p:nvGrpSpPr>
-        <p:cNvPr id="1" name=""/>
-        <p:cNvGrpSpPr/>
-        <p:nvPr/>
-      </p:nvGrpSpPr>
-      <p:grpSpPr>
-        <a:xfrm>
-          <a:off x="0" y="0"/>
-          <a:ext cx="0" cy="0"/>
-          <a:chOff x="0" y="0"/>
-          <a:chExt cx="0" cy="0"/>
-        </a:xfrm>
-      </p:grpSpPr>
-      <p:sp>
-        <p:nvSpPr>
-          <p:cNvPr id="2" name="Titel 1">
-            <a:extLst>
-              <a:ext uri="{FF2B5EF4-FFF2-40B4-BE49-F238E27FC236}">
-                <a16:creationId xmlns:a16="http://schemas.microsoft.com/office/drawing/2014/main" id="{BD49CE15-8830-7735-EEBA-56B46383EED4}"/>
-              </a:ext>
-            </a:extLst>
-          </p:cNvPr>
-          <p:cNvSpPr>
-            <a:spLocks noGrp="1"/>
-          </p:cNvSpPr>
-          <p:nvPr>
-            <p:ph type="title"/>
-          </p:nvPr>
-        </p:nvSpPr>
-        <p:spPr/>
-        <p:txBody>
-          <a:bodyPr/>
-          <a:lstStyle/>
-          <a:p>
-            <a:r>
-              <a:rPr lang="da-DK" dirty="0"/>
-              <a:t>Referencer</a:t>
-            </a:r>
-          </a:p>
-        </p:txBody>
-      </p:sp>
-      <p:sp>
-        <p:nvSpPr>
-          <p:cNvPr id="3" name="Pladsholder til indhold 2">
-            <a:extLst>
-              <a:ext uri="{FF2B5EF4-FFF2-40B4-BE49-F238E27FC236}">
-                <a16:creationId xmlns:a16="http://schemas.microsoft.com/office/drawing/2014/main" id="{DBD79205-814B-8ABA-7820-A8964F2C7957}"/>
-              </a:ext>
-            </a:extLst>
-          </p:cNvPr>
-          <p:cNvSpPr>
-            <a:spLocks noGrp="1"/>
-          </p:cNvSpPr>
-          <p:nvPr>
-            <p:ph idx="1"/>
-          </p:nvPr>
-        </p:nvSpPr>
-        <p:spPr/>
-        <p:txBody>
-          <a:bodyPr/>
-          <a:lstStyle/>
-          <a:p>
-            <a:r>
-              <a:rPr lang="da-DK" dirty="0"/>
-              <a:t>[1] M. Fowler: </a:t>
-            </a:r>
-            <a:r>
-              <a:rPr lang="da-DK" dirty="0">
-                <a:hlinkClick r:id="rId2">
-                  <a:extLst>
-                    <a:ext uri="{A12FA001-AC4F-418D-AE19-62706E023703}">
-                      <ahyp:hlinkClr xmlns:ahyp="http://schemas.microsoft.com/office/drawing/2018/hyperlinkcolor" val="tx"/>
-                    </a:ext>
-                  </a:extLst>
-                </a:hlinkClick>
-              </a:rPr>
-              <a:t>https://martinfowler.com/bliki/UbiquitousLanguage.html</a:t>
-            </a:r>
-            <a:r>
-              <a:rPr lang="da-DK" dirty="0"/>
-              <a:t> (3/5/2024</a:t>
-            </a:r>
-          </a:p>
-          <a:p>
-            <a:r>
-              <a:rPr lang="da-DK" dirty="0"/>
-              <a:t>[2] Microsoft: </a:t>
-            </a:r>
-            <a:r>
-              <a:rPr lang="da-DK" dirty="0">
-                <a:hlinkClick r:id="rId3">
-                  <a:extLst>
-                    <a:ext uri="{A12FA001-AC4F-418D-AE19-62706E023703}">
-                      <ahyp:hlinkClr xmlns:ahyp="http://schemas.microsoft.com/office/drawing/2018/hyperlinkcolor" val="tx"/>
-                    </a:ext>
-                  </a:extLst>
-                </a:hlinkClick>
-              </a:rPr>
-              <a:t>https://learn.microsoft.com/en-us/dotnet/architecture/microservices/microservice-ddd-cqrs-patterns/ddd-oriented-microservice</a:t>
-            </a:r>
-            <a:r>
-              <a:rPr lang="da-DK" dirty="0"/>
-              <a:t> (8/5/2024) </a:t>
-            </a:r>
-          </a:p>
-          <a:p>
-            <a:r>
-              <a:rPr lang="da-DK" dirty="0"/>
-              <a:t>[3] Apache Kafka: </a:t>
-            </a:r>
-            <a:r>
-              <a:rPr lang="da-DK" dirty="0">
-                <a:hlinkClick r:id="rId4">
-                  <a:extLst>
-                    <a:ext uri="{A12FA001-AC4F-418D-AE19-62706E023703}">
-                      <ahyp:hlinkClr xmlns:ahyp="http://schemas.microsoft.com/office/drawing/2018/hyperlinkcolor" val="tx"/>
-                    </a:ext>
-                  </a:extLst>
-                </a:hlinkClick>
-              </a:rPr>
-              <a:t>https://kafka.apache.org/documentation</a:t>
-            </a:r>
-            <a:r>
-              <a:rPr lang="da-DK" dirty="0"/>
-              <a:t> (6/5/2024)</a:t>
-            </a:r>
-          </a:p>
-          <a:p>
-            <a:endParaRPr lang="da-DK" dirty="0"/>
-          </a:p>
-          <a:p>
-            <a:endParaRPr lang="da-DK" dirty="0"/>
-          </a:p>
-        </p:txBody>
-      </p:sp>
-    </p:spTree>
-    <p:extLst>
-      <p:ext uri="{BB962C8B-B14F-4D97-AF65-F5344CB8AC3E}">
-        <p14:creationId xmlns:p14="http://schemas.microsoft.com/office/powerpoint/2010/main" val="3618761977"/>
       </p:ext>
     </p:extLst>
   </p:cSld>
@@ -13572,6 +14309,158 @@
     <p:extLst>
       <p:ext uri="{BB962C8B-B14F-4D97-AF65-F5344CB8AC3E}">
         <p14:creationId xmlns:p14="http://schemas.microsoft.com/office/powerpoint/2010/main" val="3445350388"/>
+      </p:ext>
+    </p:extLst>
+  </p:cSld>
+  <p:clrMapOvr>
+    <a:masterClrMapping/>
+  </p:clrMapOvr>
+</p:sld>
+</file>
+
+<file path=ppt/slides/slide40.xml><?xml version="1.0" encoding="utf-8"?>
+<p:sld xmlns:a="http://schemas.openxmlformats.org/drawingml/2006/main" xmlns:r="http://schemas.openxmlformats.org/officeDocument/2006/relationships" xmlns:p="http://schemas.openxmlformats.org/presentationml/2006/main">
+  <p:cSld>
+    <p:spTree>
+      <p:nvGrpSpPr>
+        <p:cNvPr id="1" name=""/>
+        <p:cNvGrpSpPr/>
+        <p:nvPr/>
+      </p:nvGrpSpPr>
+      <p:grpSpPr>
+        <a:xfrm>
+          <a:off x="0" y="0"/>
+          <a:ext cx="0" cy="0"/>
+          <a:chOff x="0" y="0"/>
+          <a:chExt cx="0" cy="0"/>
+        </a:xfrm>
+      </p:grpSpPr>
+      <p:sp>
+        <p:nvSpPr>
+          <p:cNvPr id="2" name="Titel 1">
+            <a:extLst>
+              <a:ext uri="{FF2B5EF4-FFF2-40B4-BE49-F238E27FC236}">
+                <a16:creationId xmlns:a16="http://schemas.microsoft.com/office/drawing/2014/main" id="{BD49CE15-8830-7735-EEBA-56B46383EED4}"/>
+              </a:ext>
+            </a:extLst>
+          </p:cNvPr>
+          <p:cNvSpPr>
+            <a:spLocks noGrp="1"/>
+          </p:cNvSpPr>
+          <p:nvPr>
+            <p:ph type="title"/>
+          </p:nvPr>
+        </p:nvSpPr>
+        <p:spPr/>
+        <p:txBody>
+          <a:bodyPr/>
+          <a:lstStyle/>
+          <a:p>
+            <a:r>
+              <a:rPr lang="da-DK" dirty="0"/>
+              <a:t>Referencer</a:t>
+            </a:r>
+          </a:p>
+        </p:txBody>
+      </p:sp>
+      <p:sp>
+        <p:nvSpPr>
+          <p:cNvPr id="3" name="Pladsholder til indhold 2">
+            <a:extLst>
+              <a:ext uri="{FF2B5EF4-FFF2-40B4-BE49-F238E27FC236}">
+                <a16:creationId xmlns:a16="http://schemas.microsoft.com/office/drawing/2014/main" id="{DBD79205-814B-8ABA-7820-A8964F2C7957}"/>
+              </a:ext>
+            </a:extLst>
+          </p:cNvPr>
+          <p:cNvSpPr>
+            <a:spLocks noGrp="1"/>
+          </p:cNvSpPr>
+          <p:nvPr>
+            <p:ph idx="1"/>
+          </p:nvPr>
+        </p:nvSpPr>
+        <p:spPr/>
+        <p:txBody>
+          <a:bodyPr/>
+          <a:lstStyle/>
+          <a:p>
+            <a:r>
+              <a:rPr lang="da-DK" dirty="0"/>
+              <a:t>[1] M. Fowler: </a:t>
+            </a:r>
+            <a:r>
+              <a:rPr lang="da-DK" dirty="0">
+                <a:hlinkClick r:id="rId2">
+                  <a:extLst>
+                    <a:ext uri="{A12FA001-AC4F-418D-AE19-62706E023703}">
+                      <ahyp:hlinkClr xmlns:ahyp="http://schemas.microsoft.com/office/drawing/2018/hyperlinkcolor" val="tx"/>
+                    </a:ext>
+                  </a:extLst>
+                </a:hlinkClick>
+              </a:rPr>
+              <a:t>https://martinfowler.com/bliki/UbiquitousLanguage.html</a:t>
+            </a:r>
+            <a:r>
+              <a:rPr lang="da-DK" dirty="0"/>
+              <a:t> (3/5/2024</a:t>
+            </a:r>
+          </a:p>
+          <a:p>
+            <a:r>
+              <a:rPr lang="da-DK" dirty="0"/>
+              <a:t>[2] Microsoft: </a:t>
+            </a:r>
+            <a:r>
+              <a:rPr lang="da-DK" dirty="0">
+                <a:hlinkClick r:id="rId3">
+                  <a:extLst>
+                    <a:ext uri="{A12FA001-AC4F-418D-AE19-62706E023703}">
+                      <ahyp:hlinkClr xmlns:ahyp="http://schemas.microsoft.com/office/drawing/2018/hyperlinkcolor" val="tx"/>
+                    </a:ext>
+                  </a:extLst>
+                </a:hlinkClick>
+              </a:rPr>
+              <a:t>https://learn.microsoft.com/en-us/dotnet/architecture/microservices/microservice-ddd-cqrs-patterns/ddd-oriented-microservice</a:t>
+            </a:r>
+            <a:r>
+              <a:rPr lang="da-DK" dirty="0"/>
+              <a:t> (8/5/2024) </a:t>
+            </a:r>
+          </a:p>
+          <a:p>
+            <a:r>
+              <a:rPr lang="da-DK" dirty="0"/>
+              <a:t>[3] Apache Kafka: </a:t>
+            </a:r>
+            <a:r>
+              <a:rPr lang="da-DK" dirty="0">
+                <a:hlinkClick r:id="rId4">
+                  <a:extLst>
+                    <a:ext uri="{A12FA001-AC4F-418D-AE19-62706E023703}">
+                      <ahyp:hlinkClr xmlns:ahyp="http://schemas.microsoft.com/office/drawing/2018/hyperlinkcolor" val="tx"/>
+                    </a:ext>
+                  </a:extLst>
+                </a:hlinkClick>
+              </a:rPr>
+              <a:t>https://kafka.apache.org/documentation</a:t>
+            </a:r>
+            <a:r>
+              <a:rPr lang="da-DK" dirty="0"/>
+              <a:t> (6/5/2024)</a:t>
+            </a:r>
+          </a:p>
+          <a:p>
+            <a:endParaRPr lang="da-DK" dirty="0"/>
+          </a:p>
+          <a:p>
+            <a:endParaRPr lang="da-DK" dirty="0"/>
+          </a:p>
+        </p:txBody>
+      </p:sp>
+    </p:spTree>
+    <p:extLst>
+      <p:ext uri="{BB962C8B-B14F-4D97-AF65-F5344CB8AC3E}">
+        <p14:creationId xmlns:p14="http://schemas.microsoft.com/office/powerpoint/2010/main" val="3618761977"/>
       </p:ext>
     </p:extLst>
   </p:cSld>

</xml_diff>

<commit_message>
minor changes to kafka and improvements to presentation
</commit_message>
<xml_diff>
--- a/presentation.pptx
+++ b/presentation.pptx
@@ -227,7 +227,7 @@
           <a:p>
             <a:fld id="{8F5AC0EE-C0EF-4DBE-8184-146DED29BF67}" type="datetimeFigureOut">
               <a:rPr lang="da-DK" smtClean="0"/>
-              <a:t>12-05-2024</a:t>
+              <a:t>13-05-2024</a:t>
             </a:fld>
             <a:endParaRPr lang="da-DK"/>
           </a:p>
@@ -729,7 +729,13 @@
             </a:r>
             <a:r>
               <a:rPr lang="da-DK" dirty="0"/>
-              <a:t> er for at undgå at skulle slå op i begge databaser </a:t>
+              <a:t> er for at undgå at skulle slå op i begge databaser</a:t>
+            </a:r>
+          </a:p>
+          <a:p>
+            <a:r>
+              <a:rPr lang="da-DK" dirty="0"/>
+              <a:t>Fremviser at den samme værdi kan havde forskellige navne i forretningen</a:t>
             </a:r>
           </a:p>
           <a:p>
@@ -837,13 +843,8 @@
           <a:p>
             <a:r>
               <a:rPr lang="da-DK" dirty="0"/>
-              <a:t>Produktet fremviser ikke helt det brugbare for DDD pga. </a:t>
-            </a:r>
-            <a:r>
-              <a:rPr lang="da-DK" dirty="0" err="1"/>
-              <a:t>simplehed</a:t>
-            </a:r>
-            <a:endParaRPr lang="da-DK" dirty="0"/>
+              <a:t>Produktet fremviser ikke helt det brugbare for DDD pga. simpelhed</a:t>
+            </a:r>
           </a:p>
         </p:txBody>
       </p:sp>
@@ -991,7 +992,10 @@
             <a:endParaRPr lang="da-DK" dirty="0"/>
           </a:p>
           <a:p>
-            <a:endParaRPr lang="da-DK" dirty="0"/>
+            <a:r>
+              <a:rPr lang="da-DK" dirty="0"/>
+              <a:t>RPC svare tilbage på producer oprettede køer</a:t>
+            </a:r>
           </a:p>
         </p:txBody>
       </p:sp>
@@ -1421,6 +1425,49 @@
             </a:r>
           </a:p>
           <a:p>
+            <a:pPr marL="0" marR="0" lvl="0" indent="0" algn="l" defTabSz="914400" rtl="0" eaLnBrk="1" fontAlgn="auto" latinLnBrk="0" hangingPunct="1">
+              <a:lnSpc>
+                <a:spcPct val="100000"/>
+              </a:lnSpc>
+              <a:spcBef>
+                <a:spcPts val="0"/>
+              </a:spcBef>
+              <a:spcAft>
+                <a:spcPts val="0"/>
+              </a:spcAft>
+              <a:buClrTx/>
+              <a:buSzTx/>
+              <a:buFontTx/>
+              <a:buNone/>
+              <a:tabLst/>
+              <a:defRPr/>
+            </a:pPr>
+            <a:r>
+              <a:rPr lang="da-DK" dirty="0"/>
+              <a:t>Server/Klient kommunikation</a:t>
+            </a:r>
+          </a:p>
+          <a:p>
+            <a:pPr marL="0" marR="0" lvl="0" indent="0" algn="l" defTabSz="914400" rtl="0" eaLnBrk="1" fontAlgn="auto" latinLnBrk="0" hangingPunct="1">
+              <a:lnSpc>
+                <a:spcPct val="100000"/>
+              </a:lnSpc>
+              <a:spcBef>
+                <a:spcPts val="0"/>
+              </a:spcBef>
+              <a:spcAft>
+                <a:spcPts val="0"/>
+              </a:spcAft>
+              <a:buClrTx/>
+              <a:buSzTx/>
+              <a:buFontTx/>
+              <a:buNone/>
+              <a:tabLst/>
+              <a:defRPr/>
+            </a:pPr>
+            <a:endParaRPr lang="da-DK" dirty="0"/>
+          </a:p>
+          <a:p>
             <a:endParaRPr lang="da-DK" dirty="0"/>
           </a:p>
         </p:txBody>
@@ -1536,6 +1583,24 @@
               <a:t> server som enten er en controller, broker eller begge</a:t>
             </a:r>
           </a:p>
+          <a:p>
+            <a:r>
+              <a:rPr lang="da-DK" dirty="0" err="1"/>
+              <a:t>Schema</a:t>
+            </a:r>
+            <a:r>
+              <a:rPr lang="da-DK" dirty="0"/>
+              <a:t> </a:t>
+            </a:r>
+            <a:r>
+              <a:rPr lang="da-DK" dirty="0" err="1"/>
+              <a:t>registry</a:t>
+            </a:r>
+            <a:r>
+              <a:rPr lang="da-DK" dirty="0"/>
+              <a:t>, ikke nødvendigt</a:t>
+            </a:r>
+          </a:p>
         </p:txBody>
       </p:sp>
       <p:sp>
@@ -2731,6 +2796,37 @@
               <a:t>Sidste kræver nok også at beskeden bliver gemt i en database med behandlings status </a:t>
             </a:r>
           </a:p>
+          <a:p>
+            <a:r>
+              <a:rPr lang="da-DK" dirty="0" err="1"/>
+              <a:t>Rabbitmq</a:t>
+            </a:r>
+            <a:r>
+              <a:rPr lang="da-DK" dirty="0"/>
+              <a:t> </a:t>
+            </a:r>
+            <a:r>
+              <a:rPr lang="da-DK" dirty="0" err="1"/>
+              <a:t>to-vejs</a:t>
+            </a:r>
+            <a:r>
+              <a:rPr lang="da-DK" dirty="0"/>
+              <a:t>, </a:t>
+            </a:r>
+            <a:r>
+              <a:rPr lang="da-DK" dirty="0" err="1"/>
+              <a:t>kafka</a:t>
+            </a:r>
+            <a:r>
+              <a:rPr lang="da-DK" dirty="0"/>
+              <a:t>, </a:t>
+            </a:r>
+            <a:r>
+              <a:rPr lang="da-DK" dirty="0" err="1"/>
+              <a:t>en-vejs</a:t>
+            </a:r>
+            <a:endParaRPr lang="da-DK" dirty="0"/>
+          </a:p>
         </p:txBody>
       </p:sp>
       <p:sp>
@@ -3132,6 +3228,31 @@
           <a:p>
             <a:r>
               <a:rPr lang="da-DK" dirty="0"/>
+              <a:t>Bruges som et lag mellem </a:t>
+            </a:r>
+            <a:r>
+              <a:rPr lang="da-DK" dirty="0" err="1"/>
+              <a:t>extern</a:t>
+            </a:r>
+            <a:r>
+              <a:rPr lang="da-DK" dirty="0"/>
+              <a:t> og intern, til at ‘forbinde’ </a:t>
+            </a:r>
+            <a:r>
+              <a:rPr lang="da-DK" dirty="0" err="1"/>
+              <a:t>extern</a:t>
+            </a:r>
+            <a:r>
+              <a:rPr lang="da-DK" dirty="0"/>
+              <a:t> med intern </a:t>
+            </a:r>
+          </a:p>
+          <a:p>
+            <a:endParaRPr lang="da-DK" dirty="0"/>
+          </a:p>
+          <a:p>
+            <a:r>
+              <a:rPr lang="da-DK" dirty="0"/>
               <a:t>Presentation </a:t>
             </a:r>
             <a:r>
@@ -3393,6 +3514,12 @@
         <p:txBody>
           <a:bodyPr/>
           <a:lstStyle/>
+          <a:p>
+            <a:r>
+              <a:rPr lang="da-DK" dirty="0"/>
+              <a:t>Fremvise brugerfladerne</a:t>
+            </a:r>
+          </a:p>
           <a:p>
             <a:r>
               <a:rPr lang="da-DK" dirty="0"/>
@@ -3954,7 +4081,7 @@
           <a:p>
             <a:fld id="{904F8374-DDA3-4289-A3C4-A561B6E67BA2}" type="datetimeFigureOut">
               <a:rPr lang="da-DK" smtClean="0"/>
-              <a:t>12-05-2024</a:t>
+              <a:t>13-05-2024</a:t>
             </a:fld>
             <a:endParaRPr lang="da-DK"/>
           </a:p>
@@ -4221,7 +4348,7 @@
           <a:p>
             <a:fld id="{904F8374-DDA3-4289-A3C4-A561B6E67BA2}" type="datetimeFigureOut">
               <a:rPr lang="da-DK" smtClean="0"/>
-              <a:t>12-05-2024</a:t>
+              <a:t>13-05-2024</a:t>
             </a:fld>
             <a:endParaRPr lang="da-DK"/>
           </a:p>
@@ -4452,7 +4579,7 @@
           <a:p>
             <a:fld id="{904F8374-DDA3-4289-A3C4-A561B6E67BA2}" type="datetimeFigureOut">
               <a:rPr lang="da-DK" smtClean="0"/>
-              <a:t>12-05-2024</a:t>
+              <a:t>13-05-2024</a:t>
             </a:fld>
             <a:endParaRPr lang="da-DK"/>
           </a:p>
@@ -4762,7 +4889,7 @@
           <a:p>
             <a:fld id="{904F8374-DDA3-4289-A3C4-A561B6E67BA2}" type="datetimeFigureOut">
               <a:rPr lang="da-DK" smtClean="0"/>
-              <a:t>12-05-2024</a:t>
+              <a:t>13-05-2024</a:t>
             </a:fld>
             <a:endParaRPr lang="da-DK"/>
           </a:p>
@@ -5235,7 +5362,7 @@
           <a:p>
             <a:fld id="{904F8374-DDA3-4289-A3C4-A561B6E67BA2}" type="datetimeFigureOut">
               <a:rPr lang="da-DK" smtClean="0"/>
-              <a:t>12-05-2024</a:t>
+              <a:t>13-05-2024</a:t>
             </a:fld>
             <a:endParaRPr lang="da-DK"/>
           </a:p>
@@ -5782,7 +5909,7 @@
           <a:p>
             <a:fld id="{904F8374-DDA3-4289-A3C4-A561B6E67BA2}" type="datetimeFigureOut">
               <a:rPr lang="da-DK" smtClean="0"/>
-              <a:t>12-05-2024</a:t>
+              <a:t>13-05-2024</a:t>
             </a:fld>
             <a:endParaRPr lang="da-DK"/>
           </a:p>
@@ -6556,7 +6683,7 @@
           <a:p>
             <a:fld id="{904F8374-DDA3-4289-A3C4-A561B6E67BA2}" type="datetimeFigureOut">
               <a:rPr lang="da-DK" smtClean="0"/>
-              <a:t>12-05-2024</a:t>
+              <a:t>13-05-2024</a:t>
             </a:fld>
             <a:endParaRPr lang="da-DK"/>
           </a:p>
@@ -6731,7 +6858,7 @@
           <a:p>
             <a:fld id="{904F8374-DDA3-4289-A3C4-A561B6E67BA2}" type="datetimeFigureOut">
               <a:rPr lang="da-DK" smtClean="0"/>
-              <a:t>12-05-2024</a:t>
+              <a:t>13-05-2024</a:t>
             </a:fld>
             <a:endParaRPr lang="da-DK"/>
           </a:p>
@@ -6954,7 +7081,7 @@
           <a:p>
             <a:fld id="{904F8374-DDA3-4289-A3C4-A561B6E67BA2}" type="datetimeFigureOut">
               <a:rPr lang="da-DK" smtClean="0"/>
-              <a:t>12-05-2024</a:t>
+              <a:t>13-05-2024</a:t>
             </a:fld>
             <a:endParaRPr lang="da-DK"/>
           </a:p>
@@ -7134,7 +7261,7 @@
           <a:p>
             <a:fld id="{904F8374-DDA3-4289-A3C4-A561B6E67BA2}" type="datetimeFigureOut">
               <a:rPr lang="da-DK" smtClean="0"/>
-              <a:t>12-05-2024</a:t>
+              <a:t>13-05-2024</a:t>
             </a:fld>
             <a:endParaRPr lang="da-DK"/>
           </a:p>
@@ -7423,7 +7550,7 @@
           <a:p>
             <a:fld id="{904F8374-DDA3-4289-A3C4-A561B6E67BA2}" type="datetimeFigureOut">
               <a:rPr lang="da-DK" smtClean="0"/>
-              <a:t>12-05-2024</a:t>
+              <a:t>13-05-2024</a:t>
             </a:fld>
             <a:endParaRPr lang="da-DK"/>
           </a:p>
@@ -7665,7 +7792,7 @@
           <a:p>
             <a:fld id="{904F8374-DDA3-4289-A3C4-A561B6E67BA2}" type="datetimeFigureOut">
               <a:rPr lang="da-DK" smtClean="0"/>
-              <a:t>12-05-2024</a:t>
+              <a:t>13-05-2024</a:t>
             </a:fld>
             <a:endParaRPr lang="da-DK"/>
           </a:p>
@@ -8044,7 +8171,7 @@
           <a:p>
             <a:fld id="{904F8374-DDA3-4289-A3C4-A561B6E67BA2}" type="datetimeFigureOut">
               <a:rPr lang="da-DK" smtClean="0"/>
-              <a:t>12-05-2024</a:t>
+              <a:t>13-05-2024</a:t>
             </a:fld>
             <a:endParaRPr lang="da-DK"/>
           </a:p>
@@ -8162,7 +8289,7 @@
           <a:p>
             <a:fld id="{904F8374-DDA3-4289-A3C4-A561B6E67BA2}" type="datetimeFigureOut">
               <a:rPr lang="da-DK" smtClean="0"/>
-              <a:t>12-05-2024</a:t>
+              <a:t>13-05-2024</a:t>
             </a:fld>
             <a:endParaRPr lang="da-DK"/>
           </a:p>
@@ -8257,7 +8384,7 @@
           <a:p>
             <a:fld id="{904F8374-DDA3-4289-A3C4-A561B6E67BA2}" type="datetimeFigureOut">
               <a:rPr lang="da-DK" smtClean="0"/>
-              <a:t>12-05-2024</a:t>
+              <a:t>13-05-2024</a:t>
             </a:fld>
             <a:endParaRPr lang="da-DK"/>
           </a:p>
@@ -8506,7 +8633,7 @@
           <a:p>
             <a:fld id="{904F8374-DDA3-4289-A3C4-A561B6E67BA2}" type="datetimeFigureOut">
               <a:rPr lang="da-DK" smtClean="0"/>
-              <a:t>12-05-2024</a:t>
+              <a:t>13-05-2024</a:t>
             </a:fld>
             <a:endParaRPr lang="da-DK"/>
           </a:p>
@@ -8763,7 +8890,7 @@
           <a:p>
             <a:fld id="{904F8374-DDA3-4289-A3C4-A561B6E67BA2}" type="datetimeFigureOut">
               <a:rPr lang="da-DK" smtClean="0"/>
-              <a:t>12-05-2024</a:t>
+              <a:t>13-05-2024</a:t>
             </a:fld>
             <a:endParaRPr lang="da-DK"/>
           </a:p>
@@ -9006,7 +9133,7 @@
           <a:p>
             <a:fld id="{904F8374-DDA3-4289-A3C4-A561B6E67BA2}" type="datetimeFigureOut">
               <a:rPr lang="da-DK" smtClean="0"/>
-              <a:t>12-05-2024</a:t>
+              <a:t>13-05-2024</a:t>
             </a:fld>
             <a:endParaRPr lang="da-DK"/>
           </a:p>
@@ -10277,13 +10404,13 @@
               </a:ext>
             </a:extLst>
           </a:blip>
-          <a:srcRect l="33944" r="43745" b="60746"/>
+          <a:srcRect l="34258" r="43936" b="60746"/>
           <a:stretch/>
         </p:blipFill>
         <p:spPr>
           <a:xfrm>
-            <a:off x="2417536" y="3429000"/>
-            <a:ext cx="1990531" cy="2506702"/>
+            <a:off x="2445545" y="3429000"/>
+            <a:ext cx="1945480" cy="2506702"/>
           </a:xfrm>
           <a:prstGeom prst="rect">
             <a:avLst/>
@@ -10618,7 +10745,9 @@
         </p:nvSpPr>
         <p:spPr/>
         <p:txBody>
-          <a:bodyPr/>
+          <a:bodyPr>
+            <a:normAutofit/>
+          </a:bodyPr>
           <a:lstStyle/>
           <a:p>
             <a:r>
@@ -10637,6 +10766,18 @@
           <a:p>
             <a:r>
               <a:rPr lang="da-DK" dirty="0"/>
+              <a:t>Skrive beskeder</a:t>
+            </a:r>
+          </a:p>
+          <a:p>
+            <a:r>
+              <a:rPr lang="da-DK" dirty="0"/>
+              <a:t>Læse beskeder</a:t>
+            </a:r>
+          </a:p>
+          <a:p>
+            <a:r>
+              <a:rPr lang="da-DK" dirty="0"/>
               <a:t>Queue</a:t>
             </a:r>
           </a:p>
@@ -10665,18 +10806,6 @@
               <a:t>consumers</a:t>
             </a:r>
             <a:endParaRPr lang="da-DK" dirty="0"/>
-          </a:p>
-          <a:p>
-            <a:r>
-              <a:rPr lang="da-DK" dirty="0"/>
-              <a:t>Skrive beskeder</a:t>
-            </a:r>
-          </a:p>
-          <a:p>
-            <a:r>
-              <a:rPr lang="da-DK" dirty="0"/>
-              <a:t>Læse beskeder</a:t>
-            </a:r>
           </a:p>
           <a:p>
             <a:r>
@@ -11319,12 +11448,6 @@
               <a:t>Partitioneret</a:t>
             </a:r>
             <a:endParaRPr lang="da-DK" dirty="0"/>
-          </a:p>
-          <a:p>
-            <a:r>
-              <a:rPr lang="da-DK" dirty="0"/>
-              <a:t>Server/Klient kommunikation</a:t>
-            </a:r>
           </a:p>
           <a:p>
             <a:r>
@@ -12659,10 +12782,9 @@
           <a:lstStyle/>
           <a:p>
             <a:r>
-              <a:rPr lang="da-DK" dirty="0" err="1"/>
-              <a:t>ProblemFormulering</a:t>
-            </a:r>
-            <a:endParaRPr lang="da-DK" dirty="0"/>
+              <a:rPr lang="da-DK" dirty="0"/>
+              <a:t>Problemformulering</a:t>
+            </a:r>
           </a:p>
         </p:txBody>
       </p:sp>
@@ -12711,7 +12833,7 @@
 </file>
 
 <file path=ppt/slides/slide5.xml><?xml version="1.0" encoding="utf-8"?>
-<p:sld xmlns:a="http://schemas.openxmlformats.org/drawingml/2006/main" xmlns:r="http://schemas.openxmlformats.org/officeDocument/2006/relationships" xmlns:p="http://schemas.openxmlformats.org/presentationml/2006/main">
+<p:sld xmlns:a="http://schemas.openxmlformats.org/drawingml/2006/main" xmlns:r="http://schemas.openxmlformats.org/officeDocument/2006/relationships" xmlns:p="http://schemas.openxmlformats.org/presentationml/2006/main" show="0">
   <p:cSld>
     <p:spTree>
       <p:nvGrpSpPr>
@@ -12778,13 +12900,8 @@
           <a:p>
             <a:r>
               <a:rPr lang="da-DK" dirty="0"/>
-              <a:t>Intet </a:t>
-            </a:r>
-            <a:r>
-              <a:rPr lang="da-DK" dirty="0" err="1"/>
-              <a:t>betalingssytem</a:t>
-            </a:r>
-            <a:endParaRPr lang="da-DK" dirty="0"/>
+              <a:t>Intet betalingssystem</a:t>
+            </a:r>
           </a:p>
           <a:p>
             <a:r>

</xml_diff>